<commit_message>
Started to work on stencil 2d example slides
</commit_message>
<xml_diff>
--- a/lbl2016/HPX Workshop (Berkeley C++ Summit) - 3.pptx
+++ b/lbl2016/HPX Workshop (Berkeley C++ Summit) - 3.pptx
@@ -5,7 +5,7 @@
     <p:sldMasterId id="2147483660" r:id="rId1"/>
   </p:sldMasterIdLst>
   <p:notesMasterIdLst>
-    <p:notesMasterId r:id="rId26"/>
+    <p:notesMasterId r:id="rId27"/>
   </p:notesMasterIdLst>
   <p:sldIdLst>
     <p:sldId id="256" r:id="rId2"/>
@@ -28,10 +28,11 @@
     <p:sldId id="297" r:id="rId19"/>
     <p:sldId id="293" r:id="rId20"/>
     <p:sldId id="294" r:id="rId21"/>
-    <p:sldId id="295" r:id="rId22"/>
-    <p:sldId id="362" r:id="rId23"/>
-    <p:sldId id="296" r:id="rId24"/>
-    <p:sldId id="361" r:id="rId25"/>
+    <p:sldId id="363" r:id="rId22"/>
+    <p:sldId id="295" r:id="rId23"/>
+    <p:sldId id="362" r:id="rId24"/>
+    <p:sldId id="296" r:id="rId25"/>
+    <p:sldId id="361" r:id="rId26"/>
   </p:sldIdLst>
   <p:sldSz cx="12192000" cy="6858000"/>
   <p:notesSz cx="6858000" cy="9144000"/>
@@ -196,6 +197,7 @@
           </a:p>
         </c:rich>
       </c:tx>
+      <c:layout/>
       <c:overlay val="0"/>
       <c:spPr>
         <a:noFill/>
@@ -404,8 +406,8 @@
         </c:dLbls>
         <c:marker val="1"/>
         <c:smooth val="0"/>
-        <c:axId val="119935160"/>
-        <c:axId val="195933328"/>
+        <c:axId val="468601000"/>
+        <c:axId val="395921400"/>
       </c:lineChart>
       <c:lineChart>
         <c:grouping val="standard"/>
@@ -504,11 +506,11 @@
         </c:dLbls>
         <c:marker val="1"/>
         <c:smooth val="0"/>
-        <c:axId val="195928232"/>
-        <c:axId val="195925880"/>
+        <c:axId val="470572472"/>
+        <c:axId val="470569336"/>
       </c:lineChart>
       <c:catAx>
-        <c:axId val="119935160"/>
+        <c:axId val="468601000"/>
         <c:scaling>
           <c:orientation val="minMax"/>
         </c:scaling>
@@ -551,6 +553,7 @@
               </a:p>
             </c:rich>
           </c:tx>
+          <c:layout/>
           <c:overlay val="0"/>
           <c:spPr>
             <a:noFill/>
@@ -611,7 +614,7 @@
             <a:endParaRPr lang="en-US"/>
           </a:p>
         </c:txPr>
-        <c:crossAx val="195933328"/>
+        <c:crossAx val="395921400"/>
         <c:crossesAt val="1.0000000000000005E-8"/>
         <c:auto val="1"/>
         <c:lblAlgn val="ctr"/>
@@ -619,7 +622,7 @@
         <c:noMultiLvlLbl val="0"/>
       </c:catAx>
       <c:valAx>
-        <c:axId val="195933328"/>
+        <c:axId val="395921400"/>
         <c:scaling>
           <c:logBase val="10"/>
           <c:orientation val="minMax"/>
@@ -663,6 +666,7 @@
               </a:p>
             </c:rich>
           </c:tx>
+          <c:layout/>
           <c:overlay val="0"/>
           <c:spPr>
             <a:noFill/>
@@ -717,12 +721,12 @@
             <a:endParaRPr lang="en-US"/>
           </a:p>
         </c:txPr>
-        <c:crossAx val="119935160"/>
+        <c:crossAx val="468601000"/>
         <c:crosses val="autoZero"/>
         <c:crossBetween val="midCat"/>
       </c:valAx>
       <c:valAx>
-        <c:axId val="195925880"/>
+        <c:axId val="470569336"/>
         <c:scaling>
           <c:logBase val="10"/>
           <c:orientation val="minMax"/>
@@ -752,6 +756,7 @@
               </a:p>
             </c:rich>
           </c:tx>
+          <c:layout/>
           <c:overlay val="0"/>
           <c:spPr>
             <a:noFill/>
@@ -806,12 +811,12 @@
             <a:endParaRPr lang="en-US"/>
           </a:p>
         </c:txPr>
-        <c:crossAx val="195928232"/>
+        <c:crossAx val="470572472"/>
         <c:crosses val="max"/>
         <c:crossBetween val="between"/>
       </c:valAx>
       <c:catAx>
-        <c:axId val="195928232"/>
+        <c:axId val="470572472"/>
         <c:scaling>
           <c:orientation val="minMax"/>
         </c:scaling>
@@ -820,7 +825,7 @@
         <c:majorTickMark val="out"/>
         <c:minorTickMark val="none"/>
         <c:tickLblPos val="nextTo"/>
-        <c:crossAx val="195925880"/>
+        <c:crossAx val="470569336"/>
         <c:crossesAt val="1"/>
         <c:auto val="1"/>
         <c:lblAlgn val="ctr"/>
@@ -2957,11 +2962,11 @@
           <c:showPercent val="0"/>
           <c:showBubbleSize val="0"/>
         </c:dLbls>
-        <c:axId val="195926272"/>
-        <c:axId val="195929408"/>
+        <c:axId val="470570512"/>
+        <c:axId val="470573648"/>
       </c:scatterChart>
       <c:valAx>
-        <c:axId val="195926272"/>
+        <c:axId val="470570512"/>
         <c:scaling>
           <c:orientation val="minMax"/>
         </c:scaling>
@@ -3058,12 +3063,12 @@
             <a:endParaRPr lang="en-US"/>
           </a:p>
         </c:txPr>
-        <c:crossAx val="195929408"/>
+        <c:crossAx val="470573648"/>
         <c:crossesAt val="1.0000000000000005E-8"/>
         <c:crossBetween val="midCat"/>
       </c:valAx>
       <c:valAx>
-        <c:axId val="195929408"/>
+        <c:axId val="470573648"/>
         <c:scaling>
           <c:logBase val="10"/>
           <c:orientation val="minMax"/>
@@ -3161,7 +3166,7 @@
             <a:endParaRPr lang="en-US"/>
           </a:p>
         </c:txPr>
-        <c:crossAx val="195926272"/>
+        <c:crossAx val="470570512"/>
         <c:crosses val="autoZero"/>
         <c:crossBetween val="midCat"/>
       </c:valAx>
@@ -4651,8 +4656,8 @@
           <c:showPercent val="0"/>
           <c:showBubbleSize val="0"/>
         </c:dLbls>
-        <c:axId val="195928624"/>
-        <c:axId val="195926664"/>
+        <c:axId val="470574824"/>
+        <c:axId val="470568552"/>
         <c:extLst>
           <c:ext xmlns:c15="http://schemas.microsoft.com/office/drawing/2012/chart" uri="{02D57815-91ED-43cb-92C2-25804820EDAC}">
             <c15:filteredScatterSeries>
@@ -5777,7 +5782,7 @@
         </c:extLst>
       </c:scatterChart>
       <c:valAx>
-        <c:axId val="195928624"/>
+        <c:axId val="470574824"/>
         <c:scaling>
           <c:orientation val="minMax"/>
           <c:max val="25"/>
@@ -5875,12 +5880,12 @@
             <a:endParaRPr lang="en-US"/>
           </a:p>
         </c:txPr>
-        <c:crossAx val="195926664"/>
+        <c:crossAx val="470568552"/>
         <c:crosses val="autoZero"/>
         <c:crossBetween val="midCat"/>
       </c:valAx>
       <c:valAx>
-        <c:axId val="195926664"/>
+        <c:axId val="470568552"/>
         <c:scaling>
           <c:orientation val="minMax"/>
         </c:scaling>
@@ -5977,7 +5982,7 @@
             <a:endParaRPr lang="en-US"/>
           </a:p>
         </c:txPr>
-        <c:crossAx val="195928624"/>
+        <c:crossAx val="470574824"/>
         <c:crosses val="autoZero"/>
         <c:crossBetween val="midCat"/>
       </c:valAx>
@@ -6583,8 +6588,8 @@
           <c:showPercent val="0"/>
           <c:showBubbleSize val="0"/>
         </c:dLbls>
-        <c:axId val="195930192"/>
-        <c:axId val="195927448"/>
+        <c:axId val="470568944"/>
+        <c:axId val="470571296"/>
         <c:extLst>
           <c:ext xmlns:c15="http://schemas.microsoft.com/office/drawing/2012/chart" uri="{02D57815-91ED-43cb-92C2-25804820EDAC}">
             <c15:filteredScatterSeries>
@@ -6831,7 +6836,7 @@
         </c:extLst>
       </c:scatterChart>
       <c:valAx>
-        <c:axId val="195930192"/>
+        <c:axId val="470568944"/>
         <c:scaling>
           <c:orientation val="minMax"/>
         </c:scaling>
@@ -6928,12 +6933,12 @@
             <a:endParaRPr lang="en-US"/>
           </a:p>
         </c:txPr>
-        <c:crossAx val="195927448"/>
+        <c:crossAx val="470571296"/>
         <c:crossesAt val="0.1"/>
         <c:crossBetween val="midCat"/>
       </c:valAx>
       <c:valAx>
-        <c:axId val="195927448"/>
+        <c:axId val="470571296"/>
         <c:scaling>
           <c:logBase val="10"/>
           <c:orientation val="minMax"/>
@@ -7031,7 +7036,7 @@
             <a:endParaRPr lang="en-US"/>
           </a:p>
         </c:txPr>
-        <c:crossAx val="195930192"/>
+        <c:crossAx val="470568944"/>
         <c:crosses val="autoZero"/>
         <c:crossBetween val="midCat"/>
       </c:valAx>
@@ -9358,7 +9363,7 @@
           <a:p>
             <a:fld id="{FEB80FAA-87D6-497E-80FC-86163C79CB54}" type="datetimeFigureOut">
               <a:rPr lang="en-US" smtClean="0"/>
-              <a:t>10/12/2016</a:t>
+              <a:t>10/13/2016</a:t>
             </a:fld>
             <a:endParaRPr lang="en-US"/>
           </a:p>
@@ -10279,7 +10284,7 @@
           <a:p>
             <a:fld id="{DE04AD34-A97B-4D40-BD83-916B33E6C445}" type="slidenum">
               <a:rPr lang="en-US" smtClean="0"/>
-              <a:t>21</a:t>
+              <a:t>22</a:t>
             </a:fld>
             <a:endParaRPr lang="en-US"/>
           </a:p>
@@ -10363,7 +10368,7 @@
           <a:p>
             <a:fld id="{9895210F-3153-47D6-B786-4D5C9DCDB62B}" type="slidenum">
               <a:rPr lang="en-US" smtClean="0"/>
-              <a:t>24</a:t>
+              <a:t>25</a:t>
             </a:fld>
             <a:endParaRPr lang="en-US"/>
           </a:p>
@@ -14233,11 +14238,7 @@
           <a:p>
             <a:r>
               <a:rPr lang="en-US" dirty="0" smtClean="0"/>
-              <a:t>Berkeley </a:t>
-            </a:r>
-            <a:r>
-              <a:rPr lang="en-US" dirty="0" smtClean="0"/>
-              <a:t>C++ Summit 2016</a:t>
+              <a:t>Berkeley C++ Summit 2016</a:t>
             </a:r>
             <a:endParaRPr lang="en-US" dirty="0"/>
           </a:p>
@@ -21637,7 +21638,12 @@
             <p:ph idx="1"/>
           </p:nvPr>
         </p:nvSpPr>
-        <p:spPr/>
+        <p:spPr>
+          <a:xfrm>
+            <a:off x="1261872" y="1828800"/>
+            <a:ext cx="9530928" cy="4351337"/>
+          </a:xfrm>
+        </p:spPr>
         <p:txBody>
           <a:bodyPr>
             <a:normAutofit fontScale="92500" lnSpcReduction="10000"/>
@@ -21972,28 +21978,45 @@
                 <a:latin typeface="Consolas" panose="020B0609020204030204" pitchFamily="49" charset="0"/>
                 <a:cs typeface="Consolas" panose="020B0609020204030204" pitchFamily="49" charset="0"/>
               </a:rPr>
-              <a:t>, n-2)</a:t>
+              <a:t>, n-2</a:t>
             </a:r>
             <a:r>
               <a:rPr lang="en-US" sz="1600" dirty="0" smtClean="0">
                 <a:solidFill>
+                  <a:schemeClr val="tx1"/>
+                </a:solidFill>
+                <a:latin typeface="Consolas" panose="020B0609020204030204" pitchFamily="49" charset="0"/>
+                <a:cs typeface="Consolas" panose="020B0609020204030204" pitchFamily="49" charset="0"/>
+              </a:rPr>
+              <a:t>);   </a:t>
+            </a:r>
+            <a:r>
+              <a:rPr lang="en-US" sz="1600" dirty="0" smtClean="0">
+                <a:solidFill>
                   <a:srgbClr val="C00000"/>
                 </a:solidFill>
                 <a:latin typeface="Consolas" panose="020B0609020204030204" pitchFamily="49" charset="0"/>
                 <a:cs typeface="Consolas" panose="020B0609020204030204" pitchFamily="49" charset="0"/>
               </a:rPr>
-              <a:t>.unwrap()</a:t>
+              <a:t>// </a:t>
             </a:r>
             <a:r>
               <a:rPr lang="en-US" sz="1600" dirty="0" smtClean="0">
                 <a:solidFill>
-                  <a:schemeClr val="tx1"/>
-                </a:solidFill>
-                <a:latin typeface="Consolas" panose="020B0609020204030204" pitchFamily="49" charset="0"/>
-                <a:cs typeface="Consolas" panose="020B0609020204030204" pitchFamily="49" charset="0"/>
-              </a:rPr>
-              <a:t>;</a:t>
-            </a:r>
+                  <a:srgbClr val="C00000"/>
+                </a:solidFill>
+                <a:latin typeface="Consolas" panose="020B0609020204030204" pitchFamily="49" charset="0"/>
+                <a:cs typeface="Consolas" panose="020B0609020204030204" pitchFamily="49" charset="0"/>
+              </a:rPr>
+              <a:t>auto-unwrap</a:t>
+            </a:r>
+            <a:endParaRPr lang="en-US" sz="1600" dirty="0" smtClean="0">
+              <a:solidFill>
+                <a:schemeClr val="tx1"/>
+              </a:solidFill>
+              <a:latin typeface="Consolas" panose="020B0609020204030204" pitchFamily="49" charset="0"/>
+              <a:cs typeface="Consolas" panose="020B0609020204030204" pitchFamily="49" charset="0"/>
+            </a:endParaRPr>
           </a:p>
           <a:p>
             <a:pPr marL="685800" lvl="1" indent="0">
@@ -22266,6 +22289,925 @@
       </p:grpSpPr>
       <p:sp>
         <p:nvSpPr>
+          <p:cNvPr id="8" name="Rectangle 7"/>
+          <p:cNvSpPr/>
+          <p:nvPr/>
+        </p:nvSpPr>
+        <p:spPr>
+          <a:xfrm>
+            <a:off x="807720" y="2264228"/>
+            <a:ext cx="10485120" cy="3755571"/>
+          </a:xfrm>
+          <a:prstGeom prst="rect">
+            <a:avLst/>
+          </a:prstGeom>
+        </p:spPr>
+        <p:style>
+          <a:lnRef idx="1">
+            <a:schemeClr val="accent1"/>
+          </a:lnRef>
+          <a:fillRef idx="2">
+            <a:schemeClr val="accent1"/>
+          </a:fillRef>
+          <a:effectRef idx="1">
+            <a:schemeClr val="accent1"/>
+          </a:effectRef>
+          <a:fontRef idx="minor">
+            <a:schemeClr val="dk1"/>
+          </a:fontRef>
+        </p:style>
+        <p:txBody>
+          <a:bodyPr rtlCol="0" anchor="ctr"/>
+          <a:lstStyle/>
+          <a:p>
+            <a:pPr algn="ctr"/>
+            <a:endParaRPr lang="en-US"/>
+          </a:p>
+        </p:txBody>
+      </p:sp>
+      <p:sp>
+        <p:nvSpPr>
+          <p:cNvPr id="2" name="Title 1"/>
+          <p:cNvSpPr>
+            <a:spLocks noGrp="1"/>
+          </p:cNvSpPr>
+          <p:nvPr>
+            <p:ph type="title"/>
+          </p:nvPr>
+        </p:nvSpPr>
+        <p:spPr/>
+        <p:txBody>
+          <a:bodyPr/>
+          <a:lstStyle/>
+          <a:p>
+            <a:r>
+              <a:rPr lang="en-US" dirty="0" smtClean="0"/>
+              <a:t>Let’s Parallelize It – Unwrap Inner </a:t>
+            </a:r>
+            <a:r>
+              <a:rPr lang="en-US" dirty="0" smtClean="0"/>
+              <a:t>Futures (Alternative)</a:t>
+            </a:r>
+            <a:endParaRPr lang="en-US" dirty="0"/>
+          </a:p>
+        </p:txBody>
+      </p:sp>
+      <p:sp>
+        <p:nvSpPr>
+          <p:cNvPr id="4" name="Date Placeholder 3"/>
+          <p:cNvSpPr>
+            <a:spLocks noGrp="1"/>
+          </p:cNvSpPr>
+          <p:nvPr>
+            <p:ph type="dt" sz="half" idx="10"/>
+          </p:nvPr>
+        </p:nvSpPr>
+        <p:spPr/>
+        <p:txBody>
+          <a:bodyPr/>
+          <a:lstStyle/>
+          <a:p>
+            <a:r>
+              <a:rPr lang="en-US" smtClean="0"/>
+              <a:t>10/18/2016</a:t>
+            </a:r>
+            <a:endParaRPr lang="en-US"/>
+          </a:p>
+        </p:txBody>
+      </p:sp>
+      <p:sp>
+        <p:nvSpPr>
+          <p:cNvPr id="5" name="Footer Placeholder 4"/>
+          <p:cNvSpPr>
+            <a:spLocks noGrp="1"/>
+          </p:cNvSpPr>
+          <p:nvPr>
+            <p:ph type="ftr" sz="quarter" idx="11"/>
+          </p:nvPr>
+        </p:nvSpPr>
+        <p:spPr/>
+        <p:txBody>
+          <a:bodyPr/>
+          <a:lstStyle/>
+          <a:p>
+            <a:r>
+              <a:rPr lang="en-US" smtClean="0"/>
+              <a:t>HPX Workshop (Berkeley C++ Summit) - 3,            Hartmut Kaiser (hkaiser@cct.lsu.edu)</a:t>
+            </a:r>
+            <a:endParaRPr lang="en-US"/>
+          </a:p>
+        </p:txBody>
+      </p:sp>
+      <p:sp>
+        <p:nvSpPr>
+          <p:cNvPr id="6" name="Slide Number Placeholder 5"/>
+          <p:cNvSpPr>
+            <a:spLocks noGrp="1"/>
+          </p:cNvSpPr>
+          <p:nvPr>
+            <p:ph type="sldNum" sz="quarter" idx="12"/>
+          </p:nvPr>
+        </p:nvSpPr>
+        <p:spPr/>
+        <p:txBody>
+          <a:bodyPr>
+            <a:normAutofit lnSpcReduction="10000"/>
+          </a:bodyPr>
+          <a:lstStyle/>
+          <a:p>
+            <a:fld id="{E21D6AF4-B5A0-4A07-BEF4-28FAD635375F}" type="slidenum">
+              <a:rPr lang="en-US" smtClean="0"/>
+              <a:t>21</a:t>
+            </a:fld>
+            <a:endParaRPr lang="en-US"/>
+          </a:p>
+        </p:txBody>
+      </p:sp>
+      <p:sp>
+        <p:nvSpPr>
+          <p:cNvPr id="3" name="Content Placeholder 2"/>
+          <p:cNvSpPr>
+            <a:spLocks noGrp="1"/>
+          </p:cNvSpPr>
+          <p:nvPr>
+            <p:ph idx="1"/>
+          </p:nvPr>
+        </p:nvSpPr>
+        <p:spPr>
+          <a:xfrm>
+            <a:off x="1261872" y="1828800"/>
+            <a:ext cx="9530928" cy="4351337"/>
+          </a:xfrm>
+        </p:spPr>
+        <p:txBody>
+          <a:bodyPr>
+            <a:normAutofit fontScale="92500" lnSpcReduction="10000"/>
+          </a:bodyPr>
+          <a:lstStyle/>
+          <a:p>
+            <a:endParaRPr lang="en-US" sz="1200" dirty="0" smtClean="0">
+              <a:latin typeface="Calibri" panose="020F0502020204030204" pitchFamily="34" charset="0"/>
+            </a:endParaRPr>
+          </a:p>
+          <a:p>
+            <a:pPr marL="685800" lvl="1" indent="0">
+              <a:spcBef>
+                <a:spcPts val="0"/>
+              </a:spcBef>
+              <a:buNone/>
+            </a:pPr>
+            <a:endParaRPr lang="en-US" sz="1600" dirty="0" smtClean="0">
+              <a:solidFill>
+                <a:schemeClr val="tx1"/>
+              </a:solidFill>
+              <a:latin typeface="Consolas" panose="020B0609020204030204" pitchFamily="49" charset="0"/>
+              <a:cs typeface="Consolas" panose="020B0609020204030204" pitchFamily="49" charset="0"/>
+            </a:endParaRPr>
+          </a:p>
+          <a:p>
+            <a:pPr marL="685800" lvl="1" indent="0">
+              <a:spcBef>
+                <a:spcPts val="0"/>
+              </a:spcBef>
+              <a:buNone/>
+            </a:pPr>
+            <a:endParaRPr lang="en-US" sz="1600" dirty="0" smtClean="0">
+              <a:solidFill>
+                <a:schemeClr val="tx1"/>
+              </a:solidFill>
+              <a:latin typeface="Consolas" panose="020B0609020204030204" pitchFamily="49" charset="0"/>
+              <a:cs typeface="Consolas" panose="020B0609020204030204" pitchFamily="49" charset="0"/>
+            </a:endParaRPr>
+          </a:p>
+          <a:p>
+            <a:pPr marL="685800" lvl="1" indent="0">
+              <a:spcBef>
+                <a:spcPts val="0"/>
+              </a:spcBef>
+              <a:buNone/>
+            </a:pPr>
+            <a:endParaRPr lang="en-US" sz="1600" dirty="0">
+              <a:latin typeface="Consolas" panose="020B0609020204030204" pitchFamily="49" charset="0"/>
+              <a:cs typeface="Consolas" panose="020B0609020204030204" pitchFamily="49" charset="0"/>
+            </a:endParaRPr>
+          </a:p>
+          <a:p>
+            <a:pPr marL="685800" lvl="1" indent="0">
+              <a:spcBef>
+                <a:spcPts val="0"/>
+              </a:spcBef>
+              <a:buNone/>
+            </a:pPr>
+            <a:r>
+              <a:rPr lang="en-US" sz="1600" dirty="0" smtClean="0">
+                <a:solidFill>
+                  <a:schemeClr val="tx1"/>
+                </a:solidFill>
+                <a:latin typeface="Consolas" panose="020B0609020204030204" pitchFamily="49" charset="0"/>
+                <a:cs typeface="Consolas" panose="020B0609020204030204" pitchFamily="49" charset="0"/>
+              </a:rPr>
+              <a:t>future&lt;uint64_t</a:t>
+            </a:r>
+            <a:r>
+              <a:rPr lang="en-US" sz="1600" dirty="0">
+                <a:solidFill>
+                  <a:schemeClr val="tx1"/>
+                </a:solidFill>
+                <a:latin typeface="Consolas" panose="020B0609020204030204" pitchFamily="49" charset="0"/>
+                <a:cs typeface="Consolas" panose="020B0609020204030204" pitchFamily="49" charset="0"/>
+              </a:rPr>
+              <a:t>&gt; </a:t>
+            </a:r>
+            <a:r>
+              <a:rPr lang="en-US" sz="1600" dirty="0" err="1" smtClean="0">
+                <a:solidFill>
+                  <a:schemeClr val="tx1"/>
+                </a:solidFill>
+                <a:latin typeface="Consolas" panose="020B0609020204030204" pitchFamily="49" charset="0"/>
+                <a:cs typeface="Consolas" panose="020B0609020204030204" pitchFamily="49" charset="0"/>
+              </a:rPr>
+              <a:t>fibonacci</a:t>
+            </a:r>
+            <a:r>
+              <a:rPr lang="en-US" sz="1600" dirty="0" smtClean="0">
+                <a:solidFill>
+                  <a:schemeClr val="tx1"/>
+                </a:solidFill>
+                <a:latin typeface="Consolas" panose="020B0609020204030204" pitchFamily="49" charset="0"/>
+                <a:cs typeface="Consolas" panose="020B0609020204030204" pitchFamily="49" charset="0"/>
+              </a:rPr>
+              <a:t>(uint64_t n)</a:t>
+            </a:r>
+          </a:p>
+          <a:p>
+            <a:pPr marL="685800" lvl="1" indent="0">
+              <a:spcBef>
+                <a:spcPts val="0"/>
+              </a:spcBef>
+              <a:buNone/>
+            </a:pPr>
+            <a:r>
+              <a:rPr lang="en-US" sz="1600" dirty="0" smtClean="0">
+                <a:solidFill>
+                  <a:schemeClr val="tx1"/>
+                </a:solidFill>
+                <a:latin typeface="Consolas" panose="020B0609020204030204" pitchFamily="49" charset="0"/>
+                <a:cs typeface="Consolas" panose="020B0609020204030204" pitchFamily="49" charset="0"/>
+              </a:rPr>
+              <a:t>{</a:t>
+            </a:r>
+          </a:p>
+          <a:p>
+            <a:pPr marL="685800" lvl="1" indent="0">
+              <a:spcBef>
+                <a:spcPts val="0"/>
+              </a:spcBef>
+              <a:buNone/>
+            </a:pPr>
+            <a:r>
+              <a:rPr lang="en-US" sz="1600" dirty="0" smtClean="0">
+                <a:solidFill>
+                  <a:schemeClr val="tx1"/>
+                </a:solidFill>
+                <a:latin typeface="Consolas" panose="020B0609020204030204" pitchFamily="49" charset="0"/>
+                <a:cs typeface="Consolas" panose="020B0609020204030204" pitchFamily="49" charset="0"/>
+              </a:rPr>
+              <a:t>    if (n &lt; 2) return </a:t>
+            </a:r>
+            <a:r>
+              <a:rPr lang="en-US" sz="1600" dirty="0" err="1" smtClean="0">
+                <a:solidFill>
+                  <a:schemeClr val="tx1"/>
+                </a:solidFill>
+                <a:latin typeface="Consolas" panose="020B0609020204030204" pitchFamily="49" charset="0"/>
+                <a:cs typeface="Consolas" panose="020B0609020204030204" pitchFamily="49" charset="0"/>
+              </a:rPr>
+              <a:t>make_ready_future</a:t>
+            </a:r>
+            <a:r>
+              <a:rPr lang="en-US" sz="1600" dirty="0" smtClean="0">
+                <a:solidFill>
+                  <a:schemeClr val="tx1"/>
+                </a:solidFill>
+                <a:latin typeface="Consolas" panose="020B0609020204030204" pitchFamily="49" charset="0"/>
+                <a:cs typeface="Consolas" panose="020B0609020204030204" pitchFamily="49" charset="0"/>
+              </a:rPr>
+              <a:t>(n);</a:t>
+            </a:r>
+          </a:p>
+          <a:p>
+            <a:pPr marL="685800" lvl="1" indent="0">
+              <a:spcBef>
+                <a:spcPts val="0"/>
+              </a:spcBef>
+              <a:buNone/>
+            </a:pPr>
+            <a:r>
+              <a:rPr lang="en-US" sz="1600" dirty="0" smtClean="0">
+                <a:solidFill>
+                  <a:schemeClr val="tx1"/>
+                </a:solidFill>
+                <a:latin typeface="Consolas" panose="020B0609020204030204" pitchFamily="49" charset="0"/>
+                <a:cs typeface="Consolas" panose="020B0609020204030204" pitchFamily="49" charset="0"/>
+              </a:rPr>
+              <a:t>    </a:t>
+            </a:r>
+            <a:r>
+              <a:rPr lang="en-US" sz="1600" dirty="0">
+                <a:solidFill>
+                  <a:schemeClr val="tx1"/>
+                </a:solidFill>
+                <a:latin typeface="Consolas" panose="020B0609020204030204" pitchFamily="49" charset="0"/>
+                <a:cs typeface="Consolas" panose="020B0609020204030204" pitchFamily="49" charset="0"/>
+              </a:rPr>
+              <a:t>if (n &lt; </a:t>
+            </a:r>
+            <a:r>
+              <a:rPr lang="en-US" sz="1600" dirty="0" smtClean="0">
+                <a:solidFill>
+                  <a:schemeClr val="tx1"/>
+                </a:solidFill>
+                <a:latin typeface="Consolas" panose="020B0609020204030204" pitchFamily="49" charset="0"/>
+                <a:cs typeface="Consolas" panose="020B0609020204030204" pitchFamily="49" charset="0"/>
+              </a:rPr>
+              <a:t>threshold) </a:t>
+            </a:r>
+            <a:r>
+              <a:rPr lang="en-US" sz="1600" dirty="0">
+                <a:solidFill>
+                  <a:schemeClr val="tx1"/>
+                </a:solidFill>
+                <a:latin typeface="Consolas" panose="020B0609020204030204" pitchFamily="49" charset="0"/>
+                <a:cs typeface="Consolas" panose="020B0609020204030204" pitchFamily="49" charset="0"/>
+              </a:rPr>
+              <a:t>return </a:t>
+            </a:r>
+            <a:r>
+              <a:rPr lang="en-US" sz="1600" dirty="0" err="1" smtClean="0">
+                <a:solidFill>
+                  <a:schemeClr val="tx1"/>
+                </a:solidFill>
+                <a:latin typeface="Consolas" panose="020B0609020204030204" pitchFamily="49" charset="0"/>
+                <a:cs typeface="Consolas" panose="020B0609020204030204" pitchFamily="49" charset="0"/>
+              </a:rPr>
+              <a:t>make_ready_future</a:t>
+            </a:r>
+            <a:r>
+              <a:rPr lang="en-US" sz="1600" dirty="0" smtClean="0">
+                <a:solidFill>
+                  <a:schemeClr val="tx1"/>
+                </a:solidFill>
+                <a:latin typeface="Consolas" panose="020B0609020204030204" pitchFamily="49" charset="0"/>
+                <a:cs typeface="Consolas" panose="020B0609020204030204" pitchFamily="49" charset="0"/>
+              </a:rPr>
+              <a:t>(</a:t>
+            </a:r>
+            <a:r>
+              <a:rPr lang="en-US" sz="1600" dirty="0" err="1" smtClean="0">
+                <a:solidFill>
+                  <a:schemeClr val="tx1"/>
+                </a:solidFill>
+                <a:latin typeface="Consolas" panose="020B0609020204030204" pitchFamily="49" charset="0"/>
+                <a:cs typeface="Consolas" panose="020B0609020204030204" pitchFamily="49" charset="0"/>
+              </a:rPr>
+              <a:t>fibonacci_serial</a:t>
+            </a:r>
+            <a:r>
+              <a:rPr lang="en-US" sz="1600" dirty="0" smtClean="0">
+                <a:solidFill>
+                  <a:schemeClr val="tx1"/>
+                </a:solidFill>
+                <a:latin typeface="Consolas" panose="020B0609020204030204" pitchFamily="49" charset="0"/>
+                <a:cs typeface="Consolas" panose="020B0609020204030204" pitchFamily="49" charset="0"/>
+              </a:rPr>
+              <a:t>(n));</a:t>
+            </a:r>
+          </a:p>
+          <a:p>
+            <a:pPr marL="685800" lvl="1" indent="0">
+              <a:spcBef>
+                <a:spcPts val="0"/>
+              </a:spcBef>
+              <a:buNone/>
+            </a:pPr>
+            <a:endParaRPr lang="en-US" sz="1600" dirty="0" smtClean="0">
+              <a:solidFill>
+                <a:schemeClr val="tx1"/>
+              </a:solidFill>
+              <a:latin typeface="Consolas" panose="020B0609020204030204" pitchFamily="49" charset="0"/>
+              <a:cs typeface="Consolas" panose="020B0609020204030204" pitchFamily="49" charset="0"/>
+            </a:endParaRPr>
+          </a:p>
+          <a:p>
+            <a:pPr marL="685800" lvl="1" indent="0">
+              <a:spcBef>
+                <a:spcPts val="0"/>
+              </a:spcBef>
+              <a:buNone/>
+            </a:pPr>
+            <a:r>
+              <a:rPr lang="en-US" sz="1600" dirty="0" smtClean="0">
+                <a:solidFill>
+                  <a:schemeClr val="tx1"/>
+                </a:solidFill>
+                <a:latin typeface="Consolas" panose="020B0609020204030204" pitchFamily="49" charset="0"/>
+                <a:cs typeface="Consolas" panose="020B0609020204030204" pitchFamily="49" charset="0"/>
+              </a:rPr>
+              <a:t>    future&lt;uint64_t&gt; f = </a:t>
+            </a:r>
+            <a:r>
+              <a:rPr lang="en-US" sz="1600" dirty="0" err="1">
+                <a:solidFill>
+                  <a:schemeClr val="tx1"/>
+                </a:solidFill>
+                <a:latin typeface="Consolas" panose="020B0609020204030204" pitchFamily="49" charset="0"/>
+                <a:cs typeface="Consolas" panose="020B0609020204030204" pitchFamily="49" charset="0"/>
+              </a:rPr>
+              <a:t>async</a:t>
+            </a:r>
+            <a:r>
+              <a:rPr lang="en-US" sz="1600" dirty="0">
+                <a:solidFill>
+                  <a:schemeClr val="tx1"/>
+                </a:solidFill>
+                <a:latin typeface="Consolas" panose="020B0609020204030204" pitchFamily="49" charset="0"/>
+                <a:cs typeface="Consolas" panose="020B0609020204030204" pitchFamily="49" charset="0"/>
+              </a:rPr>
+              <a:t>(launch::</a:t>
+            </a:r>
+            <a:r>
+              <a:rPr lang="en-US" sz="1600" dirty="0" err="1">
+                <a:solidFill>
+                  <a:schemeClr val="tx1"/>
+                </a:solidFill>
+                <a:latin typeface="Consolas" panose="020B0609020204030204" pitchFamily="49" charset="0"/>
+                <a:cs typeface="Consolas" panose="020B0609020204030204" pitchFamily="49" charset="0"/>
+              </a:rPr>
+              <a:t>async</a:t>
+            </a:r>
+            <a:r>
+              <a:rPr lang="en-US" sz="1600" dirty="0">
+                <a:solidFill>
+                  <a:schemeClr val="tx1"/>
+                </a:solidFill>
+                <a:latin typeface="Consolas" panose="020B0609020204030204" pitchFamily="49" charset="0"/>
+                <a:cs typeface="Consolas" panose="020B0609020204030204" pitchFamily="49" charset="0"/>
+              </a:rPr>
+              <a:t>, &amp;</a:t>
+            </a:r>
+            <a:r>
+              <a:rPr lang="en-US" sz="1600" dirty="0" err="1" smtClean="0">
+                <a:solidFill>
+                  <a:schemeClr val="tx1"/>
+                </a:solidFill>
+                <a:latin typeface="Consolas" panose="020B0609020204030204" pitchFamily="49" charset="0"/>
+                <a:cs typeface="Consolas" panose="020B0609020204030204" pitchFamily="49" charset="0"/>
+              </a:rPr>
+              <a:t>fibonacci</a:t>
+            </a:r>
+            <a:r>
+              <a:rPr lang="en-US" sz="1600" dirty="0" smtClean="0">
+                <a:solidFill>
+                  <a:schemeClr val="tx1"/>
+                </a:solidFill>
+                <a:latin typeface="Consolas" panose="020B0609020204030204" pitchFamily="49" charset="0"/>
+                <a:cs typeface="Consolas" panose="020B0609020204030204" pitchFamily="49" charset="0"/>
+              </a:rPr>
+              <a:t>, n-2</a:t>
+            </a:r>
+            <a:r>
+              <a:rPr lang="en-US" sz="1600" dirty="0" smtClean="0">
+                <a:solidFill>
+                  <a:schemeClr val="tx1"/>
+                </a:solidFill>
+                <a:latin typeface="Consolas" panose="020B0609020204030204" pitchFamily="49" charset="0"/>
+                <a:cs typeface="Consolas" panose="020B0609020204030204" pitchFamily="49" charset="0"/>
+              </a:rPr>
+              <a:t>); </a:t>
+            </a:r>
+            <a:endParaRPr lang="en-US" sz="1600" dirty="0" smtClean="0">
+              <a:solidFill>
+                <a:schemeClr val="tx1"/>
+              </a:solidFill>
+              <a:latin typeface="Consolas" panose="020B0609020204030204" pitchFamily="49" charset="0"/>
+              <a:cs typeface="Consolas" panose="020B0609020204030204" pitchFamily="49" charset="0"/>
+            </a:endParaRPr>
+          </a:p>
+          <a:p>
+            <a:pPr marL="685800" lvl="1" indent="0">
+              <a:spcBef>
+                <a:spcPts val="0"/>
+              </a:spcBef>
+              <a:buNone/>
+            </a:pPr>
+            <a:r>
+              <a:rPr lang="en-US" sz="1600" dirty="0" smtClean="0">
+                <a:solidFill>
+                  <a:schemeClr val="tx1"/>
+                </a:solidFill>
+                <a:latin typeface="Consolas" panose="020B0609020204030204" pitchFamily="49" charset="0"/>
+                <a:cs typeface="Consolas" panose="020B0609020204030204" pitchFamily="49" charset="0"/>
+              </a:rPr>
+              <a:t>    future&lt;uint64_t</a:t>
+            </a:r>
+            <a:r>
+              <a:rPr lang="en-US" sz="1600" dirty="0">
+                <a:solidFill>
+                  <a:schemeClr val="tx1"/>
+                </a:solidFill>
+                <a:latin typeface="Consolas" panose="020B0609020204030204" pitchFamily="49" charset="0"/>
+                <a:cs typeface="Consolas" panose="020B0609020204030204" pitchFamily="49" charset="0"/>
+              </a:rPr>
+              <a:t>&gt; r </a:t>
+            </a:r>
+            <a:r>
+              <a:rPr lang="en-US" sz="1600" dirty="0" smtClean="0">
+                <a:solidFill>
+                  <a:schemeClr val="tx1"/>
+                </a:solidFill>
+                <a:latin typeface="Consolas" panose="020B0609020204030204" pitchFamily="49" charset="0"/>
+                <a:cs typeface="Consolas" panose="020B0609020204030204" pitchFamily="49" charset="0"/>
+              </a:rPr>
+              <a:t>= </a:t>
+            </a:r>
+            <a:r>
+              <a:rPr lang="en-US" sz="1600" dirty="0" err="1" smtClean="0">
+                <a:solidFill>
+                  <a:schemeClr val="tx1"/>
+                </a:solidFill>
+                <a:latin typeface="Consolas" panose="020B0609020204030204" pitchFamily="49" charset="0"/>
+                <a:cs typeface="Consolas" panose="020B0609020204030204" pitchFamily="49" charset="0"/>
+              </a:rPr>
+              <a:t>fibonacci</a:t>
+            </a:r>
+            <a:r>
+              <a:rPr lang="en-US" sz="1600" dirty="0" smtClean="0">
+                <a:solidFill>
+                  <a:schemeClr val="tx1"/>
+                </a:solidFill>
+                <a:latin typeface="Consolas" panose="020B0609020204030204" pitchFamily="49" charset="0"/>
+                <a:cs typeface="Consolas" panose="020B0609020204030204" pitchFamily="49" charset="0"/>
+              </a:rPr>
+              <a:t>(n-1);</a:t>
+            </a:r>
+          </a:p>
+          <a:p>
+            <a:pPr marL="685800" lvl="1" indent="0">
+              <a:spcBef>
+                <a:spcPts val="0"/>
+              </a:spcBef>
+              <a:buNone/>
+            </a:pPr>
+            <a:endParaRPr lang="en-US" sz="1600" dirty="0" smtClean="0">
+              <a:solidFill>
+                <a:schemeClr val="tx1"/>
+              </a:solidFill>
+              <a:latin typeface="Consolas" panose="020B0609020204030204" pitchFamily="49" charset="0"/>
+              <a:cs typeface="Consolas" panose="020B0609020204030204" pitchFamily="49" charset="0"/>
+            </a:endParaRPr>
+          </a:p>
+          <a:p>
+            <a:pPr lvl="1" indent="0">
+              <a:spcBef>
+                <a:spcPts val="0"/>
+              </a:spcBef>
+              <a:buNone/>
+            </a:pPr>
+            <a:r>
+              <a:rPr lang="en-US" sz="1600" dirty="0" smtClean="0">
+                <a:solidFill>
+                  <a:schemeClr val="tx1"/>
+                </a:solidFill>
+                <a:latin typeface="Consolas" panose="020B0609020204030204" pitchFamily="49" charset="0"/>
+                <a:cs typeface="Consolas" panose="020B0609020204030204" pitchFamily="49" charset="0"/>
+              </a:rPr>
+              <a:t>       return </a:t>
+            </a:r>
+            <a:r>
+              <a:rPr lang="en-US" sz="1600" dirty="0" err="1" smtClean="0">
+                <a:solidFill>
+                  <a:schemeClr val="tx1"/>
+                </a:solidFill>
+                <a:latin typeface="Consolas" panose="020B0609020204030204" pitchFamily="49" charset="0"/>
+                <a:cs typeface="Consolas" panose="020B0609020204030204" pitchFamily="49" charset="0"/>
+              </a:rPr>
+              <a:t>when_all</a:t>
+            </a:r>
+            <a:r>
+              <a:rPr lang="en-US" sz="1600" dirty="0" smtClean="0">
+                <a:solidFill>
+                  <a:schemeClr val="tx1"/>
+                </a:solidFill>
+                <a:latin typeface="Consolas" panose="020B0609020204030204" pitchFamily="49" charset="0"/>
+                <a:cs typeface="Consolas" panose="020B0609020204030204" pitchFamily="49" charset="0"/>
+              </a:rPr>
+              <a:t>(f, r)</a:t>
+            </a:r>
+          </a:p>
+          <a:p>
+            <a:pPr lvl="1" indent="0">
+              <a:spcBef>
+                <a:spcPts val="0"/>
+              </a:spcBef>
+              <a:buNone/>
+            </a:pPr>
+            <a:r>
+              <a:rPr lang="en-US" sz="1600" dirty="0">
+                <a:solidFill>
+                  <a:schemeClr val="tx1"/>
+                </a:solidFill>
+                <a:latin typeface="Consolas" panose="020B0609020204030204" pitchFamily="49" charset="0"/>
+                <a:cs typeface="Consolas" panose="020B0609020204030204" pitchFamily="49" charset="0"/>
+              </a:rPr>
+              <a:t> </a:t>
+            </a:r>
+            <a:r>
+              <a:rPr lang="en-US" sz="1600" dirty="0" smtClean="0">
+                <a:solidFill>
+                  <a:schemeClr val="tx1"/>
+                </a:solidFill>
+                <a:latin typeface="Consolas" panose="020B0609020204030204" pitchFamily="49" charset="0"/>
+                <a:cs typeface="Consolas" panose="020B0609020204030204" pitchFamily="49" charset="0"/>
+              </a:rPr>
+              <a:t>          </a:t>
+            </a:r>
+            <a:r>
+              <a:rPr lang="en-US" sz="1600" dirty="0" smtClean="0">
+                <a:solidFill>
+                  <a:schemeClr val="tx1"/>
+                </a:solidFill>
+                <a:latin typeface="Consolas" panose="020B0609020204030204" pitchFamily="49" charset="0"/>
+                <a:cs typeface="Consolas" panose="020B0609020204030204" pitchFamily="49" charset="0"/>
+              </a:rPr>
+              <a:t>.then(</a:t>
+            </a:r>
+            <a:endParaRPr lang="en-US" sz="1600" dirty="0">
+              <a:solidFill>
+                <a:schemeClr val="tx1"/>
+              </a:solidFill>
+              <a:latin typeface="Consolas" panose="020B0609020204030204" pitchFamily="49" charset="0"/>
+              <a:cs typeface="Consolas" panose="020B0609020204030204" pitchFamily="49" charset="0"/>
+            </a:endParaRPr>
+          </a:p>
+          <a:p>
+            <a:pPr lvl="1" indent="0">
+              <a:spcBef>
+                <a:spcPts val="0"/>
+              </a:spcBef>
+              <a:buNone/>
+            </a:pPr>
+            <a:r>
+              <a:rPr lang="en-US" sz="1600" dirty="0" smtClean="0">
+                <a:solidFill>
+                  <a:srgbClr val="C00000"/>
+                </a:solidFill>
+                <a:latin typeface="Consolas" panose="020B0609020204030204" pitchFamily="49" charset="0"/>
+                <a:cs typeface="Consolas" panose="020B0609020204030204" pitchFamily="49" charset="0"/>
+              </a:rPr>
+              <a:t>           </a:t>
+            </a:r>
+            <a:r>
+              <a:rPr lang="en-US" sz="1600" dirty="0" smtClean="0">
+                <a:solidFill>
+                  <a:srgbClr val="C00000"/>
+                </a:solidFill>
+                <a:latin typeface="Consolas" panose="020B0609020204030204" pitchFamily="49" charset="0"/>
+                <a:cs typeface="Consolas" panose="020B0609020204030204" pitchFamily="49" charset="0"/>
+              </a:rPr>
+              <a:t>    </a:t>
+            </a:r>
+            <a:r>
+              <a:rPr lang="en-US" sz="1600" dirty="0" smtClean="0">
+                <a:solidFill>
+                  <a:schemeClr val="tx1"/>
+                </a:solidFill>
+                <a:latin typeface="Consolas" panose="020B0609020204030204" pitchFamily="49" charset="0"/>
+                <a:cs typeface="Consolas" panose="020B0609020204030204" pitchFamily="49" charset="0"/>
+              </a:rPr>
+              <a:t>[](tuple&lt;future&lt;uint64_t&gt;, </a:t>
+            </a:r>
+            <a:r>
+              <a:rPr lang="en-US" sz="1600" dirty="0" smtClean="0">
+                <a:solidFill>
+                  <a:schemeClr val="tx1"/>
+                </a:solidFill>
+                <a:latin typeface="Consolas" panose="020B0609020204030204" pitchFamily="49" charset="0"/>
+                <a:cs typeface="Consolas" panose="020B0609020204030204" pitchFamily="49" charset="0"/>
+              </a:rPr>
+              <a:t>future&lt;uint64_t</a:t>
+            </a:r>
+            <a:r>
+              <a:rPr lang="en-US" sz="1600" dirty="0" smtClean="0">
+                <a:solidFill>
+                  <a:schemeClr val="tx1"/>
+                </a:solidFill>
+                <a:latin typeface="Consolas" panose="020B0609020204030204" pitchFamily="49" charset="0"/>
+                <a:cs typeface="Consolas" panose="020B0609020204030204" pitchFamily="49" charset="0"/>
+              </a:rPr>
+              <a:t>&gt;&gt; t) </a:t>
+            </a:r>
+            <a:r>
+              <a:rPr lang="en-US" sz="1600" dirty="0" smtClean="0">
+                <a:solidFill>
+                  <a:schemeClr val="tx1"/>
+                </a:solidFill>
+                <a:latin typeface="Consolas" panose="020B0609020204030204" pitchFamily="49" charset="0"/>
+                <a:cs typeface="Consolas" panose="020B0609020204030204" pitchFamily="49" charset="0"/>
+              </a:rPr>
+              <a:t>{</a:t>
+            </a:r>
+          </a:p>
+          <a:p>
+            <a:pPr lvl="1" indent="0">
+              <a:spcBef>
+                <a:spcPts val="0"/>
+              </a:spcBef>
+              <a:buNone/>
+            </a:pPr>
+            <a:r>
+              <a:rPr lang="en-US" sz="1600" dirty="0" smtClean="0">
+                <a:solidFill>
+                  <a:schemeClr val="tx1"/>
+                </a:solidFill>
+                <a:latin typeface="Consolas" panose="020B0609020204030204" pitchFamily="49" charset="0"/>
+                <a:cs typeface="Consolas" panose="020B0609020204030204" pitchFamily="49" charset="0"/>
+              </a:rPr>
+              <a:t>               </a:t>
+            </a:r>
+            <a:r>
+              <a:rPr lang="en-US" sz="1600" dirty="0" smtClean="0">
+                <a:solidFill>
+                  <a:schemeClr val="tx1"/>
+                </a:solidFill>
+                <a:latin typeface="Consolas" panose="020B0609020204030204" pitchFamily="49" charset="0"/>
+                <a:cs typeface="Consolas" panose="020B0609020204030204" pitchFamily="49" charset="0"/>
+              </a:rPr>
+              <a:t>    </a:t>
+            </a:r>
+            <a:r>
+              <a:rPr lang="en-US" sz="1600" dirty="0" smtClean="0">
+                <a:solidFill>
+                  <a:schemeClr val="tx1"/>
+                </a:solidFill>
+                <a:latin typeface="Consolas" panose="020B0609020204030204" pitchFamily="49" charset="0"/>
+                <a:cs typeface="Consolas" panose="020B0609020204030204" pitchFamily="49" charset="0"/>
+              </a:rPr>
+              <a:t>return </a:t>
+            </a:r>
+            <a:r>
+              <a:rPr lang="en-US" sz="1600" dirty="0" smtClean="0">
+                <a:solidFill>
+                  <a:schemeClr val="tx1"/>
+                </a:solidFill>
+                <a:latin typeface="Consolas" panose="020B0609020204030204" pitchFamily="49" charset="0"/>
+                <a:cs typeface="Consolas" panose="020B0609020204030204" pitchFamily="49" charset="0"/>
+              </a:rPr>
+              <a:t>get&lt;0&gt;(t).get</a:t>
+            </a:r>
+            <a:r>
+              <a:rPr lang="en-US" sz="1600" dirty="0" smtClean="0">
+                <a:solidFill>
+                  <a:schemeClr val="tx1"/>
+                </a:solidFill>
+                <a:latin typeface="Consolas" panose="020B0609020204030204" pitchFamily="49" charset="0"/>
+                <a:cs typeface="Consolas" panose="020B0609020204030204" pitchFamily="49" charset="0"/>
+              </a:rPr>
+              <a:t>() + </a:t>
+            </a:r>
+            <a:r>
+              <a:rPr lang="en-US" sz="1600" dirty="0" smtClean="0">
+                <a:solidFill>
+                  <a:schemeClr val="tx1"/>
+                </a:solidFill>
+                <a:latin typeface="Consolas" panose="020B0609020204030204" pitchFamily="49" charset="0"/>
+                <a:cs typeface="Consolas" panose="020B0609020204030204" pitchFamily="49" charset="0"/>
+              </a:rPr>
+              <a:t>get&lt;1&gt;(</a:t>
+            </a:r>
+            <a:r>
+              <a:rPr lang="en-US" sz="1600" dirty="0">
+                <a:solidFill>
+                  <a:schemeClr val="tx1"/>
+                </a:solidFill>
+                <a:latin typeface="Consolas" panose="020B0609020204030204" pitchFamily="49" charset="0"/>
+                <a:cs typeface="Consolas" panose="020B0609020204030204" pitchFamily="49" charset="0"/>
+              </a:rPr>
+              <a:t>t).get</a:t>
+            </a:r>
+            <a:r>
+              <a:rPr lang="en-US" sz="1600" dirty="0" smtClean="0">
+                <a:solidFill>
+                  <a:schemeClr val="tx1"/>
+                </a:solidFill>
+                <a:latin typeface="Consolas" panose="020B0609020204030204" pitchFamily="49" charset="0"/>
+                <a:cs typeface="Consolas" panose="020B0609020204030204" pitchFamily="49" charset="0"/>
+              </a:rPr>
+              <a:t>();</a:t>
+            </a:r>
+          </a:p>
+          <a:p>
+            <a:pPr lvl="1" indent="0">
+              <a:spcBef>
+                <a:spcPts val="0"/>
+              </a:spcBef>
+              <a:buNone/>
+            </a:pPr>
+            <a:r>
+              <a:rPr lang="en-US" sz="1600" dirty="0" smtClean="0">
+                <a:solidFill>
+                  <a:schemeClr val="tx1"/>
+                </a:solidFill>
+                <a:latin typeface="Consolas" panose="020B0609020204030204" pitchFamily="49" charset="0"/>
+                <a:cs typeface="Consolas" panose="020B0609020204030204" pitchFamily="49" charset="0"/>
+              </a:rPr>
+              <a:t>           </a:t>
+            </a:r>
+            <a:r>
+              <a:rPr lang="en-US" sz="1600" dirty="0" smtClean="0">
+                <a:solidFill>
+                  <a:schemeClr val="tx1"/>
+                </a:solidFill>
+                <a:latin typeface="Consolas" panose="020B0609020204030204" pitchFamily="49" charset="0"/>
+                <a:cs typeface="Consolas" panose="020B0609020204030204" pitchFamily="49" charset="0"/>
+              </a:rPr>
+              <a:t>    });</a:t>
+            </a:r>
+            <a:endParaRPr lang="en-US" sz="1600" dirty="0">
+              <a:solidFill>
+                <a:schemeClr val="tx1"/>
+              </a:solidFill>
+              <a:latin typeface="Consolas" panose="020B0609020204030204" pitchFamily="49" charset="0"/>
+              <a:cs typeface="Consolas" panose="020B0609020204030204" pitchFamily="49" charset="0"/>
+            </a:endParaRPr>
+          </a:p>
+          <a:p>
+            <a:pPr lvl="1" indent="0">
+              <a:spcBef>
+                <a:spcPts val="0"/>
+              </a:spcBef>
+              <a:buNone/>
+            </a:pPr>
+            <a:r>
+              <a:rPr lang="en-US" sz="1600" dirty="0" smtClean="0">
+                <a:latin typeface="Consolas" panose="020B0609020204030204" pitchFamily="49" charset="0"/>
+                <a:cs typeface="Consolas" panose="020B0609020204030204" pitchFamily="49" charset="0"/>
+              </a:rPr>
+              <a:t>   }</a:t>
+            </a:r>
+            <a:endParaRPr lang="en-US" sz="1600" dirty="0">
+              <a:latin typeface="Consolas" panose="020B0609020204030204" pitchFamily="49" charset="0"/>
+              <a:cs typeface="Consolas" panose="020B0609020204030204" pitchFamily="49" charset="0"/>
+            </a:endParaRPr>
+          </a:p>
+        </p:txBody>
+      </p:sp>
+    </p:spTree>
+    <p:extLst>
+      <p:ext uri="{BB962C8B-B14F-4D97-AF65-F5344CB8AC3E}">
+        <p14:creationId xmlns:p14="http://schemas.microsoft.com/office/powerpoint/2010/main" val="800879825"/>
+      </p:ext>
+    </p:extLst>
+  </p:cSld>
+  <p:clrMapOvr>
+    <a:masterClrMapping/>
+  </p:clrMapOvr>
+  <mc:AlternateContent xmlns:mc="http://schemas.openxmlformats.org/markup-compatibility/2006" xmlns:p14="http://schemas.microsoft.com/office/powerpoint/2010/main">
+    <mc:Choice Requires="p14">
+      <p:transition p14:dur="0"/>
+    </mc:Choice>
+    <mc:Fallback xmlns="">
+      <p:transition/>
+    </mc:Fallback>
+  </mc:AlternateContent>
+  <p:timing>
+    <p:tnLst>
+      <p:par>
+        <p:cTn id="1" dur="indefinite" restart="never" nodeType="tmRoot"/>
+      </p:par>
+    </p:tnLst>
+  </p:timing>
+</p:sld>
+</file>
+
+<file path=ppt/slides/slide22.xml><?xml version="1.0" encoding="utf-8"?>
+<p:sld xmlns:a="http://schemas.openxmlformats.org/drawingml/2006/main" xmlns:r="http://schemas.openxmlformats.org/officeDocument/2006/relationships" xmlns:p="http://schemas.openxmlformats.org/presentationml/2006/main">
+  <p:cSld>
+    <p:spTree>
+      <p:nvGrpSpPr>
+        <p:cNvPr id="1" name=""/>
+        <p:cNvGrpSpPr/>
+        <p:nvPr/>
+      </p:nvGrpSpPr>
+      <p:grpSpPr>
+        <a:xfrm>
+          <a:off x="0" y="0"/>
+          <a:ext cx="0" cy="0"/>
+          <a:chOff x="0" y="0"/>
+          <a:chExt cx="0" cy="0"/>
+        </a:xfrm>
+      </p:grpSpPr>
+      <p:sp>
+        <p:nvSpPr>
           <p:cNvPr id="9" name="Rectangle 8"/>
           <p:cNvSpPr/>
           <p:nvPr/>
@@ -22390,7 +23332,7 @@
           <a:p>
             <a:fld id="{E21D6AF4-B5A0-4A07-BEF4-28FAD635375F}" type="slidenum">
               <a:rPr lang="en-US" smtClean="0"/>
-              <a:t>21</a:t>
+              <a:t>22</a:t>
             </a:fld>
             <a:endParaRPr lang="en-US"/>
           </a:p>
@@ -22908,21 +23850,11 @@
                 <a:latin typeface="Consolas" panose="020B0609020204030204" pitchFamily="49" charset="0"/>
                 <a:cs typeface="Consolas" panose="020B0609020204030204" pitchFamily="49" charset="0"/>
               </a:rPr>
-              <a:t>launch</a:t>
+              <a:t>launch::sync</a:t>
             </a:r>
             <a:r>
               <a:rPr lang="en-US" sz="1600" dirty="0">
                 <a:solidFill>
-                  <a:srgbClr val="C00000"/>
-                </a:solidFill>
-                <a:latin typeface="Consolas" panose="020B0609020204030204" pitchFamily="49" charset="0"/>
-                <a:cs typeface="Consolas" panose="020B0609020204030204" pitchFamily="49" charset="0"/>
-              </a:rPr>
-              <a:t>::sync</a:t>
-            </a:r>
-            <a:r>
-              <a:rPr lang="en-US" sz="1600" dirty="0">
-                <a:solidFill>
                   <a:schemeClr val="tx1"/>
                 </a:solidFill>
                 <a:latin typeface="Consolas" panose="020B0609020204030204" pitchFamily="49" charset="0"/>
@@ -22930,13 +23862,6 @@
               </a:rPr>
               <a:t>, </a:t>
             </a:r>
-            <a:endParaRPr lang="en-US" sz="1600" dirty="0">
-              <a:solidFill>
-                <a:schemeClr val="tx1"/>
-              </a:solidFill>
-              <a:latin typeface="Consolas" panose="020B0609020204030204" pitchFamily="49" charset="0"/>
-              <a:cs typeface="Consolas" panose="020B0609020204030204" pitchFamily="49" charset="0"/>
-            </a:endParaRPr>
           </a:p>
           <a:p>
             <a:pPr lvl="1" indent="0">
@@ -23232,248 +24157,6 @@
 </p:sld>
 </file>
 
-<file path=ppt/slides/slide22.xml><?xml version="1.0" encoding="utf-8"?>
-<p:sld xmlns:a="http://schemas.openxmlformats.org/drawingml/2006/main" xmlns:r="http://schemas.openxmlformats.org/officeDocument/2006/relationships" xmlns:p="http://schemas.openxmlformats.org/presentationml/2006/main">
-  <p:cSld>
-    <p:spTree>
-      <p:nvGrpSpPr>
-        <p:cNvPr id="1" name=""/>
-        <p:cNvGrpSpPr/>
-        <p:nvPr/>
-      </p:nvGrpSpPr>
-      <p:grpSpPr>
-        <a:xfrm>
-          <a:off x="0" y="0"/>
-          <a:ext cx="0" cy="0"/>
-          <a:chOff x="0" y="0"/>
-          <a:chExt cx="0" cy="0"/>
-        </a:xfrm>
-      </p:grpSpPr>
-      <p:sp>
-        <p:nvSpPr>
-          <p:cNvPr id="2" name="Title 1"/>
-          <p:cNvSpPr>
-            <a:spLocks noGrp="1"/>
-          </p:cNvSpPr>
-          <p:nvPr>
-            <p:ph type="title"/>
-          </p:nvPr>
-        </p:nvSpPr>
-        <p:spPr/>
-        <p:txBody>
-          <a:bodyPr/>
-          <a:lstStyle/>
-          <a:p>
-            <a:r>
-              <a:rPr lang="en-US" dirty="0" smtClean="0"/>
-              <a:t>Fibonacci with Futures</a:t>
-            </a:r>
-            <a:endParaRPr lang="en-US" dirty="0"/>
-          </a:p>
-        </p:txBody>
-      </p:sp>
-      <p:sp>
-        <p:nvSpPr>
-          <p:cNvPr id="3" name="Content Placeholder 2"/>
-          <p:cNvSpPr>
-            <a:spLocks noGrp="1"/>
-          </p:cNvSpPr>
-          <p:nvPr>
-            <p:ph idx="1"/>
-          </p:nvPr>
-        </p:nvSpPr>
-        <p:spPr>
-          <a:xfrm>
-            <a:off x="1261872" y="1828800"/>
-            <a:ext cx="9692640" cy="4351337"/>
-          </a:xfrm>
-        </p:spPr>
-        <p:txBody>
-          <a:bodyPr/>
-          <a:lstStyle/>
-          <a:p>
-            <a:r>
-              <a:rPr lang="en-US" dirty="0" smtClean="0"/>
-              <a:t>For </a:t>
-            </a:r>
-            <a:r>
-              <a:rPr lang="en-US" dirty="0"/>
-              <a:t>full sources see: </a:t>
-            </a:r>
-            <a:r>
-              <a:rPr lang="en-US" dirty="0">
-                <a:hlinkClick r:id="rId2"/>
-              </a:rPr>
-              <a:t>https://</a:t>
-            </a:r>
-            <a:r>
-              <a:rPr lang="en-US" dirty="0" smtClean="0">
-                <a:hlinkClick r:id="rId2"/>
-              </a:rPr>
-              <a:t>github.com/STEllAR-GROUP/tutorials/blob/master/examples/03_fibonacci/fibonacci_futures.cpp</a:t>
-            </a:r>
-            <a:endParaRPr lang="en-US" dirty="0" smtClean="0"/>
-          </a:p>
-          <a:p>
-            <a:endParaRPr lang="en-US" dirty="0"/>
-          </a:p>
-          <a:p>
-            <a:r>
-              <a:rPr lang="en-US" dirty="0" smtClean="0"/>
-              <a:t>When running try using command line options:</a:t>
-            </a:r>
-            <a:br>
-              <a:rPr lang="en-US" dirty="0" smtClean="0"/>
-            </a:br>
-            <a:r>
-              <a:rPr lang="en-US" dirty="0" smtClean="0"/>
-              <a:t> </a:t>
-            </a:r>
-            <a:br>
-              <a:rPr lang="en-US" dirty="0" smtClean="0"/>
-            </a:br>
-            <a:r>
-              <a:rPr lang="en-US" dirty="0" smtClean="0"/>
-              <a:t>	</a:t>
-            </a:r>
-            <a:r>
-              <a:rPr lang="en-US" dirty="0" smtClean="0">
-                <a:latin typeface="Consolas" panose="020B0609020204030204" pitchFamily="49" charset="0"/>
-                <a:cs typeface="Consolas" panose="020B0609020204030204" pitchFamily="49" charset="0"/>
-              </a:rPr>
-              <a:t>--</a:t>
-            </a:r>
-            <a:r>
-              <a:rPr lang="en-US" dirty="0" err="1" smtClean="0">
-                <a:latin typeface="Consolas" panose="020B0609020204030204" pitchFamily="49" charset="0"/>
-                <a:cs typeface="Consolas" panose="020B0609020204030204" pitchFamily="49" charset="0"/>
-              </a:rPr>
-              <a:t>hpx:print-counter</a:t>
-            </a:r>
-            <a:r>
-              <a:rPr lang="en-US" dirty="0">
-                <a:latin typeface="Consolas" panose="020B0609020204030204" pitchFamily="49" charset="0"/>
-                <a:cs typeface="Consolas" panose="020B0609020204030204" pitchFamily="49" charset="0"/>
-              </a:rPr>
-              <a:t>=/threads/count/cumulative </a:t>
-            </a:r>
-            <a:br>
-              <a:rPr lang="en-US" dirty="0">
-                <a:latin typeface="Consolas" panose="020B0609020204030204" pitchFamily="49" charset="0"/>
-                <a:cs typeface="Consolas" panose="020B0609020204030204" pitchFamily="49" charset="0"/>
-              </a:rPr>
-            </a:br>
-            <a:r>
-              <a:rPr lang="en-US" dirty="0" smtClean="0">
-                <a:latin typeface="Consolas" panose="020B0609020204030204" pitchFamily="49" charset="0"/>
-                <a:cs typeface="Consolas" panose="020B0609020204030204" pitchFamily="49" charset="0"/>
-              </a:rPr>
-              <a:t>	--</a:t>
-            </a:r>
-            <a:r>
-              <a:rPr lang="en-US" dirty="0" err="1" smtClean="0">
-                <a:latin typeface="Consolas" panose="020B0609020204030204" pitchFamily="49" charset="0"/>
-                <a:cs typeface="Consolas" panose="020B0609020204030204" pitchFamily="49" charset="0"/>
-              </a:rPr>
-              <a:t>hpx:threads</a:t>
-            </a:r>
-            <a:r>
-              <a:rPr lang="en-US" dirty="0" smtClean="0">
-                <a:latin typeface="Consolas" panose="020B0609020204030204" pitchFamily="49" charset="0"/>
-                <a:cs typeface="Consolas" panose="020B0609020204030204" pitchFamily="49" charset="0"/>
-              </a:rPr>
-              <a:t>=N (N number of cores to use)</a:t>
-            </a:r>
-          </a:p>
-          <a:p>
-            <a:endParaRPr lang="en-US" dirty="0"/>
-          </a:p>
-        </p:txBody>
-      </p:sp>
-      <p:sp>
-        <p:nvSpPr>
-          <p:cNvPr id="4" name="Date Placeholder 3"/>
-          <p:cNvSpPr>
-            <a:spLocks noGrp="1"/>
-          </p:cNvSpPr>
-          <p:nvPr>
-            <p:ph type="dt" sz="half" idx="10"/>
-          </p:nvPr>
-        </p:nvSpPr>
-        <p:spPr/>
-        <p:txBody>
-          <a:bodyPr/>
-          <a:lstStyle/>
-          <a:p>
-            <a:r>
-              <a:rPr lang="en-US" smtClean="0"/>
-              <a:t>10/18/2016</a:t>
-            </a:r>
-            <a:endParaRPr lang="en-US"/>
-          </a:p>
-        </p:txBody>
-      </p:sp>
-      <p:sp>
-        <p:nvSpPr>
-          <p:cNvPr id="5" name="Footer Placeholder 4"/>
-          <p:cNvSpPr>
-            <a:spLocks noGrp="1"/>
-          </p:cNvSpPr>
-          <p:nvPr>
-            <p:ph type="ftr" sz="quarter" idx="11"/>
-          </p:nvPr>
-        </p:nvSpPr>
-        <p:spPr/>
-        <p:txBody>
-          <a:bodyPr/>
-          <a:lstStyle/>
-          <a:p>
-            <a:r>
-              <a:rPr lang="en-US" smtClean="0"/>
-              <a:t>HPX Workshop (Berkeley C++ Summit) - 3,            Hartmut Kaiser (hkaiser@cct.lsu.edu)</a:t>
-            </a:r>
-            <a:endParaRPr lang="en-US"/>
-          </a:p>
-        </p:txBody>
-      </p:sp>
-      <p:sp>
-        <p:nvSpPr>
-          <p:cNvPr id="6" name="Slide Number Placeholder 5"/>
-          <p:cNvSpPr>
-            <a:spLocks noGrp="1"/>
-          </p:cNvSpPr>
-          <p:nvPr>
-            <p:ph type="sldNum" sz="quarter" idx="12"/>
-          </p:nvPr>
-        </p:nvSpPr>
-        <p:spPr/>
-        <p:txBody>
-          <a:bodyPr>
-            <a:normAutofit lnSpcReduction="10000"/>
-          </a:bodyPr>
-          <a:lstStyle/>
-          <a:p>
-            <a:fld id="{B102E578-8C1A-4150-8490-48A08D76AC22}" type="slidenum">
-              <a:rPr lang="en-US" smtClean="0"/>
-              <a:t>22</a:t>
-            </a:fld>
-            <a:endParaRPr lang="en-US"/>
-          </a:p>
-        </p:txBody>
-      </p:sp>
-    </p:spTree>
-    <p:extLst>
-      <p:ext uri="{BB962C8B-B14F-4D97-AF65-F5344CB8AC3E}">
-        <p14:creationId xmlns:p14="http://schemas.microsoft.com/office/powerpoint/2010/main" val="2542141721"/>
-      </p:ext>
-    </p:extLst>
-  </p:cSld>
-  <p:clrMapOvr>
-    <a:masterClrMapping/>
-  </p:clrMapOvr>
-</p:sld>
-</file>
-
 <file path=ppt/slides/slide23.xml><?xml version="1.0" encoding="utf-8"?>
 <p:sld xmlns:a="http://schemas.openxmlformats.org/drawingml/2006/main" xmlns:r="http://schemas.openxmlformats.org/officeDocument/2006/relationships" xmlns:p="http://schemas.openxmlformats.org/presentationml/2006/main">
   <p:cSld>
@@ -23508,6 +24191,248 @@
           <a:p>
             <a:r>
               <a:rPr lang="en-US" dirty="0" smtClean="0"/>
+              <a:t>Fibonacci with Futures</a:t>
+            </a:r>
+            <a:endParaRPr lang="en-US" dirty="0"/>
+          </a:p>
+        </p:txBody>
+      </p:sp>
+      <p:sp>
+        <p:nvSpPr>
+          <p:cNvPr id="3" name="Content Placeholder 2"/>
+          <p:cNvSpPr>
+            <a:spLocks noGrp="1"/>
+          </p:cNvSpPr>
+          <p:nvPr>
+            <p:ph idx="1"/>
+          </p:nvPr>
+        </p:nvSpPr>
+        <p:spPr>
+          <a:xfrm>
+            <a:off x="1261872" y="1828800"/>
+            <a:ext cx="9692640" cy="4351337"/>
+          </a:xfrm>
+        </p:spPr>
+        <p:txBody>
+          <a:bodyPr/>
+          <a:lstStyle/>
+          <a:p>
+            <a:r>
+              <a:rPr lang="en-US" dirty="0" smtClean="0"/>
+              <a:t>For </a:t>
+            </a:r>
+            <a:r>
+              <a:rPr lang="en-US" dirty="0"/>
+              <a:t>full sources see: </a:t>
+            </a:r>
+            <a:r>
+              <a:rPr lang="en-US" dirty="0">
+                <a:hlinkClick r:id="rId2"/>
+              </a:rPr>
+              <a:t>https://</a:t>
+            </a:r>
+            <a:r>
+              <a:rPr lang="en-US" dirty="0" smtClean="0">
+                <a:hlinkClick r:id="rId2"/>
+              </a:rPr>
+              <a:t>github.com/STEllAR-GROUP/tutorials/blob/master/examples/03_fibonacci/fibonacci_futures.cpp</a:t>
+            </a:r>
+            <a:endParaRPr lang="en-US" dirty="0" smtClean="0"/>
+          </a:p>
+          <a:p>
+            <a:endParaRPr lang="en-US" dirty="0"/>
+          </a:p>
+          <a:p>
+            <a:r>
+              <a:rPr lang="en-US" dirty="0" smtClean="0"/>
+              <a:t>When running try using command line options:</a:t>
+            </a:r>
+            <a:br>
+              <a:rPr lang="en-US" dirty="0" smtClean="0"/>
+            </a:br>
+            <a:r>
+              <a:rPr lang="en-US" dirty="0" smtClean="0"/>
+              <a:t> </a:t>
+            </a:r>
+            <a:br>
+              <a:rPr lang="en-US" dirty="0" smtClean="0"/>
+            </a:br>
+            <a:r>
+              <a:rPr lang="en-US" dirty="0" smtClean="0"/>
+              <a:t>	</a:t>
+            </a:r>
+            <a:r>
+              <a:rPr lang="en-US" dirty="0" smtClean="0">
+                <a:latin typeface="Consolas" panose="020B0609020204030204" pitchFamily="49" charset="0"/>
+                <a:cs typeface="Consolas" panose="020B0609020204030204" pitchFamily="49" charset="0"/>
+              </a:rPr>
+              <a:t>--</a:t>
+            </a:r>
+            <a:r>
+              <a:rPr lang="en-US" dirty="0" err="1" smtClean="0">
+                <a:latin typeface="Consolas" panose="020B0609020204030204" pitchFamily="49" charset="0"/>
+                <a:cs typeface="Consolas" panose="020B0609020204030204" pitchFamily="49" charset="0"/>
+              </a:rPr>
+              <a:t>hpx:print-counter</a:t>
+            </a:r>
+            <a:r>
+              <a:rPr lang="en-US" dirty="0">
+                <a:latin typeface="Consolas" panose="020B0609020204030204" pitchFamily="49" charset="0"/>
+                <a:cs typeface="Consolas" panose="020B0609020204030204" pitchFamily="49" charset="0"/>
+              </a:rPr>
+              <a:t>=/threads/count/cumulative </a:t>
+            </a:r>
+            <a:br>
+              <a:rPr lang="en-US" dirty="0">
+                <a:latin typeface="Consolas" panose="020B0609020204030204" pitchFamily="49" charset="0"/>
+                <a:cs typeface="Consolas" panose="020B0609020204030204" pitchFamily="49" charset="0"/>
+              </a:rPr>
+            </a:br>
+            <a:r>
+              <a:rPr lang="en-US" dirty="0" smtClean="0">
+                <a:latin typeface="Consolas" panose="020B0609020204030204" pitchFamily="49" charset="0"/>
+                <a:cs typeface="Consolas" panose="020B0609020204030204" pitchFamily="49" charset="0"/>
+              </a:rPr>
+              <a:t>	--</a:t>
+            </a:r>
+            <a:r>
+              <a:rPr lang="en-US" dirty="0" err="1" smtClean="0">
+                <a:latin typeface="Consolas" panose="020B0609020204030204" pitchFamily="49" charset="0"/>
+                <a:cs typeface="Consolas" panose="020B0609020204030204" pitchFamily="49" charset="0"/>
+              </a:rPr>
+              <a:t>hpx:threads</a:t>
+            </a:r>
+            <a:r>
+              <a:rPr lang="en-US" dirty="0" smtClean="0">
+                <a:latin typeface="Consolas" panose="020B0609020204030204" pitchFamily="49" charset="0"/>
+                <a:cs typeface="Consolas" panose="020B0609020204030204" pitchFamily="49" charset="0"/>
+              </a:rPr>
+              <a:t>=N (N number of cores to use)</a:t>
+            </a:r>
+          </a:p>
+          <a:p>
+            <a:endParaRPr lang="en-US" dirty="0"/>
+          </a:p>
+        </p:txBody>
+      </p:sp>
+      <p:sp>
+        <p:nvSpPr>
+          <p:cNvPr id="4" name="Date Placeholder 3"/>
+          <p:cNvSpPr>
+            <a:spLocks noGrp="1"/>
+          </p:cNvSpPr>
+          <p:nvPr>
+            <p:ph type="dt" sz="half" idx="10"/>
+          </p:nvPr>
+        </p:nvSpPr>
+        <p:spPr/>
+        <p:txBody>
+          <a:bodyPr/>
+          <a:lstStyle/>
+          <a:p>
+            <a:r>
+              <a:rPr lang="en-US" smtClean="0"/>
+              <a:t>10/18/2016</a:t>
+            </a:r>
+            <a:endParaRPr lang="en-US"/>
+          </a:p>
+        </p:txBody>
+      </p:sp>
+      <p:sp>
+        <p:nvSpPr>
+          <p:cNvPr id="5" name="Footer Placeholder 4"/>
+          <p:cNvSpPr>
+            <a:spLocks noGrp="1"/>
+          </p:cNvSpPr>
+          <p:nvPr>
+            <p:ph type="ftr" sz="quarter" idx="11"/>
+          </p:nvPr>
+        </p:nvSpPr>
+        <p:spPr/>
+        <p:txBody>
+          <a:bodyPr/>
+          <a:lstStyle/>
+          <a:p>
+            <a:r>
+              <a:rPr lang="en-US" smtClean="0"/>
+              <a:t>HPX Workshop (Berkeley C++ Summit) - 3,            Hartmut Kaiser (hkaiser@cct.lsu.edu)</a:t>
+            </a:r>
+            <a:endParaRPr lang="en-US"/>
+          </a:p>
+        </p:txBody>
+      </p:sp>
+      <p:sp>
+        <p:nvSpPr>
+          <p:cNvPr id="6" name="Slide Number Placeholder 5"/>
+          <p:cNvSpPr>
+            <a:spLocks noGrp="1"/>
+          </p:cNvSpPr>
+          <p:nvPr>
+            <p:ph type="sldNum" sz="quarter" idx="12"/>
+          </p:nvPr>
+        </p:nvSpPr>
+        <p:spPr/>
+        <p:txBody>
+          <a:bodyPr>
+            <a:normAutofit lnSpcReduction="10000"/>
+          </a:bodyPr>
+          <a:lstStyle/>
+          <a:p>
+            <a:fld id="{B102E578-8C1A-4150-8490-48A08D76AC22}" type="slidenum">
+              <a:rPr lang="en-US" smtClean="0"/>
+              <a:t>23</a:t>
+            </a:fld>
+            <a:endParaRPr lang="en-US"/>
+          </a:p>
+        </p:txBody>
+      </p:sp>
+    </p:spTree>
+    <p:extLst>
+      <p:ext uri="{BB962C8B-B14F-4D97-AF65-F5344CB8AC3E}">
+        <p14:creationId xmlns:p14="http://schemas.microsoft.com/office/powerpoint/2010/main" val="2542141721"/>
+      </p:ext>
+    </p:extLst>
+  </p:cSld>
+  <p:clrMapOvr>
+    <a:masterClrMapping/>
+  </p:clrMapOvr>
+</p:sld>
+</file>
+
+<file path=ppt/slides/slide24.xml><?xml version="1.0" encoding="utf-8"?>
+<p:sld xmlns:a="http://schemas.openxmlformats.org/drawingml/2006/main" xmlns:r="http://schemas.openxmlformats.org/officeDocument/2006/relationships" xmlns:p="http://schemas.openxmlformats.org/presentationml/2006/main">
+  <p:cSld>
+    <p:spTree>
+      <p:nvGrpSpPr>
+        <p:cNvPr id="1" name=""/>
+        <p:cNvGrpSpPr/>
+        <p:nvPr/>
+      </p:nvGrpSpPr>
+      <p:grpSpPr>
+        <a:xfrm>
+          <a:off x="0" y="0"/>
+          <a:ext cx="0" cy="0"/>
+          <a:chOff x="0" y="0"/>
+          <a:chExt cx="0" cy="0"/>
+        </a:xfrm>
+      </p:grpSpPr>
+      <p:sp>
+        <p:nvSpPr>
+          <p:cNvPr id="2" name="Title 1"/>
+          <p:cNvSpPr>
+            <a:spLocks noGrp="1"/>
+          </p:cNvSpPr>
+          <p:nvPr>
+            <p:ph type="title"/>
+          </p:nvPr>
+        </p:nvSpPr>
+        <p:spPr/>
+        <p:txBody>
+          <a:bodyPr/>
+          <a:lstStyle/>
+          <a:p>
+            <a:r>
+              <a:rPr lang="en-US" dirty="0" smtClean="0"/>
               <a:t>So What’s the Deal?</a:t>
             </a:r>
             <a:endParaRPr lang="en-US" dirty="0"/>
@@ -23565,7 +24490,19 @@
             <a:pPr lvl="1"/>
             <a:r>
               <a:rPr lang="en-US" dirty="0" smtClean="0"/>
-              <a:t>Optimal grain size is determined by the Four Horsemen, mainly by overheads, starvation, and latencies</a:t>
+              <a:t>Optimal grain size is determined by </a:t>
+            </a:r>
+            <a:r>
+              <a:rPr lang="en-US" smtClean="0"/>
+              <a:t>the </a:t>
+            </a:r>
+            <a:r>
+              <a:rPr lang="en-US" smtClean="0"/>
+              <a:t>SLOW factors, </a:t>
+            </a:r>
+            <a:r>
+              <a:rPr lang="en-US" dirty="0" smtClean="0"/>
+              <a:t>mainly by overheads, starvation, and latencies</a:t>
             </a:r>
           </a:p>
           <a:p>
@@ -23689,7 +24626,7 @@
           <a:p>
             <a:fld id="{E21D6AF4-B5A0-4A07-BEF4-28FAD635375F}" type="slidenum">
               <a:rPr lang="en-US" smtClean="0"/>
-              <a:t>23</a:t>
+              <a:t>24</a:t>
             </a:fld>
             <a:endParaRPr lang="en-US"/>
           </a:p>
@@ -23723,7 +24660,7 @@
 </p:sld>
 </file>
 
-<file path=ppt/slides/slide24.xml><?xml version="1.0" encoding="utf-8"?>
+<file path=ppt/slides/slide25.xml><?xml version="1.0" encoding="utf-8"?>
 <p:sld xmlns:a="http://schemas.openxmlformats.org/drawingml/2006/main" xmlns:r="http://schemas.openxmlformats.org/officeDocument/2006/relationships" xmlns:p="http://schemas.openxmlformats.org/presentationml/2006/main">
   <p:cSld>
     <p:spTree>
@@ -24019,7 +24956,7 @@
           <a:p>
             <a:fld id="{65339F38-439B-42BE-A6DB-D203DE66964E}" type="slidenum">
               <a:rPr lang="en-US" smtClean="0"/>
-              <a:t>24</a:t>
+              <a:t>25</a:t>
             </a:fld>
             <a:endParaRPr lang="en-US"/>
           </a:p>

</xml_diff>

<commit_message>
left over diffs to ppt slides from lbl workshop
</commit_message>
<xml_diff>
--- a/lbl2016/HPX Workshop (Berkeley C++ Summit) - 3.pptx
+++ b/lbl2016/HPX Workshop (Berkeley C++ Summit) - 3.pptx
@@ -135,7 +135,7 @@
   </p:defaultTextStyle>
   <p:extLst>
     <p:ext uri="{EFAFB233-063F-42B5-8137-9DF3F51BA10A}">
-      <p15:sldGuideLst xmlns:p15="http://schemas.microsoft.com/office/powerpoint/2012/main">
+      <p15:sldGuideLst xmlns:p15="http://schemas.microsoft.com/office/powerpoint/2012/main" xmlns="">
         <p15:guide id="1" orient="horz" pos="1416" userDrawn="1">
           <p15:clr>
             <a:srgbClr val="A4A3A4"/>
@@ -199,6 +199,7 @@
           </a:p>
         </c:rich>
       </c:tx>
+      <c:layout/>
       <c:overlay val="0"/>
       <c:spPr>
         <a:noFill/>
@@ -207,23 +208,6 @@
         </a:ln>
         <a:effectLst/>
       </c:spPr>
-      <c:txPr>
-        <a:bodyPr rot="0" spcFirstLastPara="1" vertOverflow="ellipsis" vert="horz" wrap="square" anchor="ctr" anchorCtr="1"/>
-        <a:lstStyle/>
-        <a:p>
-          <a:pPr>
-            <a:defRPr sz="2200" b="0" i="0" u="none" strike="noStrike" kern="1200" cap="none" spc="0" normalizeH="0" baseline="0">
-              <a:solidFill>
-                <a:schemeClr val="dk1"/>
-              </a:solidFill>
-              <a:latin typeface="+mn-lt"/>
-              <a:ea typeface="+mn-ea"/>
-              <a:cs typeface="+mn-cs"/>
-            </a:defRPr>
-          </a:pPr>
-          <a:endParaRPr lang="en-US"/>
-        </a:p>
-      </c:txPr>
     </c:title>
     <c:autoTitleDeleted val="0"/>
     <c:plotArea>
@@ -264,64 +248,64 @@
                 <c:formatCode>General</c:formatCode>
                 <c:ptCount val="20"/>
                 <c:pt idx="0">
-                  <c:v>2</c:v>
+                  <c:v>2.0</c:v>
                 </c:pt>
                 <c:pt idx="1">
-                  <c:v>4</c:v>
+                  <c:v>4.0</c:v>
                 </c:pt>
                 <c:pt idx="2">
-                  <c:v>6</c:v>
+                  <c:v>6.0</c:v>
                 </c:pt>
                 <c:pt idx="3">
-                  <c:v>8</c:v>
+                  <c:v>8.0</c:v>
                 </c:pt>
                 <c:pt idx="4">
-                  <c:v>10</c:v>
+                  <c:v>10.0</c:v>
                 </c:pt>
                 <c:pt idx="5">
-                  <c:v>12</c:v>
+                  <c:v>12.0</c:v>
                 </c:pt>
                 <c:pt idx="6">
-                  <c:v>14</c:v>
+                  <c:v>14.0</c:v>
                 </c:pt>
                 <c:pt idx="7">
-                  <c:v>16</c:v>
+                  <c:v>16.0</c:v>
                 </c:pt>
                 <c:pt idx="8">
-                  <c:v>18</c:v>
+                  <c:v>18.0</c:v>
                 </c:pt>
                 <c:pt idx="9">
-                  <c:v>20</c:v>
+                  <c:v>20.0</c:v>
                 </c:pt>
                 <c:pt idx="10">
-                  <c:v>22</c:v>
+                  <c:v>22.0</c:v>
                 </c:pt>
                 <c:pt idx="11">
-                  <c:v>24</c:v>
+                  <c:v>24.0</c:v>
                 </c:pt>
                 <c:pt idx="12">
-                  <c:v>26</c:v>
+                  <c:v>26.0</c:v>
                 </c:pt>
                 <c:pt idx="13">
-                  <c:v>28</c:v>
+                  <c:v>28.0</c:v>
                 </c:pt>
                 <c:pt idx="14">
-                  <c:v>30</c:v>
+                  <c:v>30.0</c:v>
                 </c:pt>
                 <c:pt idx="15">
-                  <c:v>32</c:v>
+                  <c:v>32.0</c:v>
                 </c:pt>
                 <c:pt idx="16">
-                  <c:v>34</c:v>
+                  <c:v>34.0</c:v>
                 </c:pt>
                 <c:pt idx="17">
-                  <c:v>36</c:v>
+                  <c:v>36.0</c:v>
                 </c:pt>
                 <c:pt idx="18">
-                  <c:v>38</c:v>
+                  <c:v>38.0</c:v>
                 </c:pt>
                 <c:pt idx="19">
-                  <c:v>40</c:v>
+                  <c:v>40.0</c:v>
                 </c:pt>
               </c:numCache>
             </c:numRef>
@@ -333,61 +317,61 @@
                 <c:formatCode>0.00E+00</c:formatCode>
                 <c:ptCount val="20"/>
                 <c:pt idx="0">
-                  <c:v>3.5000000000000002E-8</c:v>
+                  <c:v>3.5E-8</c:v>
                 </c:pt>
                 <c:pt idx="1">
-                  <c:v>7.0000000000000005E-8</c:v>
+                  <c:v>7.0E-8</c:v>
                 </c:pt>
                 <c:pt idx="2">
                   <c:v>2.1E-7</c:v>
                 </c:pt>
                 <c:pt idx="3">
-                  <c:v>4.5499999999999998E-7</c:v>
+                  <c:v>4.55E-7</c:v>
                 </c:pt>
                 <c:pt idx="4">
-                  <c:v>1.1199000000000001E-6</c:v>
+                  <c:v>1.1199E-6</c:v>
                 </c:pt>
                 <c:pt idx="5">
-                  <c:v>3.0796999999999999E-6</c:v>
+                  <c:v>3.0797E-6</c:v>
                 </c:pt>
                 <c:pt idx="6">
-                  <c:v>7.4892000000000002E-6</c:v>
+                  <c:v>7.4892E-6</c:v>
                 </c:pt>
                 <c:pt idx="7">
-                  <c:v>1.8372900000000002E-5</c:v>
+                  <c:v>1.83729E-5</c:v>
                 </c:pt>
                 <c:pt idx="8">
-                  <c:v>4.8084599999999997E-5</c:v>
+                  <c:v>4.80846E-5</c:v>
                 </c:pt>
                 <c:pt idx="9" formatCode="General">
-                  <c:v>1.7106099999999999E-4</c:v>
+                  <c:v>0.000171061</c:v>
                 </c:pt>
                 <c:pt idx="10" formatCode="General">
-                  <c:v>3.7942800000000001E-4</c:v>
+                  <c:v>0.000379428</c:v>
                 </c:pt>
                 <c:pt idx="11" formatCode="General">
-                  <c:v>1.02983E-3</c:v>
+                  <c:v>0.00102983</c:v>
                 </c:pt>
                 <c:pt idx="12" formatCode="General">
-                  <c:v>2.4650900000000001E-3</c:v>
+                  <c:v>0.00246509</c:v>
                 </c:pt>
                 <c:pt idx="13" formatCode="General">
-                  <c:v>6.5593200000000004E-3</c:v>
+                  <c:v>0.00655932</c:v>
                 </c:pt>
                 <c:pt idx="14" formatCode="General">
-                  <c:v>1.6975299999999999E-2</c:v>
+                  <c:v>0.0169753</c:v>
                 </c:pt>
                 <c:pt idx="15" formatCode="General">
-                  <c:v>4.4627600000000003E-2</c:v>
+                  <c:v>0.0446276</c:v>
                 </c:pt>
                 <c:pt idx="16" formatCode="General">
-                  <c:v>0.11556900000000001</c:v>
+                  <c:v>0.115569</c:v>
                 </c:pt>
                 <c:pt idx="17" formatCode="General">
-                  <c:v>0.58538500000000004</c:v>
+                  <c:v>0.585385</c:v>
                 </c:pt>
                 <c:pt idx="18" formatCode="General">
-                  <c:v>1.5765400000000001</c:v>
+                  <c:v>1.57654</c:v>
                 </c:pt>
                 <c:pt idx="19" formatCode="General">
                   <c:v>3.7521</c:v>
@@ -407,8 +391,8 @@
         </c:dLbls>
         <c:marker val="1"/>
         <c:smooth val="0"/>
-        <c:axId val="223425496"/>
-        <c:axId val="223426280"/>
+        <c:axId val="-2113569144"/>
+        <c:axId val="-2113562072"/>
       </c:lineChart>
       <c:lineChart>
         <c:grouping val="standard"/>
@@ -433,64 +417,64 @@
                 <c:formatCode>General</c:formatCode>
                 <c:ptCount val="20"/>
                 <c:pt idx="0">
-                  <c:v>30</c:v>
+                  <c:v>30.0</c:v>
                 </c:pt>
                 <c:pt idx="1">
-                  <c:v>90</c:v>
+                  <c:v>90.0</c:v>
                 </c:pt>
                 <c:pt idx="2">
-                  <c:v>210</c:v>
+                  <c:v>210.0</c:v>
                 </c:pt>
                 <c:pt idx="3">
-                  <c:v>670</c:v>
+                  <c:v>670.0</c:v>
                 </c:pt>
                 <c:pt idx="4">
-                  <c:v>2400</c:v>
+                  <c:v>2400.0</c:v>
                 </c:pt>
                 <c:pt idx="5">
-                  <c:v>4650</c:v>
+                  <c:v>4650.0</c:v>
                 </c:pt>
                 <c:pt idx="6">
-                  <c:v>12190</c:v>
+                  <c:v>12190.0</c:v>
                 </c:pt>
                 <c:pt idx="7">
-                  <c:v>31930</c:v>
+                  <c:v>31930.0</c:v>
                 </c:pt>
                 <c:pt idx="8">
-                  <c:v>83610</c:v>
+                  <c:v>83610.0</c:v>
                 </c:pt>
                 <c:pt idx="9">
-                  <c:v>218910</c:v>
+                  <c:v>218910.0</c:v>
                 </c:pt>
                 <c:pt idx="10">
-                  <c:v>573130</c:v>
+                  <c:v>573130.0</c:v>
                 </c:pt>
                 <c:pt idx="11">
-                  <c:v>1500490</c:v>
+                  <c:v>1.50049E6</c:v>
                 </c:pt>
                 <c:pt idx="12">
-                  <c:v>3928350</c:v>
+                  <c:v>3.92835E6</c:v>
                 </c:pt>
                 <c:pt idx="13">
-                  <c:v>10284570</c:v>
+                  <c:v>1.028457E7</c:v>
                 </c:pt>
                 <c:pt idx="14">
-                  <c:v>26925370</c:v>
+                  <c:v>2.692537E7</c:v>
                 </c:pt>
                 <c:pt idx="15">
-                  <c:v>70491550</c:v>
+                  <c:v>7.049155E7</c:v>
                 </c:pt>
                 <c:pt idx="16">
-                  <c:v>184549290</c:v>
+                  <c:v>1.8454929E8</c:v>
                 </c:pt>
                 <c:pt idx="17">
-                  <c:v>483156330</c:v>
+                  <c:v>4.8315633E8</c:v>
                 </c:pt>
                 <c:pt idx="18">
-                  <c:v>1264919710</c:v>
+                  <c:v>1.26491971E9</c:v>
                 </c:pt>
                 <c:pt idx="19">
-                  <c:v>3311602810</c:v>
+                  <c:v>3.31160281E9</c:v>
                 </c:pt>
               </c:numCache>
             </c:numRef>
@@ -507,11 +491,11 @@
         </c:dLbls>
         <c:marker val="1"/>
         <c:smooth val="0"/>
-        <c:axId val="227271000"/>
-        <c:axId val="227273744"/>
+        <c:axId val="-2113548488"/>
+        <c:axId val="-2113554952"/>
       </c:lineChart>
       <c:catAx>
-        <c:axId val="223425496"/>
+        <c:axId val="-2113569144"/>
         <c:scaling>
           <c:orientation val="minMax"/>
         </c:scaling>
@@ -554,6 +538,7 @@
               </a:p>
             </c:rich>
           </c:tx>
+          <c:layout/>
           <c:overlay val="0"/>
           <c:spPr>
             <a:noFill/>
@@ -562,23 +547,6 @@
             </a:ln>
             <a:effectLst/>
           </c:spPr>
-          <c:txPr>
-            <a:bodyPr rot="0" spcFirstLastPara="1" vertOverflow="ellipsis" vert="horz" wrap="square" anchor="ctr" anchorCtr="1"/>
-            <a:lstStyle/>
-            <a:p>
-              <a:pPr>
-                <a:defRPr sz="1197" b="0" i="0" u="none" strike="noStrike" kern="1200" cap="none" baseline="0">
-                  <a:solidFill>
-                    <a:schemeClr val="dk1"/>
-                  </a:solidFill>
-                  <a:latin typeface="+mn-lt"/>
-                  <a:ea typeface="+mn-ea"/>
-                  <a:cs typeface="+mn-cs"/>
-                </a:defRPr>
-              </a:pPr>
-              <a:endParaRPr lang="en-US"/>
-            </a:p>
-          </c:txPr>
         </c:title>
         <c:numFmt formatCode="General" sourceLinked="1"/>
         <c:majorTickMark val="out"/>
@@ -614,17 +582,17 @@
             <a:endParaRPr lang="en-US"/>
           </a:p>
         </c:txPr>
-        <c:crossAx val="223426280"/>
-        <c:crossesAt val="1.0000000000000005E-8"/>
+        <c:crossAx val="-2113562072"/>
+        <c:crossesAt val="1.0E-8"/>
         <c:auto val="1"/>
         <c:lblAlgn val="ctr"/>
         <c:lblOffset val="100"/>
         <c:noMultiLvlLbl val="0"/>
       </c:catAx>
       <c:valAx>
-        <c:axId val="223426280"/>
+        <c:axId val="-2113562072"/>
         <c:scaling>
-          <c:logBase val="10"/>
+          <c:logBase val="10.0"/>
           <c:orientation val="minMax"/>
         </c:scaling>
         <c:delete val="0"/>
@@ -666,6 +634,7 @@
               </a:p>
             </c:rich>
           </c:tx>
+          <c:layout/>
           <c:overlay val="0"/>
           <c:spPr>
             <a:noFill/>
@@ -674,23 +643,6 @@
             </a:ln>
             <a:effectLst/>
           </c:spPr>
-          <c:txPr>
-            <a:bodyPr rot="-5400000" spcFirstLastPara="1" vertOverflow="ellipsis" vert="horz" wrap="square" anchor="ctr" anchorCtr="1"/>
-            <a:lstStyle/>
-            <a:p>
-              <a:pPr>
-                <a:defRPr sz="1197" b="0" i="0" u="none" strike="noStrike" kern="1200" cap="none" baseline="0">
-                  <a:solidFill>
-                    <a:schemeClr val="dk1"/>
-                  </a:solidFill>
-                  <a:latin typeface="+mn-lt"/>
-                  <a:ea typeface="+mn-ea"/>
-                  <a:cs typeface="+mn-cs"/>
-                </a:defRPr>
-              </a:pPr>
-              <a:endParaRPr lang="en-US"/>
-            </a:p>
-          </c:txPr>
         </c:title>
         <c:numFmt formatCode="0.E+00" sourceLinked="0"/>
         <c:majorTickMark val="none"/>
@@ -720,14 +672,14 @@
             <a:endParaRPr lang="en-US"/>
           </a:p>
         </c:txPr>
-        <c:crossAx val="223425496"/>
+        <c:crossAx val="-2113569144"/>
         <c:crosses val="autoZero"/>
         <c:crossBetween val="midCat"/>
       </c:valAx>
       <c:valAx>
-        <c:axId val="227273744"/>
+        <c:axId val="-2113554952"/>
         <c:scaling>
-          <c:logBase val="10"/>
+          <c:logBase val="10.0"/>
           <c:orientation val="minMax"/>
         </c:scaling>
         <c:delete val="0"/>
@@ -755,6 +707,7 @@
               </a:p>
             </c:rich>
           </c:tx>
+          <c:layout/>
           <c:overlay val="0"/>
           <c:spPr>
             <a:noFill/>
@@ -763,23 +716,6 @@
             </a:ln>
             <a:effectLst/>
           </c:spPr>
-          <c:txPr>
-            <a:bodyPr rot="-5400000" spcFirstLastPara="1" vertOverflow="ellipsis" vert="horz" wrap="square" anchor="ctr" anchorCtr="1"/>
-            <a:lstStyle/>
-            <a:p>
-              <a:pPr>
-                <a:defRPr sz="1197" b="0" i="0" u="none" strike="noStrike" kern="1200" cap="none" baseline="0">
-                  <a:solidFill>
-                    <a:schemeClr val="dk1"/>
-                  </a:solidFill>
-                  <a:latin typeface="+mn-lt"/>
-                  <a:ea typeface="+mn-ea"/>
-                  <a:cs typeface="+mn-cs"/>
-                </a:defRPr>
-              </a:pPr>
-              <a:endParaRPr lang="en-US"/>
-            </a:p>
-          </c:txPr>
         </c:title>
         <c:numFmt formatCode="#,##0" sourceLinked="0"/>
         <c:majorTickMark val="none"/>
@@ -809,12 +745,12 @@
             <a:endParaRPr lang="en-US"/>
           </a:p>
         </c:txPr>
-        <c:crossAx val="227271000"/>
+        <c:crossAx val="-2113548488"/>
         <c:crosses val="max"/>
         <c:crossBetween val="between"/>
       </c:valAx>
       <c:catAx>
-        <c:axId val="227271000"/>
+        <c:axId val="-2113548488"/>
         <c:scaling>
           <c:orientation val="minMax"/>
         </c:scaling>
@@ -823,8 +759,8 @@
         <c:majorTickMark val="out"/>
         <c:minorTickMark val="none"/>
         <c:tickLblPos val="nextTo"/>
-        <c:crossAx val="227273744"/>
-        <c:crossesAt val="1"/>
+        <c:crossAx val="-2113554952"/>
+        <c:crossesAt val="1.0"/>
         <c:auto val="1"/>
         <c:lblAlgn val="ctr"/>
         <c:lblOffset val="100"/>
@@ -871,7 +807,7 @@
       <a:endParaRPr lang="en-US"/>
     </a:p>
   </c:txPr>
-  <c:externalData r:id="rId3">
+  <c:externalData r:id="rId1">
     <c:autoUpdate val="0"/>
   </c:externalData>
 </c:chartSpace>
@@ -934,6 +870,7 @@
           </a:p>
         </c:rich>
       </c:tx>
+      <c:layout/>
       <c:overlay val="0"/>
       <c:spPr>
         <a:noFill/>
@@ -942,23 +879,6 @@
         </a:ln>
         <a:effectLst/>
       </c:spPr>
-      <c:txPr>
-        <a:bodyPr rot="0" spcFirstLastPara="1" vertOverflow="ellipsis" vert="horz" wrap="square" anchor="ctr" anchorCtr="1"/>
-        <a:lstStyle/>
-        <a:p>
-          <a:pPr>
-            <a:defRPr sz="2128" b="1" i="0" u="none" strike="noStrike" kern="1200" baseline="0">
-              <a:solidFill>
-                <a:schemeClr val="dk1"/>
-              </a:solidFill>
-              <a:latin typeface="+mn-lt"/>
-              <a:ea typeface="+mn-ea"/>
-              <a:cs typeface="+mn-cs"/>
-            </a:defRPr>
-          </a:pPr>
-          <a:endParaRPr lang="en-US"/>
-        </a:p>
-      </c:txPr>
     </c:title>
     <c:autoTitleDeleted val="0"/>
     <c:plotArea>
@@ -1065,46 +985,46 @@
                 <c:formatCode>General</c:formatCode>
                 <c:ptCount val="14"/>
                 <c:pt idx="0">
-                  <c:v>2</c:v>
+                  <c:v>2.0</c:v>
                 </c:pt>
                 <c:pt idx="1">
-                  <c:v>4</c:v>
+                  <c:v>4.0</c:v>
                 </c:pt>
                 <c:pt idx="2">
-                  <c:v>6</c:v>
+                  <c:v>6.0</c:v>
                 </c:pt>
                 <c:pt idx="3">
-                  <c:v>8</c:v>
+                  <c:v>8.0</c:v>
                 </c:pt>
                 <c:pt idx="4">
-                  <c:v>10</c:v>
+                  <c:v>10.0</c:v>
                 </c:pt>
                 <c:pt idx="5">
-                  <c:v>12</c:v>
+                  <c:v>12.0</c:v>
                 </c:pt>
                 <c:pt idx="6">
-                  <c:v>14</c:v>
+                  <c:v>14.0</c:v>
                 </c:pt>
                 <c:pt idx="7">
-                  <c:v>16</c:v>
+                  <c:v>16.0</c:v>
                 </c:pt>
                 <c:pt idx="8">
-                  <c:v>18</c:v>
+                  <c:v>18.0</c:v>
                 </c:pt>
                 <c:pt idx="9">
-                  <c:v>20</c:v>
+                  <c:v>20.0</c:v>
                 </c:pt>
                 <c:pt idx="10">
-                  <c:v>22</c:v>
+                  <c:v>22.0</c:v>
                 </c:pt>
                 <c:pt idx="11">
-                  <c:v>24</c:v>
+                  <c:v>24.0</c:v>
                 </c:pt>
                 <c:pt idx="12">
-                  <c:v>26</c:v>
+                  <c:v>26.0</c:v>
                 </c:pt>
                 <c:pt idx="13">
-                  <c:v>28</c:v>
+                  <c:v>28.0</c:v>
                 </c:pt>
               </c:numCache>
             </c:numRef>
@@ -1116,46 +1036,46 @@
                 <c:formatCode>0.00E+00</c:formatCode>
                 <c:ptCount val="14"/>
                 <c:pt idx="0">
-                  <c:v>7.6991000000000005E-6</c:v>
+                  <c:v>7.6991E-6</c:v>
                 </c:pt>
                 <c:pt idx="1">
-                  <c:v>2.2082600000000001E-5</c:v>
+                  <c:v>2.20826E-5</c:v>
                 </c:pt>
                 <c:pt idx="2">
-                  <c:v>6.5897700000000004E-5</c:v>
+                  <c:v>6.58977E-5</c:v>
                 </c:pt>
                 <c:pt idx="3" formatCode="General">
-                  <c:v>1.3344E-4</c:v>
+                  <c:v>0.00013344</c:v>
                 </c:pt>
                 <c:pt idx="4" formatCode="General">
-                  <c:v>3.9573599999999999E-4</c:v>
+                  <c:v>0.000395736</c:v>
                 </c:pt>
                 <c:pt idx="5" formatCode="General">
-                  <c:v>1.1313899999999999E-3</c:v>
+                  <c:v>0.00113139</c:v>
                 </c:pt>
                 <c:pt idx="6" formatCode="General">
-                  <c:v>2.75822E-3</c:v>
+                  <c:v>0.00275822</c:v>
                 </c:pt>
                 <c:pt idx="7" formatCode="General">
-                  <c:v>7.6871800000000001E-3</c:v>
+                  <c:v>0.00768718</c:v>
                 </c:pt>
                 <c:pt idx="8" formatCode="General">
-                  <c:v>2.0499099999999999E-2</c:v>
+                  <c:v>0.0204991</c:v>
                 </c:pt>
                 <c:pt idx="9" formatCode="General">
-                  <c:v>6.2070500000000001E-2</c:v>
+                  <c:v>0.0620705</c:v>
                 </c:pt>
                 <c:pt idx="10" formatCode="General">
                   <c:v>0.197465</c:v>
                 </c:pt>
                 <c:pt idx="11" formatCode="General">
-                  <c:v>0.53710400000000003</c:v>
+                  <c:v>0.537104</c:v>
                 </c:pt>
                 <c:pt idx="12" formatCode="General">
-                  <c:v>1.4845900000000001</c:v>
+                  <c:v>1.48459</c:v>
                 </c:pt>
                 <c:pt idx="13" formatCode="General">
-                  <c:v>4.2834300000000001</c:v>
+                  <c:v>4.28343</c:v>
                 </c:pt>
               </c:numCache>
             </c:numRef>
@@ -1261,46 +1181,46 @@
                 <c:formatCode>General</c:formatCode>
                 <c:ptCount val="14"/>
                 <c:pt idx="0">
-                  <c:v>2</c:v>
+                  <c:v>2.0</c:v>
                 </c:pt>
                 <c:pt idx="1">
-                  <c:v>4</c:v>
+                  <c:v>4.0</c:v>
                 </c:pt>
                 <c:pt idx="2">
-                  <c:v>6</c:v>
+                  <c:v>6.0</c:v>
                 </c:pt>
                 <c:pt idx="3">
-                  <c:v>8</c:v>
+                  <c:v>8.0</c:v>
                 </c:pt>
                 <c:pt idx="4">
-                  <c:v>10</c:v>
+                  <c:v>10.0</c:v>
                 </c:pt>
                 <c:pt idx="5">
-                  <c:v>12</c:v>
+                  <c:v>12.0</c:v>
                 </c:pt>
                 <c:pt idx="6">
-                  <c:v>14</c:v>
+                  <c:v>14.0</c:v>
                 </c:pt>
                 <c:pt idx="7">
-                  <c:v>16</c:v>
+                  <c:v>16.0</c:v>
                 </c:pt>
                 <c:pt idx="8">
-                  <c:v>18</c:v>
+                  <c:v>18.0</c:v>
                 </c:pt>
                 <c:pt idx="9">
-                  <c:v>20</c:v>
+                  <c:v>20.0</c:v>
                 </c:pt>
                 <c:pt idx="10">
-                  <c:v>22</c:v>
+                  <c:v>22.0</c:v>
                 </c:pt>
                 <c:pt idx="11">
-                  <c:v>24</c:v>
+                  <c:v>24.0</c:v>
                 </c:pt>
                 <c:pt idx="12">
-                  <c:v>26</c:v>
+                  <c:v>26.0</c:v>
                 </c:pt>
                 <c:pt idx="13">
-                  <c:v>28</c:v>
+                  <c:v>28.0</c:v>
                 </c:pt>
               </c:numCache>
             </c:numRef>
@@ -1312,46 +1232,46 @@
                 <c:formatCode>0.00E+00</c:formatCode>
                 <c:ptCount val="14"/>
                 <c:pt idx="0">
-                  <c:v>8.9940000000000006E-6</c:v>
+                  <c:v>8.994E-6</c:v>
                 </c:pt>
                 <c:pt idx="1">
-                  <c:v>2.3657400000000002E-5</c:v>
+                  <c:v>2.36574E-5</c:v>
                 </c:pt>
                 <c:pt idx="2">
-                  <c:v>5.5538899999999998E-5</c:v>
+                  <c:v>5.55389E-5</c:v>
                 </c:pt>
                 <c:pt idx="3" formatCode="General">
-                  <c:v>1.5853199999999999E-4</c:v>
+                  <c:v>0.000158532</c:v>
                 </c:pt>
                 <c:pt idx="4" formatCode="General">
-                  <c:v>3.5668000000000001E-4</c:v>
+                  <c:v>0.00035668</c:v>
                 </c:pt>
                 <c:pt idx="5" formatCode="General">
-                  <c:v>9.4468500000000001E-4</c:v>
+                  <c:v>0.000944685</c:v>
                 </c:pt>
                 <c:pt idx="6" formatCode="General">
-                  <c:v>2.3960800000000001E-3</c:v>
+                  <c:v>0.00239608</c:v>
                 </c:pt>
                 <c:pt idx="7" formatCode="General">
-                  <c:v>6.3433999999999999E-3</c:v>
+                  <c:v>0.0063434</c:v>
                 </c:pt>
                 <c:pt idx="8" formatCode="General">
-                  <c:v>1.67729E-2</c:v>
+                  <c:v>0.0167729</c:v>
                 </c:pt>
                 <c:pt idx="9" formatCode="General">
-                  <c:v>4.74708E-2</c:v>
+                  <c:v>0.0474708</c:v>
                 </c:pt>
                 <c:pt idx="10" formatCode="General">
-                  <c:v>0.14293400000000001</c:v>
+                  <c:v>0.142934</c:v>
                 </c:pt>
                 <c:pt idx="11" formatCode="General">
-                  <c:v>0.40140500000000001</c:v>
+                  <c:v>0.401405</c:v>
                 </c:pt>
                 <c:pt idx="12" formatCode="General">
                   <c:v>1.1249</c:v>
                 </c:pt>
                 <c:pt idx="13" formatCode="General">
-                  <c:v>3.0989399999999998</c:v>
+                  <c:v>3.09894</c:v>
                 </c:pt>
               </c:numCache>
             </c:numRef>
@@ -1457,46 +1377,46 @@
                 <c:formatCode>General</c:formatCode>
                 <c:ptCount val="14"/>
                 <c:pt idx="0">
-                  <c:v>2</c:v>
+                  <c:v>2.0</c:v>
                 </c:pt>
                 <c:pt idx="1">
-                  <c:v>4</c:v>
+                  <c:v>4.0</c:v>
                 </c:pt>
                 <c:pt idx="2">
-                  <c:v>6</c:v>
+                  <c:v>6.0</c:v>
                 </c:pt>
                 <c:pt idx="3">
-                  <c:v>8</c:v>
+                  <c:v>8.0</c:v>
                 </c:pt>
                 <c:pt idx="4">
-                  <c:v>10</c:v>
+                  <c:v>10.0</c:v>
                 </c:pt>
                 <c:pt idx="5">
-                  <c:v>12</c:v>
+                  <c:v>12.0</c:v>
                 </c:pt>
                 <c:pt idx="6">
-                  <c:v>14</c:v>
+                  <c:v>14.0</c:v>
                 </c:pt>
                 <c:pt idx="7">
-                  <c:v>16</c:v>
+                  <c:v>16.0</c:v>
                 </c:pt>
                 <c:pt idx="8">
-                  <c:v>18</c:v>
+                  <c:v>18.0</c:v>
                 </c:pt>
                 <c:pt idx="9">
-                  <c:v>20</c:v>
+                  <c:v>20.0</c:v>
                 </c:pt>
                 <c:pt idx="10">
-                  <c:v>22</c:v>
+                  <c:v>22.0</c:v>
                 </c:pt>
                 <c:pt idx="11">
-                  <c:v>24</c:v>
+                  <c:v>24.0</c:v>
                 </c:pt>
                 <c:pt idx="12">
-                  <c:v>26</c:v>
+                  <c:v>26.0</c:v>
                 </c:pt>
                 <c:pt idx="13">
-                  <c:v>28</c:v>
+                  <c:v>28.0</c:v>
                 </c:pt>
               </c:numCache>
             </c:numRef>
@@ -1508,40 +1428,40 @@
                 <c:formatCode>0.00E+00</c:formatCode>
                 <c:ptCount val="14"/>
                 <c:pt idx="0">
-                  <c:v>9.9389000000000007E-6</c:v>
+                  <c:v>9.9389E-6</c:v>
                 </c:pt>
                 <c:pt idx="1">
-                  <c:v>2.6422099999999999E-5</c:v>
+                  <c:v>2.64221E-5</c:v>
                 </c:pt>
                 <c:pt idx="2">
-                  <c:v>5.0954300000000001E-5</c:v>
+                  <c:v>5.09543E-5</c:v>
                 </c:pt>
                 <c:pt idx="3">
-                  <c:v>9.3719600000000003E-5</c:v>
+                  <c:v>9.37196E-5</c:v>
                 </c:pt>
                 <c:pt idx="4" formatCode="General">
-                  <c:v>2.2156000000000001E-4</c:v>
+                  <c:v>0.00022156</c:v>
                 </c:pt>
                 <c:pt idx="5" formatCode="General">
-                  <c:v>5.2767199999999997E-4</c:v>
+                  <c:v>0.000527672</c:v>
                 </c:pt>
                 <c:pt idx="6" formatCode="General">
-                  <c:v>1.4242E-3</c:v>
+                  <c:v>0.0014242</c:v>
                 </c:pt>
                 <c:pt idx="7" formatCode="General">
-                  <c:v>3.4337500000000002E-3</c:v>
+                  <c:v>0.00343375</c:v>
                 </c:pt>
                 <c:pt idx="8" formatCode="General">
-                  <c:v>9.2020899999999996E-3</c:v>
+                  <c:v>0.00920209</c:v>
                 </c:pt>
                 <c:pt idx="9" formatCode="General">
-                  <c:v>2.5055999999999998E-2</c:v>
+                  <c:v>0.025056</c:v>
                 </c:pt>
                 <c:pt idx="10" formatCode="General">
-                  <c:v>7.3838000000000001E-2</c:v>
+                  <c:v>0.073838</c:v>
                 </c:pt>
                 <c:pt idx="11" formatCode="General">
-                  <c:v>0.21198600000000001</c:v>
+                  <c:v>0.211986</c:v>
                 </c:pt>
                 <c:pt idx="12" formatCode="General">
                   <c:v>0.586565</c:v>
@@ -1653,46 +1573,46 @@
                 <c:formatCode>General</c:formatCode>
                 <c:ptCount val="14"/>
                 <c:pt idx="0">
-                  <c:v>2</c:v>
+                  <c:v>2.0</c:v>
                 </c:pt>
                 <c:pt idx="1">
-                  <c:v>4</c:v>
+                  <c:v>4.0</c:v>
                 </c:pt>
                 <c:pt idx="2">
-                  <c:v>6</c:v>
+                  <c:v>6.0</c:v>
                 </c:pt>
                 <c:pt idx="3">
-                  <c:v>8</c:v>
+                  <c:v>8.0</c:v>
                 </c:pt>
                 <c:pt idx="4">
-                  <c:v>10</c:v>
+                  <c:v>10.0</c:v>
                 </c:pt>
                 <c:pt idx="5">
-                  <c:v>12</c:v>
+                  <c:v>12.0</c:v>
                 </c:pt>
                 <c:pt idx="6">
-                  <c:v>14</c:v>
+                  <c:v>14.0</c:v>
                 </c:pt>
                 <c:pt idx="7">
-                  <c:v>16</c:v>
+                  <c:v>16.0</c:v>
                 </c:pt>
                 <c:pt idx="8">
-                  <c:v>18</c:v>
+                  <c:v>18.0</c:v>
                 </c:pt>
                 <c:pt idx="9">
-                  <c:v>20</c:v>
+                  <c:v>20.0</c:v>
                 </c:pt>
                 <c:pt idx="10">
-                  <c:v>22</c:v>
+                  <c:v>22.0</c:v>
                 </c:pt>
                 <c:pt idx="11">
-                  <c:v>24</c:v>
+                  <c:v>24.0</c:v>
                 </c:pt>
                 <c:pt idx="12">
-                  <c:v>26</c:v>
+                  <c:v>26.0</c:v>
                 </c:pt>
                 <c:pt idx="13">
-                  <c:v>28</c:v>
+                  <c:v>28.0</c:v>
                 </c:pt>
               </c:numCache>
             </c:numRef>
@@ -1713,28 +1633,28 @@
                   <c:v>4.88895E-5</c:v>
                 </c:pt>
                 <c:pt idx="3">
-                  <c:v>8.3220700000000001E-5</c:v>
+                  <c:v>8.32207E-5</c:v>
                 </c:pt>
                 <c:pt idx="4" formatCode="General">
-                  <c:v>1.58252E-4</c:v>
+                  <c:v>0.000158252</c:v>
                 </c:pt>
                 <c:pt idx="5" formatCode="General">
-                  <c:v>3.5076600000000002E-4</c:v>
+                  <c:v>0.000350766</c:v>
                 </c:pt>
                 <c:pt idx="6" formatCode="General">
-                  <c:v>8.2835799999999996E-4</c:v>
+                  <c:v>0.000828358</c:v>
                 </c:pt>
                 <c:pt idx="7" formatCode="General">
-                  <c:v>1.9923300000000001E-3</c:v>
+                  <c:v>0.00199233</c:v>
                 </c:pt>
                 <c:pt idx="8" formatCode="General">
-                  <c:v>5.6516300000000004E-3</c:v>
+                  <c:v>0.00565163</c:v>
                 </c:pt>
                 <c:pt idx="9" formatCode="General">
-                  <c:v>1.4084299999999999E-2</c:v>
+                  <c:v>0.0140843</c:v>
                 </c:pt>
                 <c:pt idx="10" formatCode="General">
-                  <c:v>4.5174699999999998E-2</c:v>
+                  <c:v>0.0451747</c:v>
                 </c:pt>
                 <c:pt idx="11" formatCode="General">
                   <c:v>0.124247</c:v>
@@ -1743,7 +1663,7 @@
                   <c:v>0.334426</c:v>
                 </c:pt>
                 <c:pt idx="13" formatCode="General">
-                  <c:v>0.93140400000000001</c:v>
+                  <c:v>0.931404</c:v>
                 </c:pt>
               </c:numCache>
             </c:numRef>
@@ -1849,46 +1769,46 @@
                 <c:formatCode>General</c:formatCode>
                 <c:ptCount val="14"/>
                 <c:pt idx="0">
-                  <c:v>2</c:v>
+                  <c:v>2.0</c:v>
                 </c:pt>
                 <c:pt idx="1">
-                  <c:v>4</c:v>
+                  <c:v>4.0</c:v>
                 </c:pt>
                 <c:pt idx="2">
-                  <c:v>6</c:v>
+                  <c:v>6.0</c:v>
                 </c:pt>
                 <c:pt idx="3">
-                  <c:v>8</c:v>
+                  <c:v>8.0</c:v>
                 </c:pt>
                 <c:pt idx="4">
-                  <c:v>10</c:v>
+                  <c:v>10.0</c:v>
                 </c:pt>
                 <c:pt idx="5">
-                  <c:v>12</c:v>
+                  <c:v>12.0</c:v>
                 </c:pt>
                 <c:pt idx="6">
-                  <c:v>14</c:v>
+                  <c:v>14.0</c:v>
                 </c:pt>
                 <c:pt idx="7">
-                  <c:v>16</c:v>
+                  <c:v>16.0</c:v>
                 </c:pt>
                 <c:pt idx="8">
-                  <c:v>18</c:v>
+                  <c:v>18.0</c:v>
                 </c:pt>
                 <c:pt idx="9">
-                  <c:v>20</c:v>
+                  <c:v>20.0</c:v>
                 </c:pt>
                 <c:pt idx="10">
-                  <c:v>22</c:v>
+                  <c:v>22.0</c:v>
                 </c:pt>
                 <c:pt idx="11">
-                  <c:v>24</c:v>
+                  <c:v>24.0</c:v>
                 </c:pt>
                 <c:pt idx="12">
-                  <c:v>26</c:v>
+                  <c:v>26.0</c:v>
                 </c:pt>
                 <c:pt idx="13">
-                  <c:v>28</c:v>
+                  <c:v>28.0</c:v>
                 </c:pt>
               </c:numCache>
             </c:numRef>
@@ -1900,10 +1820,10 @@
                 <c:formatCode>0.00E+00</c:formatCode>
                 <c:ptCount val="14"/>
                 <c:pt idx="0">
-                  <c:v>1.3963499999999999E-5</c:v>
+                  <c:v>1.39635E-5</c:v>
                 </c:pt>
                 <c:pt idx="1">
-                  <c:v>3.2686399999999999E-5</c:v>
+                  <c:v>3.26864E-5</c:v>
                 </c:pt>
                 <c:pt idx="2">
                   <c:v>5.4174E-5</c:v>
@@ -1912,34 +1832,34 @@
                   <c:v>8.92401E-5</c:v>
                 </c:pt>
                 <c:pt idx="4" formatCode="General">
-                  <c:v>1.5573299999999999E-4</c:v>
+                  <c:v>0.000155733</c:v>
                 </c:pt>
                 <c:pt idx="5" formatCode="General">
-                  <c:v>3.1786999999999999E-4</c:v>
+                  <c:v>0.00031787</c:v>
                 </c:pt>
                 <c:pt idx="6" formatCode="General">
-                  <c:v>1.03158E-3</c:v>
+                  <c:v>0.00103158</c:v>
                 </c:pt>
                 <c:pt idx="7" formatCode="General">
-                  <c:v>1.62403E-3</c:v>
+                  <c:v>0.00162403</c:v>
                 </c:pt>
                 <c:pt idx="8" formatCode="General">
-                  <c:v>4.6165800000000003E-3</c:v>
+                  <c:v>0.00461658</c:v>
                 </c:pt>
                 <c:pt idx="9" formatCode="General">
-                  <c:v>1.1067199999999999E-2</c:v>
+                  <c:v>0.0110672</c:v>
                 </c:pt>
                 <c:pt idx="10" formatCode="General">
-                  <c:v>3.4997399999999998E-2</c:v>
+                  <c:v>0.0349974</c:v>
                 </c:pt>
                 <c:pt idx="11" formatCode="General">
-                  <c:v>9.5138100000000003E-2</c:v>
+                  <c:v>0.0951381</c:v>
                 </c:pt>
                 <c:pt idx="12" formatCode="General">
-                  <c:v>0.26605000000000001</c:v>
+                  <c:v>0.26605</c:v>
                 </c:pt>
                 <c:pt idx="13" formatCode="General">
-                  <c:v>0.72023099999999995</c:v>
+                  <c:v>0.720231</c:v>
                 </c:pt>
               </c:numCache>
             </c:numRef>
@@ -2045,46 +1965,46 @@
                 <c:formatCode>General</c:formatCode>
                 <c:ptCount val="14"/>
                 <c:pt idx="0">
-                  <c:v>2</c:v>
+                  <c:v>2.0</c:v>
                 </c:pt>
                 <c:pt idx="1">
-                  <c:v>4</c:v>
+                  <c:v>4.0</c:v>
                 </c:pt>
                 <c:pt idx="2">
-                  <c:v>6</c:v>
+                  <c:v>6.0</c:v>
                 </c:pt>
                 <c:pt idx="3">
-                  <c:v>8</c:v>
+                  <c:v>8.0</c:v>
                 </c:pt>
                 <c:pt idx="4">
-                  <c:v>10</c:v>
+                  <c:v>10.0</c:v>
                 </c:pt>
                 <c:pt idx="5">
-                  <c:v>12</c:v>
+                  <c:v>12.0</c:v>
                 </c:pt>
                 <c:pt idx="6">
-                  <c:v>14</c:v>
+                  <c:v>14.0</c:v>
                 </c:pt>
                 <c:pt idx="7">
-                  <c:v>16</c:v>
+                  <c:v>16.0</c:v>
                 </c:pt>
                 <c:pt idx="8">
-                  <c:v>18</c:v>
+                  <c:v>18.0</c:v>
                 </c:pt>
                 <c:pt idx="9">
-                  <c:v>20</c:v>
+                  <c:v>20.0</c:v>
                 </c:pt>
                 <c:pt idx="10">
-                  <c:v>22</c:v>
+                  <c:v>22.0</c:v>
                 </c:pt>
                 <c:pt idx="11">
-                  <c:v>24</c:v>
+                  <c:v>24.0</c:v>
                 </c:pt>
                 <c:pt idx="12">
-                  <c:v>26</c:v>
+                  <c:v>26.0</c:v>
                 </c:pt>
                 <c:pt idx="13">
-                  <c:v>28</c:v>
+                  <c:v>28.0</c:v>
                 </c:pt>
               </c:numCache>
             </c:numRef>
@@ -2096,46 +2016,46 @@
                 <c:formatCode>0.00E+00</c:formatCode>
                 <c:ptCount val="14"/>
                 <c:pt idx="0">
-                  <c:v>2.1347599999999999E-5</c:v>
+                  <c:v>2.13476E-5</c:v>
                 </c:pt>
                 <c:pt idx="1">
-                  <c:v>4.4969999999999998E-5</c:v>
+                  <c:v>4.497E-5</c:v>
                 </c:pt>
                 <c:pt idx="2">
-                  <c:v>7.4961600000000004E-5</c:v>
+                  <c:v>7.49616E-5</c:v>
                 </c:pt>
                 <c:pt idx="3" formatCode="General">
-                  <c:v>1.03169E-4</c:v>
+                  <c:v>0.000103169</c:v>
                 </c:pt>
                 <c:pt idx="4" formatCode="General">
-                  <c:v>2.08507E-4</c:v>
+                  <c:v>0.000208507</c:v>
                 </c:pt>
                 <c:pt idx="5" formatCode="General">
-                  <c:v>3.5573499999999998E-4</c:v>
+                  <c:v>0.000355735</c:v>
                 </c:pt>
                 <c:pt idx="6" formatCode="General">
-                  <c:v>9.6256800000000002E-4</c:v>
+                  <c:v>0.000962568</c:v>
                 </c:pt>
                 <c:pt idx="7" formatCode="General">
-                  <c:v>2.1502299999999999E-3</c:v>
+                  <c:v>0.00215023</c:v>
                 </c:pt>
                 <c:pt idx="8" formatCode="General">
-                  <c:v>4.7725299999999997E-3</c:v>
+                  <c:v>0.00477253</c:v>
                 </c:pt>
                 <c:pt idx="9" formatCode="General">
-                  <c:v>1.5426499999999999E-2</c:v>
+                  <c:v>0.0154265</c:v>
                 </c:pt>
                 <c:pt idx="10" formatCode="General">
-                  <c:v>3.9457699999999998E-2</c:v>
+                  <c:v>0.0394577</c:v>
                 </c:pt>
                 <c:pt idx="11" formatCode="General">
-                  <c:v>9.4061599999999995E-2</c:v>
+                  <c:v>0.0940616</c:v>
                 </c:pt>
                 <c:pt idx="12" formatCode="General">
-                  <c:v>0.23691200000000001</c:v>
+                  <c:v>0.236912</c:v>
                 </c:pt>
                 <c:pt idx="13" formatCode="General">
-                  <c:v>0.65468000000000004</c:v>
+                  <c:v>0.65468</c:v>
                 </c:pt>
               </c:numCache>
             </c:numRef>
@@ -2249,46 +2169,46 @@
                 <c:formatCode>General</c:formatCode>
                 <c:ptCount val="14"/>
                 <c:pt idx="0">
-                  <c:v>2</c:v>
+                  <c:v>2.0</c:v>
                 </c:pt>
                 <c:pt idx="1">
-                  <c:v>4</c:v>
+                  <c:v>4.0</c:v>
                 </c:pt>
                 <c:pt idx="2">
-                  <c:v>6</c:v>
+                  <c:v>6.0</c:v>
                 </c:pt>
                 <c:pt idx="3">
-                  <c:v>8</c:v>
+                  <c:v>8.0</c:v>
                 </c:pt>
                 <c:pt idx="4">
-                  <c:v>10</c:v>
+                  <c:v>10.0</c:v>
                 </c:pt>
                 <c:pt idx="5">
-                  <c:v>12</c:v>
+                  <c:v>12.0</c:v>
                 </c:pt>
                 <c:pt idx="6">
-                  <c:v>14</c:v>
+                  <c:v>14.0</c:v>
                 </c:pt>
                 <c:pt idx="7">
-                  <c:v>16</c:v>
+                  <c:v>16.0</c:v>
                 </c:pt>
                 <c:pt idx="8">
-                  <c:v>18</c:v>
+                  <c:v>18.0</c:v>
                 </c:pt>
                 <c:pt idx="9">
-                  <c:v>20</c:v>
+                  <c:v>20.0</c:v>
                 </c:pt>
                 <c:pt idx="10">
-                  <c:v>22</c:v>
+                  <c:v>22.0</c:v>
                 </c:pt>
                 <c:pt idx="11">
-                  <c:v>24</c:v>
+                  <c:v>24.0</c:v>
                 </c:pt>
                 <c:pt idx="12">
-                  <c:v>26</c:v>
+                  <c:v>26.0</c:v>
                 </c:pt>
                 <c:pt idx="13">
-                  <c:v>28</c:v>
+                  <c:v>28.0</c:v>
                 </c:pt>
               </c:numCache>
             </c:numRef>
@@ -2300,46 +2220,46 @@
                 <c:formatCode>0.00E+00</c:formatCode>
                 <c:ptCount val="14"/>
                 <c:pt idx="0">
-                  <c:v>2.1382600000000001E-5</c:v>
+                  <c:v>2.13826E-5</c:v>
                 </c:pt>
                 <c:pt idx="1">
-                  <c:v>5.1234299999999998E-5</c:v>
+                  <c:v>5.12343E-5</c:v>
                 </c:pt>
                 <c:pt idx="2">
-                  <c:v>7.5346700000000001E-5</c:v>
+                  <c:v>7.53467E-5</c:v>
                 </c:pt>
                 <c:pt idx="3" formatCode="General">
-                  <c:v>1.09048E-4</c:v>
+                  <c:v>0.000109048</c:v>
                 </c:pt>
                 <c:pt idx="4" formatCode="General">
-                  <c:v>1.8866400000000001E-4</c:v>
+                  <c:v>0.000188664</c:v>
                 </c:pt>
                 <c:pt idx="5" formatCode="General">
-                  <c:v>6.5253700000000002E-4</c:v>
+                  <c:v>0.000652537</c:v>
                 </c:pt>
                 <c:pt idx="6" formatCode="General">
-                  <c:v>7.7957299999999998E-4</c:v>
+                  <c:v>0.000779573</c:v>
                 </c:pt>
                 <c:pt idx="7" formatCode="General">
-                  <c:v>2.6133300000000001E-3</c:v>
+                  <c:v>0.00261333</c:v>
                 </c:pt>
                 <c:pt idx="8" formatCode="General">
-                  <c:v>1.02807E-2</c:v>
+                  <c:v>0.0102807</c:v>
                 </c:pt>
                 <c:pt idx="9" formatCode="General">
-                  <c:v>1.6638099999999999E-2</c:v>
+                  <c:v>0.0166381</c:v>
                 </c:pt>
                 <c:pt idx="10" formatCode="General">
-                  <c:v>4.8350600000000001E-2</c:v>
+                  <c:v>0.0483506</c:v>
                 </c:pt>
                 <c:pt idx="11" formatCode="General">
                   <c:v>0.103934</c:v>
                 </c:pt>
                 <c:pt idx="12" formatCode="General">
-                  <c:v>0.24748500000000001</c:v>
+                  <c:v>0.247485</c:v>
                 </c:pt>
                 <c:pt idx="13" formatCode="General">
-                  <c:v>0.64100100000000004</c:v>
+                  <c:v>0.641001</c:v>
                 </c:pt>
               </c:numCache>
             </c:numRef>
@@ -2453,46 +2373,46 @@
                 <c:formatCode>General</c:formatCode>
                 <c:ptCount val="14"/>
                 <c:pt idx="0">
-                  <c:v>2</c:v>
+                  <c:v>2.0</c:v>
                 </c:pt>
                 <c:pt idx="1">
-                  <c:v>4</c:v>
+                  <c:v>4.0</c:v>
                 </c:pt>
                 <c:pt idx="2">
-                  <c:v>6</c:v>
+                  <c:v>6.0</c:v>
                 </c:pt>
                 <c:pt idx="3">
-                  <c:v>8</c:v>
+                  <c:v>8.0</c:v>
                 </c:pt>
                 <c:pt idx="4">
-                  <c:v>10</c:v>
+                  <c:v>10.0</c:v>
                 </c:pt>
                 <c:pt idx="5">
-                  <c:v>12</c:v>
+                  <c:v>12.0</c:v>
                 </c:pt>
                 <c:pt idx="6">
-                  <c:v>14</c:v>
+                  <c:v>14.0</c:v>
                 </c:pt>
                 <c:pt idx="7">
-                  <c:v>16</c:v>
+                  <c:v>16.0</c:v>
                 </c:pt>
                 <c:pt idx="8">
-                  <c:v>18</c:v>
+                  <c:v>18.0</c:v>
                 </c:pt>
                 <c:pt idx="9">
-                  <c:v>20</c:v>
+                  <c:v>20.0</c:v>
                 </c:pt>
                 <c:pt idx="10">
-                  <c:v>22</c:v>
+                  <c:v>22.0</c:v>
                 </c:pt>
                 <c:pt idx="11">
-                  <c:v>24</c:v>
+                  <c:v>24.0</c:v>
                 </c:pt>
                 <c:pt idx="12">
-                  <c:v>26</c:v>
+                  <c:v>26.0</c:v>
                 </c:pt>
                 <c:pt idx="13">
-                  <c:v>28</c:v>
+                  <c:v>28.0</c:v>
                 </c:pt>
               </c:numCache>
             </c:numRef>
@@ -2504,46 +2424,46 @@
                 <c:formatCode>0.00E+00</c:formatCode>
                 <c:ptCount val="14"/>
                 <c:pt idx="0">
-                  <c:v>2.1872500000000001E-5</c:v>
+                  <c:v>2.18725E-5</c:v>
                 </c:pt>
                 <c:pt idx="1">
                   <c:v>4.90996E-5</c:v>
                 </c:pt>
                 <c:pt idx="2">
-                  <c:v>7.5206700000000006E-5</c:v>
+                  <c:v>7.52067E-5</c:v>
                 </c:pt>
                 <c:pt idx="3" formatCode="General">
-                  <c:v>1.02889E-4</c:v>
+                  <c:v>0.000102889</c:v>
                 </c:pt>
                 <c:pt idx="4" formatCode="General">
-                  <c:v>1.8453400000000001E-4</c:v>
+                  <c:v>0.000184534</c:v>
                 </c:pt>
                 <c:pt idx="5" formatCode="General">
-                  <c:v>4.0056599999999999E-4</c:v>
+                  <c:v>0.000400566</c:v>
                 </c:pt>
                 <c:pt idx="6" formatCode="General">
-                  <c:v>1.13356E-3</c:v>
+                  <c:v>0.00113356</c:v>
                 </c:pt>
                 <c:pt idx="7" formatCode="General">
-                  <c:v>3.22916E-3</c:v>
+                  <c:v>0.00322916</c:v>
                 </c:pt>
                 <c:pt idx="8" formatCode="General">
-                  <c:v>8.2304600000000002E-3</c:v>
+                  <c:v>0.00823046</c:v>
                 </c:pt>
                 <c:pt idx="9" formatCode="General">
-                  <c:v>1.9065599999999999E-2</c:v>
+                  <c:v>0.0190656</c:v>
                 </c:pt>
                 <c:pt idx="10" formatCode="General">
-                  <c:v>4.6783400000000003E-2</c:v>
+                  <c:v>0.0467834</c:v>
                 </c:pt>
                 <c:pt idx="11" formatCode="General">
                   <c:v>0.112816</c:v>
                 </c:pt>
                 <c:pt idx="12" formatCode="General">
-                  <c:v>0.24457300000000001</c:v>
+                  <c:v>0.244573</c:v>
                 </c:pt>
                 <c:pt idx="13" formatCode="General">
-                  <c:v>0.66008999999999995</c:v>
+                  <c:v>0.66009</c:v>
                 </c:pt>
               </c:numCache>
             </c:numRef>
@@ -2657,46 +2577,46 @@
                 <c:formatCode>General</c:formatCode>
                 <c:ptCount val="14"/>
                 <c:pt idx="0">
-                  <c:v>2</c:v>
+                  <c:v>2.0</c:v>
                 </c:pt>
                 <c:pt idx="1">
-                  <c:v>4</c:v>
+                  <c:v>4.0</c:v>
                 </c:pt>
                 <c:pt idx="2">
-                  <c:v>6</c:v>
+                  <c:v>6.0</c:v>
                 </c:pt>
                 <c:pt idx="3">
-                  <c:v>8</c:v>
+                  <c:v>8.0</c:v>
                 </c:pt>
                 <c:pt idx="4">
-                  <c:v>10</c:v>
+                  <c:v>10.0</c:v>
                 </c:pt>
                 <c:pt idx="5">
-                  <c:v>12</c:v>
+                  <c:v>12.0</c:v>
                 </c:pt>
                 <c:pt idx="6">
-                  <c:v>14</c:v>
+                  <c:v>14.0</c:v>
                 </c:pt>
                 <c:pt idx="7">
-                  <c:v>16</c:v>
+                  <c:v>16.0</c:v>
                 </c:pt>
                 <c:pt idx="8">
-                  <c:v>18</c:v>
+                  <c:v>18.0</c:v>
                 </c:pt>
                 <c:pt idx="9">
-                  <c:v>20</c:v>
+                  <c:v>20.0</c:v>
                 </c:pt>
                 <c:pt idx="10">
-                  <c:v>22</c:v>
+                  <c:v>22.0</c:v>
                 </c:pt>
                 <c:pt idx="11">
-                  <c:v>24</c:v>
+                  <c:v>24.0</c:v>
                 </c:pt>
                 <c:pt idx="12">
-                  <c:v>26</c:v>
+                  <c:v>26.0</c:v>
                 </c:pt>
                 <c:pt idx="13">
-                  <c:v>28</c:v>
+                  <c:v>28.0</c:v>
                 </c:pt>
               </c:numCache>
             </c:numRef>
@@ -2708,46 +2628,46 @@
                 <c:formatCode>0.00E+00</c:formatCode>
                 <c:ptCount val="14"/>
                 <c:pt idx="0">
-                  <c:v>3.5000000000000002E-8</c:v>
+                  <c:v>3.5E-8</c:v>
                 </c:pt>
                 <c:pt idx="1">
-                  <c:v>7.0000000000000005E-8</c:v>
+                  <c:v>7.0E-8</c:v>
                 </c:pt>
                 <c:pt idx="2">
                   <c:v>2.1E-7</c:v>
                 </c:pt>
                 <c:pt idx="3">
-                  <c:v>4.5499999999999998E-7</c:v>
+                  <c:v>4.55E-7</c:v>
                 </c:pt>
                 <c:pt idx="4">
-                  <c:v>1.1199000000000001E-6</c:v>
+                  <c:v>1.1199E-6</c:v>
                 </c:pt>
                 <c:pt idx="5">
-                  <c:v>3.0796999999999999E-6</c:v>
+                  <c:v>3.0797E-6</c:v>
                 </c:pt>
                 <c:pt idx="6">
-                  <c:v>7.4892000000000002E-6</c:v>
+                  <c:v>7.4892E-6</c:v>
                 </c:pt>
                 <c:pt idx="7">
-                  <c:v>1.8372900000000002E-5</c:v>
+                  <c:v>1.83729E-5</c:v>
                 </c:pt>
                 <c:pt idx="8">
-                  <c:v>4.8084599999999997E-5</c:v>
+                  <c:v>4.80846E-5</c:v>
                 </c:pt>
                 <c:pt idx="9" formatCode="General">
-                  <c:v>1.7106099999999999E-4</c:v>
+                  <c:v>0.000171061</c:v>
                 </c:pt>
                 <c:pt idx="10" formatCode="General">
-                  <c:v>3.7942800000000001E-4</c:v>
+                  <c:v>0.000379428</c:v>
                 </c:pt>
                 <c:pt idx="11" formatCode="General">
-                  <c:v>1.02983E-3</c:v>
+                  <c:v>0.00102983</c:v>
                 </c:pt>
                 <c:pt idx="12" formatCode="General">
-                  <c:v>2.4650900000000001E-3</c:v>
+                  <c:v>0.00246509</c:v>
                 </c:pt>
                 <c:pt idx="13" formatCode="General">
-                  <c:v>6.5593200000000004E-3</c:v>
+                  <c:v>0.00655932</c:v>
                 </c:pt>
               </c:numCache>
             </c:numRef>
@@ -2861,43 +2781,43 @@
                 <c:formatCode>General</c:formatCode>
                 <c:ptCount val="13"/>
                 <c:pt idx="0">
-                  <c:v>2</c:v>
+                  <c:v>2.0</c:v>
                 </c:pt>
                 <c:pt idx="1">
-                  <c:v>4</c:v>
+                  <c:v>4.0</c:v>
                 </c:pt>
                 <c:pt idx="2">
-                  <c:v>6</c:v>
+                  <c:v>6.0</c:v>
                 </c:pt>
                 <c:pt idx="3">
-                  <c:v>8</c:v>
+                  <c:v>8.0</c:v>
                 </c:pt>
                 <c:pt idx="4">
-                  <c:v>10</c:v>
+                  <c:v>10.0</c:v>
                 </c:pt>
                 <c:pt idx="5">
-                  <c:v>12</c:v>
+                  <c:v>12.0</c:v>
                 </c:pt>
                 <c:pt idx="6">
-                  <c:v>14</c:v>
+                  <c:v>14.0</c:v>
                 </c:pt>
                 <c:pt idx="7">
-                  <c:v>16</c:v>
+                  <c:v>16.0</c:v>
                 </c:pt>
                 <c:pt idx="8">
-                  <c:v>18</c:v>
+                  <c:v>18.0</c:v>
                 </c:pt>
                 <c:pt idx="9">
-                  <c:v>20</c:v>
+                  <c:v>20.0</c:v>
                 </c:pt>
                 <c:pt idx="10">
-                  <c:v>22</c:v>
+                  <c:v>22.0</c:v>
                 </c:pt>
                 <c:pt idx="11">
-                  <c:v>24</c:v>
+                  <c:v>24.0</c:v>
                 </c:pt>
                 <c:pt idx="12">
-                  <c:v>28</c:v>
+                  <c:v>28.0</c:v>
                 </c:pt>
               </c:numCache>
             </c:numRef>
@@ -2909,43 +2829,43 @@
                 <c:formatCode>General</c:formatCode>
                 <c:ptCount val="13"/>
                 <c:pt idx="0">
-                  <c:v>1.8939899999999999E-2</c:v>
+                  <c:v>0.0189399</c:v>
                 </c:pt>
                 <c:pt idx="1">
-                  <c:v>3.00197E-2</c:v>
+                  <c:v>0.0300197</c:v>
                 </c:pt>
                 <c:pt idx="2">
-                  <c:v>3.3239299999999999E-2</c:v>
+                  <c:v>0.0332393</c:v>
                 </c:pt>
                 <c:pt idx="3">
-                  <c:v>3.3673300000000003E-2</c:v>
+                  <c:v>0.0336733</c:v>
                 </c:pt>
                 <c:pt idx="4">
-                  <c:v>4.1666399999999999E-2</c:v>
+                  <c:v>0.0416664</c:v>
                 </c:pt>
                 <c:pt idx="5">
-                  <c:v>3.2343400000000001E-2</c:v>
+                  <c:v>0.0323434</c:v>
                 </c:pt>
                 <c:pt idx="6">
-                  <c:v>3.5594500000000001E-2</c:v>
+                  <c:v>0.0355945</c:v>
                 </c:pt>
                 <c:pt idx="7">
-                  <c:v>5.8541500000000003E-2</c:v>
+                  <c:v>0.0585415</c:v>
                 </c:pt>
                 <c:pt idx="8">
-                  <c:v>6.1029699999999999E-2</c:v>
+                  <c:v>0.0610297</c:v>
                 </c:pt>
                 <c:pt idx="9">
-                  <c:v>7.1283600000000003E-2</c:v>
+                  <c:v>0.0712836</c:v>
                 </c:pt>
                 <c:pt idx="10">
                   <c:v>0.103449</c:v>
                 </c:pt>
                 <c:pt idx="11">
-                  <c:v>0.27285100000000001</c:v>
+                  <c:v>0.272851</c:v>
                 </c:pt>
                 <c:pt idx="12">
-                  <c:v>1.4418200000000001</c:v>
+                  <c:v>1.44182</c:v>
                 </c:pt>
               </c:numCache>
             </c:numRef>
@@ -2960,11 +2880,11 @@
           <c:showPercent val="0"/>
           <c:showBubbleSize val="0"/>
         </c:dLbls>
-        <c:axId val="227270608"/>
-        <c:axId val="227274528"/>
+        <c:axId val="-2112067096"/>
+        <c:axId val="-2112057896"/>
       </c:scatterChart>
       <c:valAx>
-        <c:axId val="227270608"/>
+        <c:axId val="-2112067096"/>
         <c:scaling>
           <c:orientation val="minMax"/>
         </c:scaling>
@@ -3007,6 +2927,7 @@
               </a:p>
             </c:rich>
           </c:tx>
+          <c:layout/>
           <c:overlay val="0"/>
           <c:spPr>
             <a:noFill/>
@@ -3015,23 +2936,6 @@
             </a:ln>
             <a:effectLst/>
           </c:spPr>
-          <c:txPr>
-            <a:bodyPr rot="0" spcFirstLastPara="1" vertOverflow="ellipsis" vert="horz" wrap="square" anchor="ctr" anchorCtr="1"/>
-            <a:lstStyle/>
-            <a:p>
-              <a:pPr>
-                <a:defRPr sz="1197" b="0" i="0" u="none" strike="noStrike" kern="1200" baseline="0">
-                  <a:solidFill>
-                    <a:schemeClr val="dk1"/>
-                  </a:solidFill>
-                  <a:latin typeface="+mn-lt"/>
-                  <a:ea typeface="+mn-ea"/>
-                  <a:cs typeface="+mn-cs"/>
-                </a:defRPr>
-              </a:pPr>
-              <a:endParaRPr lang="en-US"/>
-            </a:p>
-          </c:txPr>
         </c:title>
         <c:numFmt formatCode="General" sourceLinked="1"/>
         <c:majorTickMark val="none"/>
@@ -3061,14 +2965,14 @@
             <a:endParaRPr lang="en-US"/>
           </a:p>
         </c:txPr>
-        <c:crossAx val="227274528"/>
-        <c:crossesAt val="1.0000000000000005E-8"/>
+        <c:crossAx val="-2112057896"/>
+        <c:crossesAt val="1.0E-8"/>
         <c:crossBetween val="midCat"/>
       </c:valAx>
       <c:valAx>
-        <c:axId val="227274528"/>
+        <c:axId val="-2112057896"/>
         <c:scaling>
-          <c:logBase val="10"/>
+          <c:logBase val="10.0"/>
           <c:orientation val="minMax"/>
         </c:scaling>
         <c:delete val="0"/>
@@ -3110,6 +3014,7 @@
               </a:p>
             </c:rich>
           </c:tx>
+          <c:layout/>
           <c:overlay val="0"/>
           <c:spPr>
             <a:noFill/>
@@ -3118,23 +3023,6 @@
             </a:ln>
             <a:effectLst/>
           </c:spPr>
-          <c:txPr>
-            <a:bodyPr rot="-5400000" spcFirstLastPara="1" vertOverflow="ellipsis" vert="horz" wrap="square" anchor="ctr" anchorCtr="1"/>
-            <a:lstStyle/>
-            <a:p>
-              <a:pPr>
-                <a:defRPr sz="1197" b="0" i="0" u="none" strike="noStrike" kern="1200" baseline="0">
-                  <a:solidFill>
-                    <a:schemeClr val="dk1"/>
-                  </a:solidFill>
-                  <a:latin typeface="+mn-lt"/>
-                  <a:ea typeface="+mn-ea"/>
-                  <a:cs typeface="+mn-cs"/>
-                </a:defRPr>
-              </a:pPr>
-              <a:endParaRPr lang="en-US"/>
-            </a:p>
-          </c:txPr>
         </c:title>
         <c:numFmt formatCode="0.E+00" sourceLinked="0"/>
         <c:majorTickMark val="none"/>
@@ -3164,7 +3052,7 @@
             <a:endParaRPr lang="en-US"/>
           </a:p>
         </c:txPr>
-        <c:crossAx val="227270608"/>
+        <c:crossAx val="-2112067096"/>
         <c:crosses val="autoZero"/>
         <c:crossBetween val="midCat"/>
       </c:valAx>
@@ -3178,6 +3066,7 @@
     </c:plotArea>
     <c:legend>
       <c:legendPos val="r"/>
+      <c:layout/>
       <c:overlay val="0"/>
       <c:spPr>
         <a:noFill/>
@@ -3237,7 +3126,7 @@
       <a:endParaRPr lang="en-US"/>
     </a:p>
   </c:txPr>
-  <c:externalData r:id="rId3">
+  <c:externalData r:id="rId1">
     <c:autoUpdate val="0"/>
   </c:externalData>
 </c:chartSpace>
@@ -3296,6 +3185,7 @@
           </a:p>
         </c:rich>
       </c:tx>
+      <c:layout/>
       <c:overlay val="0"/>
       <c:spPr>
         <a:noFill/>
@@ -3304,23 +3194,6 @@
         </a:ln>
         <a:effectLst/>
       </c:spPr>
-      <c:txPr>
-        <a:bodyPr rot="0" spcFirstLastPara="1" vertOverflow="ellipsis" vert="horz" wrap="square" anchor="ctr" anchorCtr="1"/>
-        <a:lstStyle/>
-        <a:p>
-          <a:pPr>
-            <a:defRPr sz="2128" b="1" i="0" u="none" strike="noStrike" kern="1200" baseline="0">
-              <a:solidFill>
-                <a:schemeClr val="dk1"/>
-              </a:solidFill>
-              <a:latin typeface="+mn-lt"/>
-              <a:ea typeface="+mn-ea"/>
-              <a:cs typeface="+mn-cs"/>
-            </a:defRPr>
-          </a:pPr>
-          <a:endParaRPr lang="en-US"/>
-        </a:p>
-      </c:txPr>
     </c:title>
     <c:autoTitleDeleted val="0"/>
     <c:plotArea>
@@ -3427,28 +3300,28 @@
                 <c:formatCode>General</c:formatCode>
                 <c:ptCount val="8"/>
                 <c:pt idx="0">
-                  <c:v>1</c:v>
+                  <c:v>1.0</c:v>
                 </c:pt>
                 <c:pt idx="1">
-                  <c:v>2</c:v>
+                  <c:v>2.0</c:v>
                 </c:pt>
                 <c:pt idx="2">
-                  <c:v>4</c:v>
+                  <c:v>4.0</c:v>
                 </c:pt>
                 <c:pt idx="3">
-                  <c:v>8</c:v>
+                  <c:v>8.0</c:v>
                 </c:pt>
                 <c:pt idx="4">
-                  <c:v>12</c:v>
+                  <c:v>12.0</c:v>
                 </c:pt>
                 <c:pt idx="5">
-                  <c:v>16</c:v>
+                  <c:v>16.0</c:v>
                 </c:pt>
                 <c:pt idx="6">
-                  <c:v>20</c:v>
+                  <c:v>20.0</c:v>
                 </c:pt>
                 <c:pt idx="7">
-                  <c:v>24</c:v>
+                  <c:v>24.0</c:v>
                 </c:pt>
               </c:numCache>
             </c:numRef>
@@ -3460,28 +3333,28 @@
                 <c:formatCode>0.00E+00</c:formatCode>
                 <c:ptCount val="8"/>
                 <c:pt idx="0">
-                  <c:v>1</c:v>
+                  <c:v>1.0</c:v>
                 </c:pt>
                 <c:pt idx="1">
-                  <c:v>0.85602623971536584</c:v>
+                  <c:v>0.856026239715366</c:v>
                 </c:pt>
                 <c:pt idx="2">
-                  <c:v>0.7746430691525219</c:v>
+                  <c:v>0.774643069152522</c:v>
                 </c:pt>
                 <c:pt idx="3">
-                  <c:v>0.61110758338228066</c:v>
+                  <c:v>0.611107583382281</c:v>
                 </c:pt>
                 <c:pt idx="4">
-                  <c:v>0.55137322304579806</c:v>
+                  <c:v>0.551373223045798</c:v>
                 </c:pt>
                 <c:pt idx="5">
-                  <c:v>0.36065412505387029</c:v>
+                  <c:v>0.36065412505387</c:v>
                 </c:pt>
                 <c:pt idx="6">
-                  <c:v>0.3600637901845426</c:v>
+                  <c:v>0.360063790184543</c:v>
                 </c:pt>
                 <c:pt idx="7">
-                  <c:v>0.35199908560978399</c:v>
+                  <c:v>0.351999085609784</c:v>
                 </c:pt>
               </c:numCache>
             </c:numRef>
@@ -3587,28 +3460,28 @@
                 <c:formatCode>General</c:formatCode>
                 <c:ptCount val="8"/>
                 <c:pt idx="0">
-                  <c:v>1</c:v>
+                  <c:v>1.0</c:v>
                 </c:pt>
                 <c:pt idx="1">
-                  <c:v>2</c:v>
+                  <c:v>2.0</c:v>
                 </c:pt>
                 <c:pt idx="2">
-                  <c:v>4</c:v>
+                  <c:v>4.0</c:v>
                 </c:pt>
                 <c:pt idx="3">
-                  <c:v>8</c:v>
+                  <c:v>8.0</c:v>
                 </c:pt>
                 <c:pt idx="4">
-                  <c:v>12</c:v>
+                  <c:v>12.0</c:v>
                 </c:pt>
                 <c:pt idx="5">
-                  <c:v>16</c:v>
+                  <c:v>16.0</c:v>
                 </c:pt>
                 <c:pt idx="6">
-                  <c:v>20</c:v>
+                  <c:v>20.0</c:v>
                 </c:pt>
                 <c:pt idx="7">
-                  <c:v>24</c:v>
+                  <c:v>24.0</c:v>
                 </c:pt>
               </c:numCache>
             </c:numRef>
@@ -3620,28 +3493,28 @@
                 <c:formatCode>0.00E+00</c:formatCode>
                 <c:ptCount val="8"/>
                 <c:pt idx="0">
-                  <c:v>1</c:v>
+                  <c:v>1.0</c:v>
                 </c:pt>
                 <c:pt idx="1">
-                  <c:v>0.93343309070312031</c:v>
+                  <c:v>0.93343309070312</c:v>
                 </c:pt>
                 <c:pt idx="2">
-                  <c:v>0.83576248670620434</c:v>
+                  <c:v>0.835762486706204</c:v>
                 </c:pt>
                 <c:pt idx="3">
-                  <c:v>0.76207862841997742</c:v>
+                  <c:v>0.762078628419978</c:v>
                 </c:pt>
                 <c:pt idx="4">
-                  <c:v>0.67558984776543152</c:v>
+                  <c:v>0.675589847765432</c:v>
                 </c:pt>
                 <c:pt idx="5">
-                  <c:v>0.49105181231932404</c:v>
+                  <c:v>0.491051812319324</c:v>
                 </c:pt>
                 <c:pt idx="6">
-                  <c:v>0.43101203685812045</c:v>
+                  <c:v>0.43101203685812</c:v>
                 </c:pt>
                 <c:pt idx="7">
-                  <c:v>0.44975111813538199</c:v>
+                  <c:v>0.449751118135382</c:v>
                 </c:pt>
               </c:numCache>
             </c:numRef>
@@ -3650,7 +3523,7 @@
         </c:ser>
         <c:ser>
           <c:idx val="3"/>
-          <c:order val="3"/>
+          <c:order val="2"/>
           <c:tx>
             <c:strRef>
               <c:f>fibonacci!$C$56</c:f>
@@ -3747,28 +3620,28 @@
                 <c:formatCode>General</c:formatCode>
                 <c:ptCount val="8"/>
                 <c:pt idx="0">
-                  <c:v>1</c:v>
+                  <c:v>1.0</c:v>
                 </c:pt>
                 <c:pt idx="1">
-                  <c:v>2</c:v>
+                  <c:v>2.0</c:v>
                 </c:pt>
                 <c:pt idx="2">
-                  <c:v>4</c:v>
+                  <c:v>4.0</c:v>
                 </c:pt>
                 <c:pt idx="3">
-                  <c:v>8</c:v>
+                  <c:v>8.0</c:v>
                 </c:pt>
                 <c:pt idx="4">
-                  <c:v>12</c:v>
+                  <c:v>12.0</c:v>
                 </c:pt>
                 <c:pt idx="5">
-                  <c:v>16</c:v>
+                  <c:v>16.0</c:v>
                 </c:pt>
                 <c:pt idx="6">
-                  <c:v>20</c:v>
+                  <c:v>20.0</c:v>
                 </c:pt>
                 <c:pt idx="7">
-                  <c:v>24</c:v>
+                  <c:v>24.0</c:v>
                 </c:pt>
               </c:numCache>
             </c:numRef>
@@ -3780,25 +3653,25 @@
                 <c:formatCode>0.00E+00</c:formatCode>
                 <c:ptCount val="8"/>
                 <c:pt idx="0">
-                  <c:v>1</c:v>
+                  <c:v>1.0</c:v>
                 </c:pt>
                 <c:pt idx="1">
-                  <c:v>0.8417228067519491</c:v>
+                  <c:v>0.841722806751949</c:v>
                 </c:pt>
                 <c:pt idx="2">
-                  <c:v>1.4238216979159108</c:v>
+                  <c:v>1.42382169791591</c:v>
                 </c:pt>
                 <c:pt idx="3">
-                  <c:v>1.6034472192615539</c:v>
+                  <c:v>1.603447219261554</c:v>
                 </c:pt>
                 <c:pt idx="4">
                   <c:v>1.495291914733399</c:v>
                 </c:pt>
                 <c:pt idx="5">
-                  <c:v>1.2934117806705503</c:v>
+                  <c:v>1.29341178067055</c:v>
                 </c:pt>
                 <c:pt idx="6">
-                  <c:v>1.2236813146504291</c:v>
+                  <c:v>1.223681314650429</c:v>
                 </c:pt>
                 <c:pt idx="7">
                   <c:v>1.296931644782241</c:v>
@@ -3810,7 +3683,7 @@
         </c:ser>
         <c:ser>
           <c:idx val="5"/>
-          <c:order val="5"/>
+          <c:order val="3"/>
           <c:tx>
             <c:strRef>
               <c:f>fibonacci!$C$58</c:f>
@@ -3907,28 +3780,28 @@
                 <c:formatCode>General</c:formatCode>
                 <c:ptCount val="8"/>
                 <c:pt idx="0">
-                  <c:v>1</c:v>
+                  <c:v>1.0</c:v>
                 </c:pt>
                 <c:pt idx="1">
-                  <c:v>2</c:v>
+                  <c:v>2.0</c:v>
                 </c:pt>
                 <c:pt idx="2">
-                  <c:v>4</c:v>
+                  <c:v>4.0</c:v>
                 </c:pt>
                 <c:pt idx="3">
-                  <c:v>8</c:v>
+                  <c:v>8.0</c:v>
                 </c:pt>
                 <c:pt idx="4">
-                  <c:v>12</c:v>
+                  <c:v>12.0</c:v>
                 </c:pt>
                 <c:pt idx="5">
-                  <c:v>16</c:v>
+                  <c:v>16.0</c:v>
                 </c:pt>
                 <c:pt idx="6">
-                  <c:v>20</c:v>
+                  <c:v>20.0</c:v>
                 </c:pt>
                 <c:pt idx="7">
-                  <c:v>24</c:v>
+                  <c:v>24.0</c:v>
                 </c:pt>
               </c:numCache>
             </c:numRef>
@@ -3940,28 +3813,28 @@
                 <c:formatCode>0.00E+00</c:formatCode>
                 <c:ptCount val="8"/>
                 <c:pt idx="0">
-                  <c:v>1</c:v>
+                  <c:v>1.0</c:v>
                 </c:pt>
                 <c:pt idx="1">
-                  <c:v>1.1976373076739864</c:v>
+                  <c:v>1.197637307673986</c:v>
                 </c:pt>
                 <c:pt idx="2">
-                  <c:v>2.1441160417835321</c:v>
+                  <c:v>2.144116041783532</c:v>
                 </c:pt>
                 <c:pt idx="3">
-                  <c:v>3.2254836557705131</c:v>
+                  <c:v>3.225483655770513</c:v>
                 </c:pt>
                 <c:pt idx="4">
-                  <c:v>3.5592852423946897</c:v>
+                  <c:v>3.55928524239469</c:v>
                 </c:pt>
                 <c:pt idx="5">
-                  <c:v>3.1804292521118249</c:v>
+                  <c:v>3.180429252111825</c:v>
                 </c:pt>
                 <c:pt idx="6">
-                  <c:v>1.7338327175317261</c:v>
+                  <c:v>1.733832717531726</c:v>
                 </c:pt>
                 <c:pt idx="7">
-                  <c:v>2.8244783631161905</c:v>
+                  <c:v>2.82447836311619</c:v>
                 </c:pt>
               </c:numCache>
             </c:numRef>
@@ -3970,7 +3843,7 @@
         </c:ser>
         <c:ser>
           <c:idx val="7"/>
-          <c:order val="7"/>
+          <c:order val="4"/>
           <c:tx>
             <c:strRef>
               <c:f>fibonacci!$C$60</c:f>
@@ -4075,28 +3948,28 @@
                 <c:formatCode>General</c:formatCode>
                 <c:ptCount val="8"/>
                 <c:pt idx="0">
-                  <c:v>1</c:v>
+                  <c:v>1.0</c:v>
                 </c:pt>
                 <c:pt idx="1">
-                  <c:v>2</c:v>
+                  <c:v>2.0</c:v>
                 </c:pt>
                 <c:pt idx="2">
-                  <c:v>4</c:v>
+                  <c:v>4.0</c:v>
                 </c:pt>
                 <c:pt idx="3">
-                  <c:v>8</c:v>
+                  <c:v>8.0</c:v>
                 </c:pt>
                 <c:pt idx="4">
-                  <c:v>12</c:v>
+                  <c:v>12.0</c:v>
                 </c:pt>
                 <c:pt idx="5">
-                  <c:v>16</c:v>
+                  <c:v>16.0</c:v>
                 </c:pt>
                 <c:pt idx="6">
-                  <c:v>20</c:v>
+                  <c:v>20.0</c:v>
                 </c:pt>
                 <c:pt idx="7">
-                  <c:v>24</c:v>
+                  <c:v>24.0</c:v>
                 </c:pt>
               </c:numCache>
             </c:numRef>
@@ -4108,28 +3981,28 @@
                 <c:formatCode>0.00E+00</c:formatCode>
                 <c:ptCount val="8"/>
                 <c:pt idx="0">
-                  <c:v>1</c:v>
+                  <c:v>1.0</c:v>
                 </c:pt>
                 <c:pt idx="1">
-                  <c:v>1.2118390768357663</c:v>
+                  <c:v>1.211839076835766</c:v>
                 </c:pt>
                 <c:pt idx="2">
-                  <c:v>2.2387127775755369</c:v>
+                  <c:v>2.238712777575537</c:v>
                 </c:pt>
                 <c:pt idx="3">
-                  <c:v>3.8583869138144786</c:v>
+                  <c:v>3.858386913814478</c:v>
                 </c:pt>
                 <c:pt idx="4">
-                  <c:v>4.7333977820606759</c:v>
+                  <c:v>4.733397782060678</c:v>
                 </c:pt>
                 <c:pt idx="5">
                   <c:v>3.575050110918367</c:v>
                 </c:pt>
                 <c:pt idx="6">
-                  <c:v>2.9415267111310088</c:v>
+                  <c:v>2.94152671113101</c:v>
                 </c:pt>
                 <c:pt idx="7">
-                  <c:v>2.3805509792020216</c:v>
+                  <c:v>2.380550979202021</c:v>
                 </c:pt>
               </c:numCache>
             </c:numRef>
@@ -4138,7 +4011,7 @@
         </c:ser>
         <c:ser>
           <c:idx val="9"/>
-          <c:order val="9"/>
+          <c:order val="5"/>
           <c:tx>
             <c:strRef>
               <c:f>fibonacci!$C$62</c:f>
@@ -4243,28 +4116,28 @@
                 <c:formatCode>General</c:formatCode>
                 <c:ptCount val="8"/>
                 <c:pt idx="0">
-                  <c:v>1</c:v>
+                  <c:v>1.0</c:v>
                 </c:pt>
                 <c:pt idx="1">
-                  <c:v>2</c:v>
+                  <c:v>2.0</c:v>
                 </c:pt>
                 <c:pt idx="2">
-                  <c:v>4</c:v>
+                  <c:v>4.0</c:v>
                 </c:pt>
                 <c:pt idx="3">
-                  <c:v>8</c:v>
+                  <c:v>8.0</c:v>
                 </c:pt>
                 <c:pt idx="4">
-                  <c:v>12</c:v>
+                  <c:v>12.0</c:v>
                 </c:pt>
                 <c:pt idx="5">
-                  <c:v>16</c:v>
+                  <c:v>16.0</c:v>
                 </c:pt>
                 <c:pt idx="6">
-                  <c:v>20</c:v>
+                  <c:v>20.0</c:v>
                 </c:pt>
                 <c:pt idx="7">
-                  <c:v>24</c:v>
+                  <c:v>24.0</c:v>
                 </c:pt>
               </c:numCache>
             </c:numRef>
@@ -4276,28 +4149,28 @@
                 <c:formatCode>0.00E+00</c:formatCode>
                 <c:ptCount val="8"/>
                 <c:pt idx="0">
-                  <c:v>1</c:v>
+                  <c:v>1.0</c:v>
                 </c:pt>
                 <c:pt idx="1">
-                  <c:v>1.3075511682971426</c:v>
+                  <c:v>1.307551168297143</c:v>
                 </c:pt>
                 <c:pt idx="2">
-                  <c:v>2.4772709131545341</c:v>
+                  <c:v>2.477270913154534</c:v>
                 </c:pt>
                 <c:pt idx="3">
-                  <c:v>4.4070702839331739</c:v>
+                  <c:v>4.407070283933174</c:v>
                 </c:pt>
                 <c:pt idx="4">
                   <c:v>5.608509830851526</c:v>
                 </c:pt>
                 <c:pt idx="5">
-                  <c:v>4.0236281723009109</c:v>
+                  <c:v>4.023628172300911</c:v>
                 </c:pt>
                 <c:pt idx="6">
-                  <c:v>3.7306242900331168</c:v>
+                  <c:v>3.730624290033117</c:v>
                 </c:pt>
                 <c:pt idx="7">
-                  <c:v>3.2556279372272576</c:v>
+                  <c:v>3.255627937227258</c:v>
                 </c:pt>
               </c:numCache>
             </c:numRef>
@@ -4306,7 +4179,7 @@
         </c:ser>
         <c:ser>
           <c:idx val="11"/>
-          <c:order val="11"/>
+          <c:order val="6"/>
           <c:tx>
             <c:strRef>
               <c:f>fibonacci!$C$64</c:f>
@@ -4411,28 +4284,28 @@
                 <c:formatCode>General</c:formatCode>
                 <c:ptCount val="8"/>
                 <c:pt idx="0">
-                  <c:v>1</c:v>
+                  <c:v>1.0</c:v>
                 </c:pt>
                 <c:pt idx="1">
-                  <c:v>2</c:v>
+                  <c:v>2.0</c:v>
                 </c:pt>
                 <c:pt idx="2">
-                  <c:v>4</c:v>
+                  <c:v>4.0</c:v>
                 </c:pt>
                 <c:pt idx="3">
-                  <c:v>8</c:v>
+                  <c:v>8.0</c:v>
                 </c:pt>
                 <c:pt idx="4">
-                  <c:v>12</c:v>
+                  <c:v>12.0</c:v>
                 </c:pt>
                 <c:pt idx="5">
-                  <c:v>16</c:v>
+                  <c:v>16.0</c:v>
                 </c:pt>
                 <c:pt idx="6">
-                  <c:v>20</c:v>
+                  <c:v>20.0</c:v>
                 </c:pt>
                 <c:pt idx="7">
-                  <c:v>24</c:v>
+                  <c:v>24.0</c:v>
                 </c:pt>
               </c:numCache>
             </c:numRef>
@@ -4444,28 +4317,28 @@
                 <c:formatCode>0.00E+00</c:formatCode>
                 <c:ptCount val="8"/>
                 <c:pt idx="0">
-                  <c:v>1</c:v>
+                  <c:v>1.0</c:v>
                 </c:pt>
                 <c:pt idx="1">
-                  <c:v>1.3380600640251119</c:v>
+                  <c:v>1.338060064025112</c:v>
                 </c:pt>
                 <c:pt idx="2">
-                  <c:v>2.5336767522383554</c:v>
+                  <c:v>2.533676752238356</c:v>
                 </c:pt>
                 <c:pt idx="3">
-                  <c:v>4.3228729868729232</c:v>
+                  <c:v>4.322872986872922</c:v>
                 </c:pt>
                 <c:pt idx="4">
-                  <c:v>5.6455195132128981</c:v>
+                  <c:v>5.645519513212897</c:v>
                 </c:pt>
                 <c:pt idx="5">
-                  <c:v>5.7101303826428644</c:v>
+                  <c:v>5.710130382642865</c:v>
                 </c:pt>
                 <c:pt idx="6">
-                  <c:v>5.1677410664460144</c:v>
+                  <c:v>5.167741066446013</c:v>
                 </c:pt>
                 <c:pt idx="7">
-                  <c:v>4.7608849808537794</c:v>
+                  <c:v>4.760884980853778</c:v>
                 </c:pt>
               </c:numCache>
             </c:numRef>
@@ -4474,7 +4347,7 @@
         </c:ser>
         <c:ser>
           <c:idx val="13"/>
-          <c:order val="13"/>
+          <c:order val="7"/>
           <c:tx>
             <c:strRef>
               <c:f>fibonacci!$C$66</c:f>
@@ -4585,28 +4458,28 @@
                 <c:formatCode>General</c:formatCode>
                 <c:ptCount val="8"/>
                 <c:pt idx="0">
-                  <c:v>1</c:v>
+                  <c:v>1.0</c:v>
                 </c:pt>
                 <c:pt idx="1">
-                  <c:v>2</c:v>
+                  <c:v>2.0</c:v>
                 </c:pt>
                 <c:pt idx="2">
-                  <c:v>4</c:v>
+                  <c:v>4.0</c:v>
                 </c:pt>
                 <c:pt idx="3">
-                  <c:v>8</c:v>
+                  <c:v>8.0</c:v>
                 </c:pt>
                 <c:pt idx="4">
-                  <c:v>12</c:v>
+                  <c:v>12.0</c:v>
                 </c:pt>
                 <c:pt idx="5">
-                  <c:v>16</c:v>
+                  <c:v>16.0</c:v>
                 </c:pt>
                 <c:pt idx="6">
-                  <c:v>20</c:v>
+                  <c:v>20.0</c:v>
                 </c:pt>
                 <c:pt idx="7">
-                  <c:v>24</c:v>
+                  <c:v>24.0</c:v>
                 </c:pt>
               </c:numCache>
             </c:numRef>
@@ -4618,28 +4491,28 @@
                 <c:formatCode>0.00E+00</c:formatCode>
                 <c:ptCount val="8"/>
                 <c:pt idx="0">
-                  <c:v>1</c:v>
+                  <c:v>1.0</c:v>
                 </c:pt>
                 <c:pt idx="1">
-                  <c:v>1.3822242444190596</c:v>
+                  <c:v>1.382224244419059</c:v>
                 </c:pt>
                 <c:pt idx="2">
-                  <c:v>2.6540534846832555</c:v>
+                  <c:v>2.654053484683255</c:v>
                 </c:pt>
                 <c:pt idx="3">
-                  <c:v>4.5988958604429442</c:v>
+                  <c:v>4.598895860442943</c:v>
                 </c:pt>
                 <c:pt idx="4">
-                  <c:v>5.9473002411726243</c:v>
+                  <c:v>5.947300241172625</c:v>
                 </c:pt>
                 <c:pt idx="5">
-                  <c:v>6.542784261013014</c:v>
+                  <c:v>6.542784261013013</c:v>
                 </c:pt>
                 <c:pt idx="6">
-                  <c:v>6.6824076717509016</c:v>
+                  <c:v>6.682407671750901</c:v>
                 </c:pt>
                 <c:pt idx="7">
-                  <c:v>6.4891605690133165</c:v>
+                  <c:v>6.489160569013317</c:v>
                 </c:pt>
               </c:numCache>
             </c:numRef>
@@ -4654,8 +4527,8 @@
           <c:showPercent val="0"/>
           <c:showBubbleSize val="0"/>
         </c:dLbls>
-        <c:axId val="227273352"/>
-        <c:axId val="227275704"/>
+        <c:axId val="-2113478408"/>
+        <c:axId val="-2113469016"/>
         <c:extLst>
           <c:ext xmlns:c15="http://schemas.microsoft.com/office/drawing/2012/chart" uri="{02D57815-91ED-43cb-92C2-25804820EDAC}">
             <c15:filteredScatterSeries>
@@ -5780,10 +5653,10 @@
         </c:extLst>
       </c:scatterChart>
       <c:valAx>
-        <c:axId val="227273352"/>
+        <c:axId val="-2113478408"/>
         <c:scaling>
           <c:orientation val="minMax"/>
-          <c:max val="25"/>
+          <c:max val="25.0"/>
         </c:scaling>
         <c:delete val="0"/>
         <c:axPos val="b"/>
@@ -5824,6 +5697,7 @@
               </a:p>
             </c:rich>
           </c:tx>
+          <c:layout/>
           <c:overlay val="0"/>
           <c:spPr>
             <a:noFill/>
@@ -5832,23 +5706,6 @@
             </a:ln>
             <a:effectLst/>
           </c:spPr>
-          <c:txPr>
-            <a:bodyPr rot="0" spcFirstLastPara="1" vertOverflow="ellipsis" vert="horz" wrap="square" anchor="ctr" anchorCtr="1"/>
-            <a:lstStyle/>
-            <a:p>
-              <a:pPr>
-                <a:defRPr sz="1197" b="0" i="0" u="none" strike="noStrike" kern="1200" baseline="0">
-                  <a:solidFill>
-                    <a:schemeClr val="dk1"/>
-                  </a:solidFill>
-                  <a:latin typeface="+mn-lt"/>
-                  <a:ea typeface="+mn-ea"/>
-                  <a:cs typeface="+mn-cs"/>
-                </a:defRPr>
-              </a:pPr>
-              <a:endParaRPr lang="en-US"/>
-            </a:p>
-          </c:txPr>
         </c:title>
         <c:numFmt formatCode="General" sourceLinked="1"/>
         <c:majorTickMark val="none"/>
@@ -5878,12 +5735,12 @@
             <a:endParaRPr lang="en-US"/>
           </a:p>
         </c:txPr>
-        <c:crossAx val="227275704"/>
+        <c:crossAx val="-2113469016"/>
         <c:crosses val="autoZero"/>
         <c:crossBetween val="midCat"/>
       </c:valAx>
       <c:valAx>
-        <c:axId val="227275704"/>
+        <c:axId val="-2113469016"/>
         <c:scaling>
           <c:orientation val="minMax"/>
         </c:scaling>
@@ -5926,6 +5783,7 @@
               </a:p>
             </c:rich>
           </c:tx>
+          <c:layout/>
           <c:overlay val="0"/>
           <c:spPr>
             <a:noFill/>
@@ -5934,23 +5792,6 @@
             </a:ln>
             <a:effectLst/>
           </c:spPr>
-          <c:txPr>
-            <a:bodyPr rot="-5400000" spcFirstLastPara="1" vertOverflow="ellipsis" vert="horz" wrap="square" anchor="ctr" anchorCtr="1"/>
-            <a:lstStyle/>
-            <a:p>
-              <a:pPr>
-                <a:defRPr sz="1197" b="0" i="0" u="none" strike="noStrike" kern="1200" baseline="0">
-                  <a:solidFill>
-                    <a:schemeClr val="dk1"/>
-                  </a:solidFill>
-                  <a:latin typeface="+mn-lt"/>
-                  <a:ea typeface="+mn-ea"/>
-                  <a:cs typeface="+mn-cs"/>
-                </a:defRPr>
-              </a:pPr>
-              <a:endParaRPr lang="en-US"/>
-            </a:p>
-          </c:txPr>
         </c:title>
         <c:numFmt formatCode="#,##0" sourceLinked="0"/>
         <c:majorTickMark val="none"/>
@@ -5980,7 +5821,7 @@
             <a:endParaRPr lang="en-US"/>
           </a:p>
         </c:txPr>
-        <c:crossAx val="227273352"/>
+        <c:crossAx val="-2113478408"/>
         <c:crosses val="autoZero"/>
         <c:crossBetween val="midCat"/>
       </c:valAx>
@@ -5994,6 +5835,7 @@
     </c:plotArea>
     <c:legend>
       <c:legendPos val="r"/>
+      <c:layout/>
       <c:overlay val="0"/>
       <c:spPr>
         <a:noFill/>
@@ -6053,7 +5895,7 @@
       <a:endParaRPr lang="en-US"/>
     </a:p>
   </c:txPr>
-  <c:externalData r:id="rId3">
+  <c:externalData r:id="rId1">
     <c:autoUpdate val="0"/>
   </c:externalData>
 </c:chartSpace>
@@ -6096,6 +5938,7 @@
           </a:p>
         </c:rich>
       </c:tx>
+      <c:layout/>
       <c:overlay val="0"/>
       <c:spPr>
         <a:noFill/>
@@ -6104,23 +5947,6 @@
         </a:ln>
         <a:effectLst/>
       </c:spPr>
-      <c:txPr>
-        <a:bodyPr rot="0" spcFirstLastPara="1" vertOverflow="ellipsis" vert="horz" wrap="square" anchor="ctr" anchorCtr="1"/>
-        <a:lstStyle/>
-        <a:p>
-          <a:pPr>
-            <a:defRPr sz="2128" b="1" i="0" u="none" strike="noStrike" kern="1200" baseline="0">
-              <a:solidFill>
-                <a:schemeClr val="dk1"/>
-              </a:solidFill>
-              <a:latin typeface="+mn-lt"/>
-              <a:ea typeface="+mn-ea"/>
-              <a:cs typeface="+mn-cs"/>
-            </a:defRPr>
-          </a:pPr>
-          <a:endParaRPr lang="en-US"/>
-        </a:p>
-      </c:txPr>
     </c:title>
     <c:autoTitleDeleted val="0"/>
     <c:plotArea>
@@ -6129,10 +5955,10 @@
           <c:layoutTarget val="inner"/>
           <c:xMode val="edge"/>
           <c:yMode val="edge"/>
-          <c:x val="0.13026291901305764"/>
-          <c:y val="0.13466372896048545"/>
-          <c:w val="0.67806226099671818"/>
-          <c:h val="0.70534614365864823"/>
+          <c:x val="0.130262919013058"/>
+          <c:y val="0.134663728960485"/>
+          <c:w val="0.678062260996718"/>
+          <c:h val="0.705346143658648"/>
         </c:manualLayout>
       </c:layout>
       <c:scatterChart>
@@ -6237,58 +6063,58 @@
                 <c:formatCode>General</c:formatCode>
                 <c:ptCount val="18"/>
                 <c:pt idx="0">
-                  <c:v>6</c:v>
+                  <c:v>6.0</c:v>
                 </c:pt>
                 <c:pt idx="1">
-                  <c:v>8</c:v>
+                  <c:v>8.0</c:v>
                 </c:pt>
                 <c:pt idx="2">
-                  <c:v>10</c:v>
+                  <c:v>10.0</c:v>
                 </c:pt>
                 <c:pt idx="3">
-                  <c:v>12</c:v>
+                  <c:v>12.0</c:v>
                 </c:pt>
                 <c:pt idx="4">
-                  <c:v>14</c:v>
+                  <c:v>14.0</c:v>
                 </c:pt>
                 <c:pt idx="5">
-                  <c:v>16</c:v>
+                  <c:v>16.0</c:v>
                 </c:pt>
                 <c:pt idx="6">
-                  <c:v>18</c:v>
+                  <c:v>18.0</c:v>
                 </c:pt>
                 <c:pt idx="7">
-                  <c:v>20</c:v>
+                  <c:v>20.0</c:v>
                 </c:pt>
                 <c:pt idx="8">
-                  <c:v>22</c:v>
+                  <c:v>22.0</c:v>
                 </c:pt>
                 <c:pt idx="9">
-                  <c:v>24</c:v>
+                  <c:v>24.0</c:v>
                 </c:pt>
                 <c:pt idx="10">
-                  <c:v>26</c:v>
+                  <c:v>26.0</c:v>
                 </c:pt>
                 <c:pt idx="11">
-                  <c:v>28</c:v>
+                  <c:v>28.0</c:v>
                 </c:pt>
                 <c:pt idx="12">
-                  <c:v>30</c:v>
+                  <c:v>30.0</c:v>
                 </c:pt>
                 <c:pt idx="13">
-                  <c:v>32</c:v>
+                  <c:v>32.0</c:v>
                 </c:pt>
                 <c:pt idx="14">
-                  <c:v>34</c:v>
+                  <c:v>34.0</c:v>
                 </c:pt>
                 <c:pt idx="15">
-                  <c:v>36</c:v>
+                  <c:v>36.0</c:v>
                 </c:pt>
                 <c:pt idx="16">
-                  <c:v>38</c:v>
+                  <c:v>38.0</c:v>
                 </c:pt>
                 <c:pt idx="17">
-                  <c:v>40</c:v>
+                  <c:v>40.0</c:v>
                 </c:pt>
               </c:numCache>
             </c:numRef>
@@ -6457,58 +6283,58 @@
                 <c:formatCode>General</c:formatCode>
                 <c:ptCount val="18"/>
                 <c:pt idx="0">
-                  <c:v>6</c:v>
+                  <c:v>6.0</c:v>
                 </c:pt>
                 <c:pt idx="1">
-                  <c:v>8</c:v>
+                  <c:v>8.0</c:v>
                 </c:pt>
                 <c:pt idx="2">
-                  <c:v>10</c:v>
+                  <c:v>10.0</c:v>
                 </c:pt>
                 <c:pt idx="3">
-                  <c:v>12</c:v>
+                  <c:v>12.0</c:v>
                 </c:pt>
                 <c:pt idx="4">
-                  <c:v>14</c:v>
+                  <c:v>14.0</c:v>
                 </c:pt>
                 <c:pt idx="5">
-                  <c:v>16</c:v>
+                  <c:v>16.0</c:v>
                 </c:pt>
                 <c:pt idx="6">
-                  <c:v>18</c:v>
+                  <c:v>18.0</c:v>
                 </c:pt>
                 <c:pt idx="7">
-                  <c:v>20</c:v>
+                  <c:v>20.0</c:v>
                 </c:pt>
                 <c:pt idx="8">
-                  <c:v>22</c:v>
+                  <c:v>22.0</c:v>
                 </c:pt>
                 <c:pt idx="9">
-                  <c:v>24</c:v>
+                  <c:v>24.0</c:v>
                 </c:pt>
                 <c:pt idx="10">
-                  <c:v>26</c:v>
+                  <c:v>26.0</c:v>
                 </c:pt>
                 <c:pt idx="11">
-                  <c:v>28</c:v>
+                  <c:v>28.0</c:v>
                 </c:pt>
                 <c:pt idx="12">
-                  <c:v>30</c:v>
+                  <c:v>30.0</c:v>
                 </c:pt>
                 <c:pt idx="13">
-                  <c:v>32</c:v>
+                  <c:v>32.0</c:v>
                 </c:pt>
                 <c:pt idx="14">
-                  <c:v>34</c:v>
+                  <c:v>34.0</c:v>
                 </c:pt>
                 <c:pt idx="15">
-                  <c:v>36</c:v>
+                  <c:v>36.0</c:v>
                 </c:pt>
                 <c:pt idx="16">
-                  <c:v>38</c:v>
+                  <c:v>38.0</c:v>
                 </c:pt>
                 <c:pt idx="17">
-                  <c:v>40</c:v>
+                  <c:v>40.0</c:v>
                 </c:pt>
               </c:numCache>
             </c:numRef>
@@ -6520,52 +6346,52 @@
                 <c:formatCode>General</c:formatCode>
                 <c:ptCount val="18"/>
                 <c:pt idx="0">
-                  <c:v>40.351114648175034</c:v>
+                  <c:v>40.35111464817504</c:v>
                 </c:pt>
                 <c:pt idx="1">
-                  <c:v>14.583145363272205</c:v>
+                  <c:v>14.58314536327221</c:v>
                 </c:pt>
                 <c:pt idx="2">
-                  <c:v>5.2704399999999998</c:v>
+                  <c:v>5.27044</c:v>
                 </c:pt>
                 <c:pt idx="3">
-                  <c:v>1.9047700000000001</c:v>
+                  <c:v>1.90477</c:v>
                 </c:pt>
                 <c:pt idx="4">
-                  <c:v>0.74361299999999997</c:v>
+                  <c:v>0.743613</c:v>
                 </c:pt>
                 <c:pt idx="5">
-                  <c:v>0.33626299999999998</c:v>
+                  <c:v>0.336263</c:v>
                 </c:pt>
                 <c:pt idx="6">
-                  <c:v>0.19795699999999999</c:v>
+                  <c:v>0.197957</c:v>
                 </c:pt>
                 <c:pt idx="7">
-                  <c:v>0.15049399999999999</c:v>
+                  <c:v>0.150494</c:v>
                 </c:pt>
                 <c:pt idx="8">
-                  <c:v>0.13741100000000001</c:v>
+                  <c:v>0.137411</c:v>
                 </c:pt>
                 <c:pt idx="9">
-                  <c:v>0.13358100000000001</c:v>
+                  <c:v>0.133581</c:v>
                 </c:pt>
                 <c:pt idx="10">
                   <c:v>0.132605</c:v>
                 </c:pt>
                 <c:pt idx="11">
-                  <c:v>0.13283900000000001</c:v>
+                  <c:v>0.132839</c:v>
                 </c:pt>
                 <c:pt idx="12">
-                  <c:v>0.13504099999999999</c:v>
+                  <c:v>0.135041</c:v>
                 </c:pt>
                 <c:pt idx="13">
                   <c:v>0.140565</c:v>
                 </c:pt>
                 <c:pt idx="14">
-                  <c:v>0.15531900000000001</c:v>
+                  <c:v>0.155319</c:v>
                 </c:pt>
                 <c:pt idx="15">
-                  <c:v>0.21871199999999999</c:v>
+                  <c:v>0.218712</c:v>
                 </c:pt>
                 <c:pt idx="16">
                   <c:v>0.5</c:v>
@@ -6586,8 +6412,8 @@
           <c:showPercent val="0"/>
           <c:showBubbleSize val="0"/>
         </c:dLbls>
-        <c:axId val="227272568"/>
-        <c:axId val="227269824"/>
+        <c:axId val="-2088621208"/>
+        <c:axId val="-2087779432"/>
         <c:extLst>
           <c:ext xmlns:c15="http://schemas.microsoft.com/office/drawing/2012/chart" uri="{02D57815-91ED-43cb-92C2-25804820EDAC}">
             <c15:filteredScatterSeries>
@@ -6834,7 +6660,7 @@
         </c:extLst>
       </c:scatterChart>
       <c:valAx>
-        <c:axId val="227272568"/>
+        <c:axId val="-2088621208"/>
         <c:scaling>
           <c:orientation val="minMax"/>
         </c:scaling>
@@ -6877,6 +6703,7 @@
               </a:p>
             </c:rich>
           </c:tx>
+          <c:layout/>
           <c:overlay val="0"/>
           <c:spPr>
             <a:noFill/>
@@ -6885,23 +6712,6 @@
             </a:ln>
             <a:effectLst/>
           </c:spPr>
-          <c:txPr>
-            <a:bodyPr rot="0" spcFirstLastPara="1" vertOverflow="ellipsis" vert="horz" wrap="square" anchor="ctr" anchorCtr="1"/>
-            <a:lstStyle/>
-            <a:p>
-              <a:pPr>
-                <a:defRPr sz="1197" b="0" i="0" u="none" strike="noStrike" kern="1200" baseline="0">
-                  <a:solidFill>
-                    <a:schemeClr val="dk1"/>
-                  </a:solidFill>
-                  <a:latin typeface="+mn-lt"/>
-                  <a:ea typeface="+mn-ea"/>
-                  <a:cs typeface="+mn-cs"/>
-                </a:defRPr>
-              </a:pPr>
-              <a:endParaRPr lang="en-US"/>
-            </a:p>
-          </c:txPr>
         </c:title>
         <c:numFmt formatCode="General" sourceLinked="1"/>
         <c:majorTickMark val="none"/>
@@ -6931,14 +6741,14 @@
             <a:endParaRPr lang="en-US"/>
           </a:p>
         </c:txPr>
-        <c:crossAx val="227269824"/>
+        <c:crossAx val="-2087779432"/>
         <c:crossesAt val="0.1"/>
         <c:crossBetween val="midCat"/>
       </c:valAx>
       <c:valAx>
-        <c:axId val="227269824"/>
+        <c:axId val="-2087779432"/>
         <c:scaling>
-          <c:logBase val="10"/>
+          <c:logBase val="10.0"/>
           <c:orientation val="minMax"/>
         </c:scaling>
         <c:delete val="0"/>
@@ -6980,6 +6790,7 @@
               </a:p>
             </c:rich>
           </c:tx>
+          <c:layout/>
           <c:overlay val="0"/>
           <c:spPr>
             <a:noFill/>
@@ -6988,23 +6799,6 @@
             </a:ln>
             <a:effectLst/>
           </c:spPr>
-          <c:txPr>
-            <a:bodyPr rot="-5400000" spcFirstLastPara="1" vertOverflow="ellipsis" vert="horz" wrap="square" anchor="ctr" anchorCtr="1"/>
-            <a:lstStyle/>
-            <a:p>
-              <a:pPr>
-                <a:defRPr sz="1197" b="0" i="0" u="none" strike="noStrike" kern="1200" baseline="0">
-                  <a:solidFill>
-                    <a:schemeClr val="dk1"/>
-                  </a:solidFill>
-                  <a:latin typeface="+mn-lt"/>
-                  <a:ea typeface="+mn-ea"/>
-                  <a:cs typeface="+mn-cs"/>
-                </a:defRPr>
-              </a:pPr>
-              <a:endParaRPr lang="en-US"/>
-            </a:p>
-          </c:txPr>
         </c:title>
         <c:numFmt formatCode="General" sourceLinked="1"/>
         <c:majorTickMark val="none"/>
@@ -7034,7 +6828,7 @@
             <a:endParaRPr lang="en-US"/>
           </a:p>
         </c:txPr>
-        <c:crossAx val="227272568"/>
+        <c:crossAx val="-2088621208"/>
         <c:crosses val="autoZero"/>
         <c:crossBetween val="midCat"/>
       </c:valAx>
@@ -7048,6 +6842,7 @@
     </c:plotArea>
     <c:legend>
       <c:legendPos val="r"/>
+      <c:layout/>
       <c:overlay val="0"/>
       <c:spPr>
         <a:noFill/>
@@ -7107,7 +6902,7 @@
       <a:endParaRPr lang="en-US"/>
     </a:p>
   </c:txPr>
-  <c:externalData r:id="rId3">
+  <c:externalData r:id="rId1">
     <c:autoUpdate val="0"/>
   </c:externalData>
 </c:chartSpace>
@@ -9361,7 +9156,7 @@
           <a:p>
             <a:fld id="{FEB80FAA-87D6-497E-80FC-86163C79CB54}" type="datetimeFigureOut">
               <a:rPr lang="en-US" smtClean="0"/>
-              <a:t>10/18/2016</a:t>
+              <a:t>18/10/16</a:t>
             </a:fld>
             <a:endParaRPr lang="en-US"/>
           </a:p>
@@ -10644,7 +10439,7 @@
   <p:timing>
     <p:tnLst>
       <p:par>
-        <p:cTn id="1" dur="indefinite" restart="never" nodeType="tmRoot"/>
+        <p:cTn xmlns:p14="http://schemas.microsoft.com/office/powerpoint/2010/main" id="1" dur="indefinite" restart="never" nodeType="tmRoot"/>
       </p:par>
     </p:tnLst>
   </p:timing>
@@ -11336,7 +11131,7 @@
   <p:timing>
     <p:tnLst>
       <p:par>
-        <p:cTn id="1" dur="indefinite" restart="never" nodeType="tmRoot"/>
+        <p:cTn xmlns:p14="http://schemas.microsoft.com/office/powerpoint/2010/main" id="1" dur="indefinite" restart="never" nodeType="tmRoot"/>
       </p:par>
     </p:tnLst>
   </p:timing>
@@ -12005,7 +11800,7 @@
   <p:timing>
     <p:tnLst>
       <p:par>
-        <p:cTn id="1" dur="indefinite" restart="never" nodeType="tmRoot"/>
+        <p:cTn xmlns:p14="http://schemas.microsoft.com/office/powerpoint/2010/main" id="1" dur="indefinite" restart="never" nodeType="tmRoot"/>
       </p:par>
     </p:tnLst>
   </p:timing>
@@ -12538,7 +12333,7 @@
   <p:timing>
     <p:tnLst>
       <p:par>
-        <p:cTn id="1" dur="indefinite" restart="never" nodeType="tmRoot"/>
+        <p:cTn xmlns:p14="http://schemas.microsoft.com/office/powerpoint/2010/main" id="1" dur="indefinite" restart="never" nodeType="tmRoot"/>
       </p:par>
     </p:tnLst>
   </p:timing>
@@ -12738,7 +12533,7 @@
   <p:timing>
     <p:tnLst>
       <p:par>
-        <p:cTn id="1" dur="indefinite" restart="never" nodeType="tmRoot"/>
+        <p:cTn xmlns:p14="http://schemas.microsoft.com/office/powerpoint/2010/main" id="1" dur="indefinite" restart="never" nodeType="tmRoot"/>
       </p:par>
     </p:tnLst>
   </p:timing>
@@ -14490,7 +14285,7 @@
   <p:timing>
     <p:tnLst>
       <p:par>
-        <p:cTn id="1" dur="indefinite" restart="never" nodeType="tmRoot"/>
+        <p:cTn xmlns:p14="http://schemas.microsoft.com/office/powerpoint/2010/main" id="1" dur="indefinite" restart="never" nodeType="tmRoot"/>
       </p:par>
     </p:tnLst>
   </p:timing>
@@ -15061,7 +14856,7 @@
   <p:timing>
     <p:tnLst>
       <p:par>
-        <p:cTn id="1" dur="indefinite" restart="never" nodeType="tmRoot"/>
+        <p:cTn xmlns:p14="http://schemas.microsoft.com/office/powerpoint/2010/main" id="1" dur="indefinite" restart="never" nodeType="tmRoot"/>
       </p:par>
     </p:tnLst>
   </p:timing>
@@ -15092,11 +14887,15 @@
             <a:graphicFrameLocks/>
           </p:cNvGraphicFramePr>
           <p:nvPr>
-            <p:extLst/>
+            <p:extLst>
+              <p:ext uri="{D42A27DB-BD31-4B8C-83A1-F6EECF244321}">
+                <p14:modId xmlns:p14="http://schemas.microsoft.com/office/powerpoint/2010/main" val="8608439"/>
+              </p:ext>
+            </p:extLst>
           </p:nvPr>
         </p:nvGraphicFramePr>
         <p:xfrm>
-          <a:off x="1097280" y="2057400"/>
+          <a:off x="0" y="1831866"/>
           <a:ext cx="6048375" cy="4343400"/>
         </p:xfrm>
         <a:graphic>
@@ -15213,11 +15012,15 @@
             <a:graphicFrameLocks/>
           </p:cNvGraphicFramePr>
           <p:nvPr>
-            <p:extLst/>
+            <p:extLst>
+              <p:ext uri="{D42A27DB-BD31-4B8C-83A1-F6EECF244321}">
+                <p14:modId xmlns:p14="http://schemas.microsoft.com/office/powerpoint/2010/main" val="3094678622"/>
+              </p:ext>
+            </p:extLst>
           </p:nvPr>
         </p:nvGraphicFramePr>
         <p:xfrm>
-          <a:off x="5091112" y="1838325"/>
+          <a:off x="6119812" y="1850196"/>
           <a:ext cx="6072188" cy="4371975"/>
         </p:xfrm>
         <a:graphic>
@@ -15247,7 +15050,7 @@
   <p:timing>
     <p:tnLst>
       <p:par>
-        <p:cTn id="1" dur="indefinite" restart="never" nodeType="tmRoot">
+        <p:cTn xmlns:p14="http://schemas.microsoft.com/office/powerpoint/2010/main" id="1" dur="indefinite" restart="never" nodeType="tmRoot">
           <p:childTnLst>
             <p:seq concurrent="1" nextAc="seek">
               <p:cTn id="2" dur="indefinite" nodeType="mainSeq">
@@ -16597,7 +16400,7 @@
   <p:timing>
     <p:tnLst>
       <p:par>
-        <p:cTn id="1" dur="indefinite" restart="never" nodeType="tmRoot"/>
+        <p:cTn xmlns:p14="http://schemas.microsoft.com/office/powerpoint/2010/main" id="1" dur="indefinite" restart="never" nodeType="tmRoot"/>
       </p:par>
     </p:tnLst>
   </p:timing>
@@ -16671,7 +16474,9 @@
         </p:nvSpPr>
         <p:spPr/>
         <p:txBody>
-          <a:bodyPr/>
+          <a:bodyPr>
+            <a:normAutofit fontScale="90000"/>
+          </a:bodyPr>
           <a:lstStyle/>
           <a:p>
             <a:r>
@@ -17212,7 +17017,7 @@
   <p:timing>
     <p:tnLst>
       <p:par>
-        <p:cTn id="1" dur="indefinite" restart="never" nodeType="tmRoot"/>
+        <p:cTn xmlns:p14="http://schemas.microsoft.com/office/powerpoint/2010/main" id="1" dur="indefinite" restart="never" nodeType="tmRoot"/>
       </p:par>
     </p:tnLst>
   </p:timing>
@@ -17248,7 +17053,9 @@
         </p:nvSpPr>
         <p:spPr/>
         <p:txBody>
-          <a:bodyPr/>
+          <a:bodyPr>
+            <a:normAutofit fontScale="90000"/>
+          </a:bodyPr>
           <a:lstStyle/>
           <a:p>
             <a:r>
@@ -17378,7 +17185,7 @@
   <p:timing>
     <p:tnLst>
       <p:par>
-        <p:cTn id="1" dur="indefinite" restart="never" nodeType="tmRoot">
+        <p:cTn xmlns:p14="http://schemas.microsoft.com/office/powerpoint/2010/main" id="1" dur="indefinite" restart="never" nodeType="tmRoot">
           <p:childTnLst>
             <p:seq concurrent="1" nextAc="seek">
               <p:cTn id="2" dur="indefinite" nodeType="mainSeq">
@@ -17919,7 +17726,7 @@
   <p:timing>
     <p:tnLst>
       <p:par>
-        <p:cTn id="1" dur="indefinite" restart="never" nodeType="tmRoot"/>
+        <p:cTn xmlns:p14="http://schemas.microsoft.com/office/powerpoint/2010/main" id="1" dur="indefinite" restart="never" nodeType="tmRoot"/>
       </p:par>
     </p:tnLst>
   </p:timing>
@@ -18138,7 +17945,7 @@
   <p:timing>
     <p:tnLst>
       <p:par>
-        <p:cTn id="1" dur="indefinite" restart="never" nodeType="tmRoot"/>
+        <p:cTn xmlns:p14="http://schemas.microsoft.com/office/powerpoint/2010/main" id="1" dur="indefinite" restart="never" nodeType="tmRoot"/>
       </p:par>
     </p:tnLst>
   </p:timing>
@@ -18209,7 +18016,15 @@
           <a:p>
             <a:r>
               <a:rPr lang="en-US" sz="2400" dirty="0" smtClean="0"/>
-              <a:t>Special technique allowing to automatically transform code</a:t>
+              <a:t>Special technique allowing </a:t>
+            </a:r>
+            <a:r>
+              <a:rPr lang="en-US" sz="2400" dirty="0" smtClean="0"/>
+              <a:t>automatic transformation of </a:t>
+            </a:r>
+            <a:r>
+              <a:rPr lang="en-US" sz="2400" dirty="0" smtClean="0"/>
+              <a:t>code</a:t>
             </a:r>
           </a:p>
           <a:p>
@@ -18687,7 +18502,7 @@
   <p:timing>
     <p:tnLst>
       <p:par>
-        <p:cTn id="1" dur="indefinite" restart="never" nodeType="tmRoot"/>
+        <p:cTn xmlns:p14="http://schemas.microsoft.com/office/powerpoint/2010/main" id="1" dur="indefinite" restart="never" nodeType="tmRoot"/>
       </p:par>
     </p:tnLst>
   </p:timing>
@@ -20170,7 +19985,7 @@
   <p:timing>
     <p:tnLst>
       <p:par>
-        <p:cTn id="1" dur="indefinite" restart="never" nodeType="tmRoot">
+        <p:cTn xmlns:p14="http://schemas.microsoft.com/office/powerpoint/2010/main" id="1" dur="indefinite" restart="never" nodeType="tmRoot">
           <p:childTnLst>
             <p:seq concurrent="1" nextAc="seek">
               <p:cTn id="2" dur="indefinite" nodeType="mainSeq">
@@ -21470,7 +21285,7 @@
   <p:timing>
     <p:tnLst>
       <p:par>
-        <p:cTn id="1" dur="indefinite" restart="never" nodeType="tmRoot"/>
+        <p:cTn xmlns:p14="http://schemas.microsoft.com/office/powerpoint/2010/main" id="1" dur="indefinite" restart="never" nodeType="tmRoot"/>
       </p:par>
     </p:tnLst>
   </p:timing>
@@ -22241,7 +22056,7 @@
   <p:timing>
     <p:tnLst>
       <p:par>
-        <p:cTn id="1" dur="indefinite" restart="never" nodeType="tmRoot"/>
+        <p:cTn xmlns:p14="http://schemas.microsoft.com/office/powerpoint/2010/main" id="1" dur="indefinite" restart="never" nodeType="tmRoot"/>
       </p:par>
     </p:tnLst>
   </p:timing>
@@ -23029,7 +22844,7 @@
   <p:timing>
     <p:tnLst>
       <p:par>
-        <p:cTn id="1" dur="indefinite" restart="never" nodeType="tmRoot"/>
+        <p:cTn xmlns:p14="http://schemas.microsoft.com/office/powerpoint/2010/main" id="1" dur="indefinite" restart="never" nodeType="tmRoot"/>
       </p:par>
     </p:tnLst>
   </p:timing>
@@ -23871,7 +23686,7 @@
   <p:timing>
     <p:tnLst>
       <p:par>
-        <p:cTn id="1" dur="indefinite" restart="never" nodeType="tmRoot">
+        <p:cTn xmlns:p14="http://schemas.microsoft.com/office/powerpoint/2010/main" id="1" dur="indefinite" restart="never" nodeType="tmRoot">
           <p:childTnLst>
             <p:seq concurrent="1" nextAc="seek">
               <p:cTn id="2" dur="indefinite" nodeType="mainSeq">
@@ -24496,7 +24311,7 @@
   <p:timing>
     <p:tnLst>
       <p:par>
-        <p:cTn id="1" dur="indefinite" restart="never" nodeType="tmRoot"/>
+        <p:cTn xmlns:p14="http://schemas.microsoft.com/office/powerpoint/2010/main" id="1" dur="indefinite" restart="never" nodeType="tmRoot"/>
       </p:par>
     </p:tnLst>
   </p:timing>
@@ -24885,10 +24700,6 @@
               </a:rPr>
               <a:t>); </a:t>
             </a:r>
-            <a:endParaRPr lang="en-US" dirty="0" smtClean="0">
-              <a:latin typeface="Consolas" panose="020B0609020204030204" pitchFamily="49" charset="0"/>
-              <a:cs typeface="Consolas" panose="020B0609020204030204" pitchFamily="49" charset="0"/>
-            </a:endParaRPr>
           </a:p>
           <a:p>
             <a:pPr marL="274320" lvl="1" indent="0">
@@ -24906,14 +24717,7 @@
                 <a:latin typeface="Consolas" panose="020B0609020204030204" pitchFamily="49" charset="0"/>
                 <a:cs typeface="Consolas" panose="020B0609020204030204" pitchFamily="49" charset="0"/>
               </a:rPr>
-              <a:t>       </a:t>
-            </a:r>
-            <a:r>
-              <a:rPr lang="en-US" dirty="0" smtClean="0">
-                <a:latin typeface="Consolas" panose="020B0609020204030204" pitchFamily="49" charset="0"/>
-                <a:cs typeface="Consolas" panose="020B0609020204030204" pitchFamily="49" charset="0"/>
-              </a:rPr>
-              <a:t>return </a:t>
+              <a:t>       return </a:t>
             </a:r>
             <a:r>
               <a:rPr lang="en-US" dirty="0" err="1" smtClean="0">
@@ -24976,10 +24780,6 @@
               </a:rPr>
               <a:t>   // recursive sort</a:t>
             </a:r>
-            <a:endParaRPr lang="en-US" dirty="0" smtClean="0">
-              <a:latin typeface="Consolas" panose="020B0609020204030204" pitchFamily="49" charset="0"/>
-              <a:cs typeface="Consolas" panose="020B0609020204030204" pitchFamily="49" charset="0"/>
-            </a:endParaRPr>
           </a:p>
           <a:p>
             <a:pPr marL="274320" lvl="1" indent="0">
@@ -24990,14 +24790,7 @@
                 <a:latin typeface="Consolas" panose="020B0609020204030204" pitchFamily="49" charset="0"/>
                 <a:cs typeface="Consolas" panose="020B0609020204030204" pitchFamily="49" charset="0"/>
               </a:rPr>
-              <a:t>    </a:t>
-            </a:r>
-            <a:r>
-              <a:rPr lang="en-US" dirty="0" smtClean="0">
-                <a:latin typeface="Consolas" panose="020B0609020204030204" pitchFamily="49" charset="0"/>
-                <a:cs typeface="Consolas" panose="020B0609020204030204" pitchFamily="49" charset="0"/>
-              </a:rPr>
-              <a:t>future&lt;</a:t>
+              <a:t>    future&lt;</a:t>
             </a:r>
             <a:r>
               <a:rPr lang="en-US" dirty="0" err="1" smtClean="0">
@@ -25208,70 +25001,35 @@
                 <a:latin typeface="Consolas" panose="020B0609020204030204" pitchFamily="49" charset="0"/>
                 <a:cs typeface="Consolas" panose="020B0609020204030204" pitchFamily="49" charset="0"/>
               </a:rPr>
-              <a:t>       </a:t>
+              <a:t>       [](future&lt;</a:t>
+            </a:r>
+            <a:r>
+              <a:rPr lang="en-US" dirty="0" err="1" smtClean="0">
+                <a:latin typeface="Consolas" panose="020B0609020204030204" pitchFamily="49" charset="0"/>
+                <a:cs typeface="Consolas" panose="020B0609020204030204" pitchFamily="49" charset="0"/>
+              </a:rPr>
+              <a:t>RandomIt</a:t>
             </a:r>
             <a:r>
               <a:rPr lang="en-US" dirty="0" smtClean="0">
                 <a:latin typeface="Consolas" panose="020B0609020204030204" pitchFamily="49" charset="0"/>
                 <a:cs typeface="Consolas" panose="020B0609020204030204" pitchFamily="49" charset="0"/>
               </a:rPr>
-              <a:t>[](</a:t>
+              <a:t>&gt;, future&lt;</a:t>
+            </a:r>
+            <a:r>
+              <a:rPr lang="en-US" dirty="0" err="1" smtClean="0">
+                <a:latin typeface="Consolas" panose="020B0609020204030204" pitchFamily="49" charset="0"/>
+                <a:cs typeface="Consolas" panose="020B0609020204030204" pitchFamily="49" charset="0"/>
+              </a:rPr>
+              <a:t>RandomIt</a:t>
             </a:r>
             <a:r>
               <a:rPr lang="en-US" dirty="0" smtClean="0">
                 <a:latin typeface="Consolas" panose="020B0609020204030204" pitchFamily="49" charset="0"/>
                 <a:cs typeface="Consolas" panose="020B0609020204030204" pitchFamily="49" charset="0"/>
               </a:rPr>
-              <a:t>future&lt;</a:t>
-            </a:r>
-            <a:r>
-              <a:rPr lang="en-US" dirty="0" err="1" smtClean="0">
-                <a:latin typeface="Consolas" panose="020B0609020204030204" pitchFamily="49" charset="0"/>
-                <a:cs typeface="Consolas" panose="020B0609020204030204" pitchFamily="49" charset="0"/>
-              </a:rPr>
-              <a:t>RandomIt</a:t>
-            </a:r>
-            <a:r>
-              <a:rPr lang="en-US" dirty="0" smtClean="0">
-                <a:latin typeface="Consolas" panose="020B0609020204030204" pitchFamily="49" charset="0"/>
-                <a:cs typeface="Consolas" panose="020B0609020204030204" pitchFamily="49" charset="0"/>
-              </a:rPr>
-              <a:t>&gt;, future&lt;</a:t>
-            </a:r>
-            <a:r>
-              <a:rPr lang="en-US" dirty="0" err="1" smtClean="0">
-                <a:latin typeface="Consolas" panose="020B0609020204030204" pitchFamily="49" charset="0"/>
-                <a:cs typeface="Consolas" panose="020B0609020204030204" pitchFamily="49" charset="0"/>
-              </a:rPr>
-              <a:t>RandomIt</a:t>
-            </a:r>
-            <a:r>
-              <a:rPr lang="en-US" dirty="0" smtClean="0">
-                <a:latin typeface="Consolas" panose="020B0609020204030204" pitchFamily="49" charset="0"/>
-                <a:cs typeface="Consolas" panose="020B0609020204030204" pitchFamily="49" charset="0"/>
-              </a:rPr>
-              <a:t>&gt; right) </a:t>
-            </a:r>
-            <a:r>
-              <a:rPr lang="en-US" dirty="0" smtClean="0">
-                <a:latin typeface="Consolas" panose="020B0609020204030204" pitchFamily="49" charset="0"/>
-                <a:cs typeface="Consolas" panose="020B0609020204030204" pitchFamily="49" charset="0"/>
-              </a:rPr>
-              <a:t>{ return </a:t>
-            </a:r>
-            <a:r>
-              <a:rPr lang="en-US" dirty="0" smtClean="0">
-                <a:latin typeface="Consolas" panose="020B0609020204030204" pitchFamily="49" charset="0"/>
-                <a:cs typeface="Consolas" panose="020B0609020204030204" pitchFamily="49" charset="0"/>
-              </a:rPr>
-              <a:t>right; </a:t>
-            </a:r>
-            <a:r>
-              <a:rPr lang="en-US" dirty="0" smtClean="0">
-                <a:latin typeface="Consolas" panose="020B0609020204030204" pitchFamily="49" charset="0"/>
-                <a:cs typeface="Consolas" panose="020B0609020204030204" pitchFamily="49" charset="0"/>
-              </a:rPr>
-              <a:t>},</a:t>
+              <a:t>&gt; right) { return right; },</a:t>
             </a:r>
             <a:endParaRPr lang="en-US" dirty="0">
               <a:latin typeface="Consolas" panose="020B0609020204030204" pitchFamily="49" charset="0"/>
@@ -25420,7 +25178,7 @@
   <p:timing>
     <p:tnLst>
       <p:par>
-        <p:cTn id="1" dur="indefinite" restart="never" nodeType="tmRoot">
+        <p:cTn xmlns:p14="http://schemas.microsoft.com/office/powerpoint/2010/main" id="1" dur="indefinite" restart="never" nodeType="tmRoot">
           <p:childTnLst>
             <p:seq concurrent="1" nextAc="seek">
               <p:cTn id="2" dur="indefinite" nodeType="mainSeq">
@@ -27424,10 +27182,6 @@
               </a:rPr>
               <a:t>); </a:t>
             </a:r>
-            <a:endParaRPr lang="en-US" dirty="0" smtClean="0">
-              <a:latin typeface="Consolas" panose="020B0609020204030204" pitchFamily="49" charset="0"/>
-              <a:cs typeface="Consolas" panose="020B0609020204030204" pitchFamily="49" charset="0"/>
-            </a:endParaRPr>
           </a:p>
           <a:p>
             <a:pPr marL="274320" lvl="1" indent="0">
@@ -27452,14 +27206,7 @@
                 <a:latin typeface="Consolas" panose="020B0609020204030204" pitchFamily="49" charset="0"/>
                 <a:cs typeface="Consolas" panose="020B0609020204030204" pitchFamily="49" charset="0"/>
               </a:rPr>
-              <a:t>co_</a:t>
-            </a:r>
-            <a:r>
-              <a:rPr lang="en-US" smtClean="0">
-                <a:latin typeface="Consolas" panose="020B0609020204030204" pitchFamily="49" charset="0"/>
-                <a:cs typeface="Consolas" panose="020B0609020204030204" pitchFamily="49" charset="0"/>
-              </a:rPr>
-              <a:t>return</a:t>
+              <a:t>co_return</a:t>
             </a:r>
             <a:r>
               <a:rPr lang="en-US" dirty="0" smtClean="0">
@@ -27524,10 +27271,6 @@
               </a:rPr>
               <a:t>   // recursive sort</a:t>
             </a:r>
-            <a:endParaRPr lang="en-US" dirty="0" smtClean="0">
-              <a:latin typeface="Consolas" panose="020B0609020204030204" pitchFamily="49" charset="0"/>
-              <a:cs typeface="Consolas" panose="020B0609020204030204" pitchFamily="49" charset="0"/>
-            </a:endParaRPr>
           </a:p>
           <a:p>
             <a:pPr marL="274320" lvl="1" indent="0">
@@ -27538,14 +27281,7 @@
                 <a:latin typeface="Consolas" panose="020B0609020204030204" pitchFamily="49" charset="0"/>
                 <a:cs typeface="Consolas" panose="020B0609020204030204" pitchFamily="49" charset="0"/>
               </a:rPr>
-              <a:t>    </a:t>
-            </a:r>
-            <a:r>
-              <a:rPr lang="en-US" dirty="0" smtClean="0">
-                <a:latin typeface="Consolas" panose="020B0609020204030204" pitchFamily="49" charset="0"/>
-                <a:cs typeface="Consolas" panose="020B0609020204030204" pitchFamily="49" charset="0"/>
-              </a:rPr>
-              <a:t>future&lt;</a:t>
+              <a:t>    future&lt;</a:t>
             </a:r>
             <a:r>
               <a:rPr lang="en-US" dirty="0" err="1" smtClean="0">
@@ -27888,7 +27624,7 @@
   <p:timing>
     <p:tnLst>
       <p:par>
-        <p:cTn id="1" dur="indefinite" restart="never" nodeType="tmRoot">
+        <p:cTn xmlns:p14="http://schemas.microsoft.com/office/powerpoint/2010/main" id="1" dur="indefinite" restart="never" nodeType="tmRoot">
           <p:childTnLst>
             <p:seq concurrent="1" nextAc="seek">
               <p:cTn id="2" dur="indefinite" nodeType="mainSeq">
@@ -29637,7 +29373,7 @@
   <p:timing>
     <p:tnLst>
       <p:par>
-        <p:cTn id="1" dur="indefinite" restart="never" nodeType="tmRoot"/>
+        <p:cTn xmlns:p14="http://schemas.microsoft.com/office/powerpoint/2010/main" id="1" dur="indefinite" restart="never" nodeType="tmRoot"/>
       </p:par>
     </p:tnLst>
   </p:timing>
@@ -29787,7 +29523,7 @@
   <p:timing>
     <p:tnLst>
       <p:par>
-        <p:cTn id="1" dur="indefinite" restart="never" nodeType="tmRoot"/>
+        <p:cTn xmlns:p14="http://schemas.microsoft.com/office/powerpoint/2010/main" id="1" dur="indefinite" restart="never" nodeType="tmRoot"/>
       </p:par>
     </p:tnLst>
   </p:timing>
@@ -30338,7 +30074,7 @@
   <p:timing>
     <p:tnLst>
       <p:par>
-        <p:cTn id="1" dur="indefinite" restart="never" nodeType="tmRoot">
+        <p:cTn xmlns:p14="http://schemas.microsoft.com/office/powerpoint/2010/main" id="1" dur="indefinite" restart="never" nodeType="tmRoot">
           <p:childTnLst>
             <p:seq concurrent="1" nextAc="seek">
               <p:cTn id="2" dur="indefinite" nodeType="mainSeq">
@@ -31404,7 +31140,7 @@
   <p:timing>
     <p:tnLst>
       <p:par>
-        <p:cTn id="1" dur="indefinite" restart="never" nodeType="tmRoot"/>
+        <p:cTn xmlns:p14="http://schemas.microsoft.com/office/powerpoint/2010/main" id="1" dur="indefinite" restart="never" nodeType="tmRoot"/>
       </p:par>
     </p:tnLst>
   </p:timing>
@@ -32350,7 +32086,7 @@
   <p:timing>
     <p:tnLst>
       <p:par>
-        <p:cTn id="1" dur="indefinite" restart="never" nodeType="tmRoot">
+        <p:cTn xmlns:p14="http://schemas.microsoft.com/office/powerpoint/2010/main" id="1" dur="indefinite" restart="never" nodeType="tmRoot">
           <p:childTnLst>
             <p:seq concurrent="1" nextAc="seek">
               <p:cTn id="2" dur="indefinite" nodeType="mainSeq">
@@ -33843,7 +33579,7 @@
   <p:timing>
     <p:tnLst>
       <p:par>
-        <p:cTn id="1" dur="indefinite" restart="never" nodeType="tmRoot">
+        <p:cTn xmlns:p14="http://schemas.microsoft.com/office/powerpoint/2010/main" id="1" dur="indefinite" restart="never" nodeType="tmRoot">
           <p:childTnLst>
             <p:seq concurrent="1" nextAc="seek">
               <p:cTn id="2" dur="indefinite" nodeType="mainSeq">
@@ -34311,7 +34047,7 @@
   <p:timing>
     <p:tnLst>
       <p:par>
-        <p:cTn id="1" dur="indefinite" restart="never" nodeType="tmRoot"/>
+        <p:cTn xmlns:p14="http://schemas.microsoft.com/office/powerpoint/2010/main" id="1" dur="indefinite" restart="never" nodeType="tmRoot"/>
       </p:par>
     </p:tnLst>
   </p:timing>
@@ -34343,7 +34079,7 @@
         </p:nvSpPr>
         <p:spPr>
           <a:xfrm>
-            <a:off x="1409700" y="2328051"/>
+            <a:off x="920036" y="2328051"/>
             <a:ext cx="8572500" cy="3581400"/>
           </a:xfrm>
           <a:prstGeom prst="rect">
@@ -34377,6 +34113,351 @@
       </p:sp>
       <p:sp>
         <p:nvSpPr>
+          <p:cNvPr id="11" name="Content Placeholder 10"/>
+          <p:cNvSpPr>
+            <a:spLocks noGrp="1"/>
+          </p:cNvSpPr>
+          <p:nvPr>
+            <p:ph idx="1"/>
+          </p:nvPr>
+        </p:nvSpPr>
+        <p:spPr>
+          <a:xfrm>
+            <a:off x="559242" y="1832228"/>
+            <a:ext cx="8595360" cy="4351337"/>
+          </a:xfrm>
+        </p:spPr>
+        <p:txBody>
+          <a:bodyPr/>
+          <a:lstStyle/>
+          <a:p>
+            <a:r>
+              <a:rPr lang="en-US" dirty="0" smtClean="0"/>
+              <a:t>Synchronous way:</a:t>
+            </a:r>
+          </a:p>
+          <a:p>
+            <a:pPr marL="0" indent="0">
+              <a:buNone/>
+            </a:pPr>
+            <a:r>
+              <a:rPr lang="en-US" sz="1800" dirty="0" smtClean="0">
+                <a:latin typeface="Consolas" panose="020B0609020204030204" pitchFamily="49" charset="0"/>
+                <a:cs typeface="Consolas" panose="020B0609020204030204" pitchFamily="49" charset="0"/>
+              </a:rPr>
+              <a:t>	</a:t>
+            </a:r>
+          </a:p>
+          <a:p>
+            <a:pPr marL="685800" lvl="1" indent="0">
+              <a:spcBef>
+                <a:spcPts val="0"/>
+              </a:spcBef>
+              <a:buNone/>
+            </a:pPr>
+            <a:r>
+              <a:rPr lang="en-US" sz="1800" dirty="0" smtClean="0">
+                <a:latin typeface="Consolas" panose="020B0609020204030204" pitchFamily="49" charset="0"/>
+                <a:cs typeface="Consolas" panose="020B0609020204030204" pitchFamily="49" charset="0"/>
+              </a:rPr>
+              <a:t>/</a:t>
+            </a:r>
+            <a:r>
+              <a:rPr lang="en-US" sz="1800" dirty="0" smtClean="0">
+                <a:latin typeface="Consolas" panose="020B0609020204030204" pitchFamily="49" charset="0"/>
+                <a:cs typeface="Consolas" panose="020B0609020204030204" pitchFamily="49" charset="0"/>
+              </a:rPr>
+              <a:t>/ watch out: O(2</a:t>
+            </a:r>
+            <a:r>
+              <a:rPr lang="en-US" sz="1800" baseline="30000" dirty="0" smtClean="0">
+                <a:latin typeface="Consolas" panose="020B0609020204030204" pitchFamily="49" charset="0"/>
+                <a:cs typeface="Consolas" panose="020B0609020204030204" pitchFamily="49" charset="0"/>
+              </a:rPr>
+              <a:t>n</a:t>
+            </a:r>
+            <a:r>
+              <a:rPr lang="en-US" sz="1800" dirty="0" smtClean="0">
+                <a:latin typeface="Consolas" panose="020B0609020204030204" pitchFamily="49" charset="0"/>
+                <a:cs typeface="Consolas" panose="020B0609020204030204" pitchFamily="49" charset="0"/>
+              </a:rPr>
+              <a:t>)</a:t>
+            </a:r>
+          </a:p>
+          <a:p>
+            <a:pPr marL="685800" lvl="1" indent="0">
+              <a:spcBef>
+                <a:spcPts val="0"/>
+              </a:spcBef>
+              <a:buNone/>
+            </a:pPr>
+            <a:r>
+              <a:rPr lang="en-US" sz="1800" dirty="0" err="1" smtClean="0">
+                <a:latin typeface="Consolas" panose="020B0609020204030204" pitchFamily="49" charset="0"/>
+                <a:cs typeface="Consolas" panose="020B0609020204030204" pitchFamily="49" charset="0"/>
+              </a:rPr>
+              <a:t>int</a:t>
+            </a:r>
+            <a:r>
+              <a:rPr lang="en-US" sz="1800" dirty="0" smtClean="0">
+                <a:latin typeface="Consolas" panose="020B0609020204030204" pitchFamily="49" charset="0"/>
+                <a:cs typeface="Consolas" panose="020B0609020204030204" pitchFamily="49" charset="0"/>
+              </a:rPr>
+              <a:t> </a:t>
+            </a:r>
+            <a:r>
+              <a:rPr lang="en-US" sz="1800" dirty="0" err="1">
+                <a:latin typeface="Consolas" panose="020B0609020204030204" pitchFamily="49" charset="0"/>
+                <a:cs typeface="Consolas" panose="020B0609020204030204" pitchFamily="49" charset="0"/>
+              </a:rPr>
+              <a:t>f</a:t>
+            </a:r>
+            <a:r>
+              <a:rPr lang="en-US" sz="1800" dirty="0" err="1" smtClean="0">
+                <a:latin typeface="Consolas" panose="020B0609020204030204" pitchFamily="49" charset="0"/>
+                <a:cs typeface="Consolas" panose="020B0609020204030204" pitchFamily="49" charset="0"/>
+              </a:rPr>
+              <a:t>ibonacci_serial</a:t>
+            </a:r>
+            <a:r>
+              <a:rPr lang="en-US" sz="1800" dirty="0" smtClean="0">
+                <a:latin typeface="Consolas" panose="020B0609020204030204" pitchFamily="49" charset="0"/>
+                <a:cs typeface="Consolas" panose="020B0609020204030204" pitchFamily="49" charset="0"/>
+              </a:rPr>
+              <a:t>(</a:t>
+            </a:r>
+            <a:r>
+              <a:rPr lang="en-US" sz="1800" dirty="0" err="1" smtClean="0">
+                <a:latin typeface="Consolas" panose="020B0609020204030204" pitchFamily="49" charset="0"/>
+                <a:cs typeface="Consolas" panose="020B0609020204030204" pitchFamily="49" charset="0"/>
+              </a:rPr>
+              <a:t>int</a:t>
+            </a:r>
+            <a:r>
+              <a:rPr lang="en-US" sz="1800" dirty="0" smtClean="0">
+                <a:latin typeface="Consolas" panose="020B0609020204030204" pitchFamily="49" charset="0"/>
+                <a:cs typeface="Consolas" panose="020B0609020204030204" pitchFamily="49" charset="0"/>
+              </a:rPr>
+              <a:t> n)</a:t>
+            </a:r>
+          </a:p>
+          <a:p>
+            <a:pPr marL="685800" lvl="1" indent="0">
+              <a:spcBef>
+                <a:spcPts val="0"/>
+              </a:spcBef>
+              <a:buNone/>
+            </a:pPr>
+            <a:r>
+              <a:rPr lang="en-US" sz="1800" dirty="0" smtClean="0">
+                <a:latin typeface="Consolas" panose="020B0609020204030204" pitchFamily="49" charset="0"/>
+                <a:cs typeface="Consolas" panose="020B0609020204030204" pitchFamily="49" charset="0"/>
+              </a:rPr>
+              <a:t>{</a:t>
+            </a:r>
+          </a:p>
+          <a:p>
+            <a:pPr marL="685800" lvl="1" indent="0">
+              <a:spcBef>
+                <a:spcPts val="0"/>
+              </a:spcBef>
+              <a:buNone/>
+            </a:pPr>
+            <a:r>
+              <a:rPr lang="en-US" sz="1800" dirty="0" smtClean="0">
+                <a:latin typeface="Consolas" panose="020B0609020204030204" pitchFamily="49" charset="0"/>
+                <a:cs typeface="Consolas" panose="020B0609020204030204" pitchFamily="49" charset="0"/>
+              </a:rPr>
+              <a:t>    if (n &lt; 2) return n;</a:t>
+            </a:r>
+          </a:p>
+          <a:p>
+            <a:pPr marL="685800" lvl="1" indent="0">
+              <a:spcBef>
+                <a:spcPts val="0"/>
+              </a:spcBef>
+              <a:buNone/>
+            </a:pPr>
+            <a:r>
+              <a:rPr lang="en-US" sz="1800" dirty="0" smtClean="0">
+                <a:latin typeface="Consolas" panose="020B0609020204030204" pitchFamily="49" charset="0"/>
+                <a:cs typeface="Consolas" panose="020B0609020204030204" pitchFamily="49" charset="0"/>
+              </a:rPr>
+              <a:t>    return </a:t>
+            </a:r>
+            <a:r>
+              <a:rPr lang="en-US" sz="1800" dirty="0" err="1" smtClean="0">
+                <a:latin typeface="Consolas" panose="020B0609020204030204" pitchFamily="49" charset="0"/>
+                <a:cs typeface="Consolas" panose="020B0609020204030204" pitchFamily="49" charset="0"/>
+              </a:rPr>
+              <a:t>fibonacci_serial</a:t>
+            </a:r>
+            <a:r>
+              <a:rPr lang="en-US" sz="1800" dirty="0" smtClean="0">
+                <a:latin typeface="Consolas" panose="020B0609020204030204" pitchFamily="49" charset="0"/>
+                <a:cs typeface="Consolas" panose="020B0609020204030204" pitchFamily="49" charset="0"/>
+              </a:rPr>
+              <a:t>(n-1) </a:t>
+            </a:r>
+            <a:endParaRPr lang="en-US" sz="1800" dirty="0" smtClean="0">
+              <a:latin typeface="Consolas" panose="020B0609020204030204" pitchFamily="49" charset="0"/>
+              <a:cs typeface="Consolas" panose="020B0609020204030204" pitchFamily="49" charset="0"/>
+            </a:endParaRPr>
+          </a:p>
+          <a:p>
+            <a:pPr marL="685800" lvl="1" indent="0">
+              <a:spcBef>
+                <a:spcPts val="0"/>
+              </a:spcBef>
+              <a:buNone/>
+            </a:pPr>
+            <a:r>
+              <a:rPr lang="en-US" dirty="0">
+                <a:latin typeface="Consolas" panose="020B0609020204030204" pitchFamily="49" charset="0"/>
+                <a:cs typeface="Consolas" panose="020B0609020204030204" pitchFamily="49" charset="0"/>
+              </a:rPr>
+              <a:t> </a:t>
+            </a:r>
+            <a:r>
+              <a:rPr lang="en-US" dirty="0" smtClean="0">
+                <a:latin typeface="Consolas" panose="020B0609020204030204" pitchFamily="49" charset="0"/>
+                <a:cs typeface="Consolas" panose="020B0609020204030204" pitchFamily="49" charset="0"/>
+              </a:rPr>
+              <a:t>      </a:t>
+            </a:r>
+            <a:r>
+              <a:rPr lang="en-US" sz="1800" dirty="0" smtClean="0">
+                <a:latin typeface="Consolas" panose="020B0609020204030204" pitchFamily="49" charset="0"/>
+                <a:cs typeface="Consolas" panose="020B0609020204030204" pitchFamily="49" charset="0"/>
+              </a:rPr>
+              <a:t>+ </a:t>
+            </a:r>
+            <a:r>
+              <a:rPr lang="en-US" sz="1800" dirty="0" err="1" smtClean="0">
+                <a:latin typeface="Consolas" panose="020B0609020204030204" pitchFamily="49" charset="0"/>
+                <a:cs typeface="Consolas" panose="020B0609020204030204" pitchFamily="49" charset="0"/>
+              </a:rPr>
+              <a:t>fibonacci_serial</a:t>
+            </a:r>
+            <a:r>
+              <a:rPr lang="en-US" sz="1800" dirty="0" smtClean="0">
+                <a:latin typeface="Consolas" panose="020B0609020204030204" pitchFamily="49" charset="0"/>
+                <a:cs typeface="Consolas" panose="020B0609020204030204" pitchFamily="49" charset="0"/>
+              </a:rPr>
+              <a:t>(n-2);</a:t>
+            </a:r>
+          </a:p>
+          <a:p>
+            <a:pPr marL="685800" lvl="1" indent="0">
+              <a:spcBef>
+                <a:spcPts val="0"/>
+              </a:spcBef>
+              <a:buNone/>
+            </a:pPr>
+            <a:r>
+              <a:rPr lang="en-US" sz="1800" dirty="0" smtClean="0">
+                <a:latin typeface="Consolas" panose="020B0609020204030204" pitchFamily="49" charset="0"/>
+                <a:cs typeface="Consolas" panose="020B0609020204030204" pitchFamily="49" charset="0"/>
+              </a:rPr>
+              <a:t>}</a:t>
+            </a:r>
+          </a:p>
+          <a:p>
+            <a:pPr marL="685800" lvl="1" indent="0">
+              <a:spcBef>
+                <a:spcPts val="0"/>
+              </a:spcBef>
+              <a:buNone/>
+            </a:pPr>
+            <a:endParaRPr lang="en-US" sz="1800" dirty="0">
+              <a:latin typeface="Consolas" panose="020B0609020204030204" pitchFamily="49" charset="0"/>
+              <a:cs typeface="Consolas" panose="020B0609020204030204" pitchFamily="49" charset="0"/>
+            </a:endParaRPr>
+          </a:p>
+          <a:p>
+            <a:pPr marL="685800" lvl="1" indent="0">
+              <a:spcBef>
+                <a:spcPts val="0"/>
+              </a:spcBef>
+              <a:buNone/>
+            </a:pPr>
+            <a:r>
+              <a:rPr lang="en-US" sz="1800" dirty="0" err="1" smtClean="0">
+                <a:latin typeface="Consolas" panose="020B0609020204030204" pitchFamily="49" charset="0"/>
+                <a:cs typeface="Consolas" panose="020B0609020204030204" pitchFamily="49" charset="0"/>
+              </a:rPr>
+              <a:t>cout</a:t>
+            </a:r>
+            <a:r>
+              <a:rPr lang="en-US" sz="1800" dirty="0" smtClean="0">
+                <a:latin typeface="Consolas" panose="020B0609020204030204" pitchFamily="49" charset="0"/>
+                <a:cs typeface="Consolas" panose="020B0609020204030204" pitchFamily="49" charset="0"/>
+              </a:rPr>
+              <a:t> &lt;&lt; </a:t>
+            </a:r>
+            <a:r>
+              <a:rPr lang="en-US" sz="1800" dirty="0" err="1" smtClean="0">
+                <a:latin typeface="Consolas" panose="020B0609020204030204" pitchFamily="49" charset="0"/>
+                <a:cs typeface="Consolas" panose="020B0609020204030204" pitchFamily="49" charset="0"/>
+              </a:rPr>
+              <a:t>fibonacci_serial</a:t>
+            </a:r>
+            <a:r>
+              <a:rPr lang="en-US" sz="1800" dirty="0" smtClean="0">
+                <a:latin typeface="Consolas" panose="020B0609020204030204" pitchFamily="49" charset="0"/>
+                <a:cs typeface="Consolas" panose="020B0609020204030204" pitchFamily="49" charset="0"/>
+              </a:rPr>
+              <a:t>(10) &lt;&lt; </a:t>
+            </a:r>
+            <a:r>
+              <a:rPr lang="en-US" sz="1800" dirty="0" err="1" smtClean="0">
+                <a:latin typeface="Consolas" panose="020B0609020204030204" pitchFamily="49" charset="0"/>
+                <a:cs typeface="Consolas" panose="020B0609020204030204" pitchFamily="49" charset="0"/>
+              </a:rPr>
+              <a:t>endl</a:t>
+            </a:r>
+            <a:r>
+              <a:rPr lang="en-US" sz="1800" dirty="0" smtClean="0">
+                <a:latin typeface="Consolas" panose="020B0609020204030204" pitchFamily="49" charset="0"/>
+                <a:cs typeface="Consolas" panose="020B0609020204030204" pitchFamily="49" charset="0"/>
+              </a:rPr>
+              <a:t>;    </a:t>
+            </a:r>
+            <a:endParaRPr lang="en-US" sz="1800" dirty="0" smtClean="0">
+              <a:latin typeface="Consolas" panose="020B0609020204030204" pitchFamily="49" charset="0"/>
+              <a:cs typeface="Consolas" panose="020B0609020204030204" pitchFamily="49" charset="0"/>
+            </a:endParaRPr>
+          </a:p>
+          <a:p>
+            <a:pPr marL="685800" lvl="1" indent="0">
+              <a:spcBef>
+                <a:spcPts val="0"/>
+              </a:spcBef>
+              <a:buNone/>
+            </a:pPr>
+            <a:r>
+              <a:rPr lang="en-US" sz="1800" dirty="0" smtClean="0">
+                <a:latin typeface="Consolas" panose="020B0609020204030204" pitchFamily="49" charset="0"/>
+                <a:cs typeface="Consolas" panose="020B0609020204030204" pitchFamily="49" charset="0"/>
+              </a:rPr>
+              <a:t>/</a:t>
+            </a:r>
+            <a:r>
+              <a:rPr lang="en-US" sz="1800" dirty="0" smtClean="0">
+                <a:latin typeface="Consolas" panose="020B0609020204030204" pitchFamily="49" charset="0"/>
+                <a:cs typeface="Consolas" panose="020B0609020204030204" pitchFamily="49" charset="0"/>
+              </a:rPr>
+              <a:t>/ will print: 55 </a:t>
+            </a:r>
+            <a:endParaRPr lang="en-US" sz="1800" dirty="0">
+              <a:latin typeface="Consolas" panose="020B0609020204030204" pitchFamily="49" charset="0"/>
+              <a:cs typeface="Consolas" panose="020B0609020204030204" pitchFamily="49" charset="0"/>
+            </a:endParaRPr>
+          </a:p>
+        </p:txBody>
+      </p:sp>
+      <p:sp>
+        <p:nvSpPr>
           <p:cNvPr id="2" name="Title 1"/>
           <p:cNvSpPr>
             <a:spLocks noGrp="1"/>
@@ -34404,289 +34485,6 @@
               <a:t>Calculate Fibonacci Numbers</a:t>
             </a:r>
             <a:endParaRPr lang="en-US" dirty="0"/>
-          </a:p>
-        </p:txBody>
-      </p:sp>
-      <p:sp>
-        <p:nvSpPr>
-          <p:cNvPr id="11" name="Content Placeholder 10"/>
-          <p:cNvSpPr>
-            <a:spLocks noGrp="1"/>
-          </p:cNvSpPr>
-          <p:nvPr>
-            <p:ph idx="1"/>
-          </p:nvPr>
-        </p:nvSpPr>
-        <p:spPr/>
-        <p:txBody>
-          <a:bodyPr/>
-          <a:lstStyle/>
-          <a:p>
-            <a:r>
-              <a:rPr lang="en-US" dirty="0" smtClean="0"/>
-              <a:t>Synchronous way:</a:t>
-            </a:r>
-          </a:p>
-          <a:p>
-            <a:pPr marL="0" indent="0">
-              <a:buNone/>
-            </a:pPr>
-            <a:r>
-              <a:rPr lang="en-US" sz="1800" dirty="0" smtClean="0">
-                <a:latin typeface="Consolas" panose="020B0609020204030204" pitchFamily="49" charset="0"/>
-                <a:cs typeface="Consolas" panose="020B0609020204030204" pitchFamily="49" charset="0"/>
-              </a:rPr>
-              <a:t>	</a:t>
-            </a:r>
-          </a:p>
-          <a:p>
-            <a:pPr marL="400050" lvl="1" indent="0">
-              <a:buNone/>
-            </a:pPr>
-            <a:endParaRPr lang="en-US" dirty="0" smtClean="0">
-              <a:latin typeface="Consolas" panose="020B0609020204030204" pitchFamily="49" charset="0"/>
-              <a:cs typeface="Consolas" panose="020B0609020204030204" pitchFamily="49" charset="0"/>
-            </a:endParaRPr>
-          </a:p>
-          <a:p>
-            <a:pPr marL="685800" lvl="1" indent="0">
-              <a:spcBef>
-                <a:spcPts val="0"/>
-              </a:spcBef>
-              <a:buNone/>
-            </a:pPr>
-            <a:r>
-              <a:rPr lang="en-US" sz="1800" dirty="0" smtClean="0">
-                <a:latin typeface="Consolas" panose="020B0609020204030204" pitchFamily="49" charset="0"/>
-                <a:cs typeface="Consolas" panose="020B0609020204030204" pitchFamily="49" charset="0"/>
-              </a:rPr>
-              <a:t>// watch out: O(2</a:t>
-            </a:r>
-            <a:r>
-              <a:rPr lang="en-US" sz="1800" baseline="30000" dirty="0" smtClean="0">
-                <a:latin typeface="Consolas" panose="020B0609020204030204" pitchFamily="49" charset="0"/>
-                <a:cs typeface="Consolas" panose="020B0609020204030204" pitchFamily="49" charset="0"/>
-              </a:rPr>
-              <a:t>n</a:t>
-            </a:r>
-            <a:r>
-              <a:rPr lang="en-US" sz="1800" dirty="0" smtClean="0">
-                <a:latin typeface="Consolas" panose="020B0609020204030204" pitchFamily="49" charset="0"/>
-                <a:cs typeface="Consolas" panose="020B0609020204030204" pitchFamily="49" charset="0"/>
-              </a:rPr>
-              <a:t>)</a:t>
-            </a:r>
-          </a:p>
-          <a:p>
-            <a:pPr marL="685800" lvl="1" indent="0">
-              <a:spcBef>
-                <a:spcPts val="0"/>
-              </a:spcBef>
-              <a:buNone/>
-            </a:pPr>
-            <a:r>
-              <a:rPr lang="en-US" sz="1800" dirty="0" err="1" smtClean="0">
-                <a:latin typeface="Consolas" panose="020B0609020204030204" pitchFamily="49" charset="0"/>
-                <a:cs typeface="Consolas" panose="020B0609020204030204" pitchFamily="49" charset="0"/>
-              </a:rPr>
-              <a:t>int</a:t>
-            </a:r>
-            <a:r>
-              <a:rPr lang="en-US" sz="1800" dirty="0" smtClean="0">
-                <a:latin typeface="Consolas" panose="020B0609020204030204" pitchFamily="49" charset="0"/>
-                <a:cs typeface="Consolas" panose="020B0609020204030204" pitchFamily="49" charset="0"/>
-              </a:rPr>
-              <a:t> </a:t>
-            </a:r>
-            <a:r>
-              <a:rPr lang="en-US" sz="1800" dirty="0" err="1">
-                <a:latin typeface="Consolas" panose="020B0609020204030204" pitchFamily="49" charset="0"/>
-                <a:cs typeface="Consolas" panose="020B0609020204030204" pitchFamily="49" charset="0"/>
-              </a:rPr>
-              <a:t>f</a:t>
-            </a:r>
-            <a:r>
-              <a:rPr lang="en-US" sz="1800" dirty="0" err="1" smtClean="0">
-                <a:latin typeface="Consolas" panose="020B0609020204030204" pitchFamily="49" charset="0"/>
-                <a:cs typeface="Consolas" panose="020B0609020204030204" pitchFamily="49" charset="0"/>
-              </a:rPr>
-              <a:t>ibonacci_serial</a:t>
-            </a:r>
-            <a:r>
-              <a:rPr lang="en-US" sz="1800" dirty="0" smtClean="0">
-                <a:latin typeface="Consolas" panose="020B0609020204030204" pitchFamily="49" charset="0"/>
-                <a:cs typeface="Consolas" panose="020B0609020204030204" pitchFamily="49" charset="0"/>
-              </a:rPr>
-              <a:t>(</a:t>
-            </a:r>
-            <a:r>
-              <a:rPr lang="en-US" sz="1800" dirty="0" err="1" smtClean="0">
-                <a:latin typeface="Consolas" panose="020B0609020204030204" pitchFamily="49" charset="0"/>
-                <a:cs typeface="Consolas" panose="020B0609020204030204" pitchFamily="49" charset="0"/>
-              </a:rPr>
-              <a:t>int</a:t>
-            </a:r>
-            <a:r>
-              <a:rPr lang="en-US" sz="1800" dirty="0" smtClean="0">
-                <a:latin typeface="Consolas" panose="020B0609020204030204" pitchFamily="49" charset="0"/>
-                <a:cs typeface="Consolas" panose="020B0609020204030204" pitchFamily="49" charset="0"/>
-              </a:rPr>
-              <a:t> n)</a:t>
-            </a:r>
-          </a:p>
-          <a:p>
-            <a:pPr marL="685800" lvl="1" indent="0">
-              <a:spcBef>
-                <a:spcPts val="0"/>
-              </a:spcBef>
-              <a:buNone/>
-            </a:pPr>
-            <a:r>
-              <a:rPr lang="en-US" sz="1800" dirty="0" smtClean="0">
-                <a:latin typeface="Consolas" panose="020B0609020204030204" pitchFamily="49" charset="0"/>
-                <a:cs typeface="Consolas" panose="020B0609020204030204" pitchFamily="49" charset="0"/>
-              </a:rPr>
-              <a:t>{</a:t>
-            </a:r>
-          </a:p>
-          <a:p>
-            <a:pPr marL="685800" lvl="1" indent="0">
-              <a:spcBef>
-                <a:spcPts val="0"/>
-              </a:spcBef>
-              <a:buNone/>
-            </a:pPr>
-            <a:r>
-              <a:rPr lang="en-US" sz="1800" dirty="0" smtClean="0">
-                <a:latin typeface="Consolas" panose="020B0609020204030204" pitchFamily="49" charset="0"/>
-                <a:cs typeface="Consolas" panose="020B0609020204030204" pitchFamily="49" charset="0"/>
-              </a:rPr>
-              <a:t>    if (n &lt; 2) return n;</a:t>
-            </a:r>
-          </a:p>
-          <a:p>
-            <a:pPr marL="685800" lvl="1" indent="0">
-              <a:spcBef>
-                <a:spcPts val="0"/>
-              </a:spcBef>
-              <a:buNone/>
-            </a:pPr>
-            <a:r>
-              <a:rPr lang="en-US" sz="1800" dirty="0" smtClean="0">
-                <a:latin typeface="Consolas" panose="020B0609020204030204" pitchFamily="49" charset="0"/>
-                <a:cs typeface="Consolas" panose="020B0609020204030204" pitchFamily="49" charset="0"/>
-              </a:rPr>
-              <a:t>    return </a:t>
-            </a:r>
-            <a:r>
-              <a:rPr lang="en-US" sz="1800" dirty="0" err="1" smtClean="0">
-                <a:latin typeface="Consolas" panose="020B0609020204030204" pitchFamily="49" charset="0"/>
-                <a:cs typeface="Consolas" panose="020B0609020204030204" pitchFamily="49" charset="0"/>
-              </a:rPr>
-              <a:t>fibonacci_serial</a:t>
-            </a:r>
-            <a:r>
-              <a:rPr lang="en-US" sz="1800" dirty="0" smtClean="0">
-                <a:latin typeface="Consolas" panose="020B0609020204030204" pitchFamily="49" charset="0"/>
-                <a:cs typeface="Consolas" panose="020B0609020204030204" pitchFamily="49" charset="0"/>
-              </a:rPr>
-              <a:t>(n-1) + </a:t>
-            </a:r>
-            <a:r>
-              <a:rPr lang="en-US" sz="1800" dirty="0" err="1" smtClean="0">
-                <a:latin typeface="Consolas" panose="020B0609020204030204" pitchFamily="49" charset="0"/>
-                <a:cs typeface="Consolas" panose="020B0609020204030204" pitchFamily="49" charset="0"/>
-              </a:rPr>
-              <a:t>fibonacci_serial</a:t>
-            </a:r>
-            <a:r>
-              <a:rPr lang="en-US" sz="1800" dirty="0" smtClean="0">
-                <a:latin typeface="Consolas" panose="020B0609020204030204" pitchFamily="49" charset="0"/>
-                <a:cs typeface="Consolas" panose="020B0609020204030204" pitchFamily="49" charset="0"/>
-              </a:rPr>
-              <a:t>(n-2);</a:t>
-            </a:r>
-          </a:p>
-          <a:p>
-            <a:pPr marL="685800" lvl="1" indent="0">
-              <a:spcBef>
-                <a:spcPts val="0"/>
-              </a:spcBef>
-              <a:buNone/>
-            </a:pPr>
-            <a:r>
-              <a:rPr lang="en-US" sz="1800" dirty="0" smtClean="0">
-                <a:latin typeface="Consolas" panose="020B0609020204030204" pitchFamily="49" charset="0"/>
-                <a:cs typeface="Consolas" panose="020B0609020204030204" pitchFamily="49" charset="0"/>
-              </a:rPr>
-              <a:t>}</a:t>
-            </a:r>
-          </a:p>
-          <a:p>
-            <a:pPr marL="685800" lvl="1" indent="0">
-              <a:spcBef>
-                <a:spcPts val="0"/>
-              </a:spcBef>
-              <a:buNone/>
-            </a:pPr>
-            <a:endParaRPr lang="en-US" sz="1800" dirty="0">
-              <a:latin typeface="Consolas" panose="020B0609020204030204" pitchFamily="49" charset="0"/>
-              <a:cs typeface="Consolas" panose="020B0609020204030204" pitchFamily="49" charset="0"/>
-            </a:endParaRPr>
-          </a:p>
-          <a:p>
-            <a:pPr marL="685800" lvl="1" indent="0">
-              <a:spcBef>
-                <a:spcPts val="0"/>
-              </a:spcBef>
-              <a:buNone/>
-            </a:pPr>
-            <a:r>
-              <a:rPr lang="en-US" sz="1800" dirty="0" err="1" smtClean="0">
-                <a:latin typeface="Consolas" panose="020B0609020204030204" pitchFamily="49" charset="0"/>
-                <a:cs typeface="Consolas" panose="020B0609020204030204" pitchFamily="49" charset="0"/>
-              </a:rPr>
-              <a:t>cout</a:t>
-            </a:r>
-            <a:r>
-              <a:rPr lang="en-US" sz="1800" dirty="0" smtClean="0">
-                <a:latin typeface="Consolas" panose="020B0609020204030204" pitchFamily="49" charset="0"/>
-                <a:cs typeface="Consolas" panose="020B0609020204030204" pitchFamily="49" charset="0"/>
-              </a:rPr>
-              <a:t> &lt;&lt; </a:t>
-            </a:r>
-            <a:r>
-              <a:rPr lang="en-US" sz="1800" dirty="0" err="1" smtClean="0">
-                <a:latin typeface="Consolas" panose="020B0609020204030204" pitchFamily="49" charset="0"/>
-                <a:cs typeface="Consolas" panose="020B0609020204030204" pitchFamily="49" charset="0"/>
-              </a:rPr>
-              <a:t>fibonacci_serial</a:t>
-            </a:r>
-            <a:r>
-              <a:rPr lang="en-US" sz="1800" dirty="0" smtClean="0">
-                <a:latin typeface="Consolas" panose="020B0609020204030204" pitchFamily="49" charset="0"/>
-                <a:cs typeface="Consolas" panose="020B0609020204030204" pitchFamily="49" charset="0"/>
-              </a:rPr>
-              <a:t>(10) &lt;&lt; </a:t>
-            </a:r>
-            <a:r>
-              <a:rPr lang="en-US" sz="1800" dirty="0" err="1" smtClean="0">
-                <a:latin typeface="Consolas" panose="020B0609020204030204" pitchFamily="49" charset="0"/>
-                <a:cs typeface="Consolas" panose="020B0609020204030204" pitchFamily="49" charset="0"/>
-              </a:rPr>
-              <a:t>endl</a:t>
-            </a:r>
-            <a:r>
-              <a:rPr lang="en-US" sz="1800" dirty="0" smtClean="0">
-                <a:latin typeface="Consolas" panose="020B0609020204030204" pitchFamily="49" charset="0"/>
-                <a:cs typeface="Consolas" panose="020B0609020204030204" pitchFamily="49" charset="0"/>
-              </a:rPr>
-              <a:t>;    // will print: 55 </a:t>
-            </a:r>
-            <a:endParaRPr lang="en-US" sz="1800" dirty="0">
-              <a:latin typeface="Consolas" panose="020B0609020204030204" pitchFamily="49" charset="0"/>
-              <a:cs typeface="Consolas" panose="020B0609020204030204" pitchFamily="49" charset="0"/>
-            </a:endParaRPr>
           </a:p>
         </p:txBody>
       </p:sp>
@@ -34769,12 +34567,16 @@
             <a:graphicFrameLocks/>
           </p:cNvGraphicFramePr>
           <p:nvPr>
-            <p:extLst/>
+            <p:extLst>
+              <p:ext uri="{D42A27DB-BD31-4B8C-83A1-F6EECF244321}">
+                <p14:modId xmlns:p14="http://schemas.microsoft.com/office/powerpoint/2010/main" val="2473796934"/>
+              </p:ext>
+            </p:extLst>
           </p:nvPr>
         </p:nvGraphicFramePr>
         <p:xfrm>
-          <a:off x="4610100" y="1828800"/>
-          <a:ext cx="6553200" cy="4605828"/>
+          <a:off x="5969897" y="1805060"/>
+          <a:ext cx="5357322" cy="4818504"/>
         </p:xfrm>
         <a:graphic>
           <a:graphicData uri="http://schemas.openxmlformats.org/drawingml/2006/chart">
@@ -34803,7 +34605,7 @@
   <p:timing>
     <p:tnLst>
       <p:par>
-        <p:cTn id="1" dur="indefinite" restart="never" nodeType="tmRoot">
+        <p:cTn xmlns:p14="http://schemas.microsoft.com/office/powerpoint/2010/main" id="1" dur="indefinite" restart="never" nodeType="tmRoot">
           <p:childTnLst>
             <p:seq concurrent="1" nextAc="seek">
               <p:cTn id="2" dur="indefinite" nodeType="mainSeq">
@@ -34972,7 +34774,7 @@
     </a:clrScheme>
     <a:fontScheme name="View">
       <a:majorFont>
-        <a:latin typeface="Century Schoolbook" panose="02040604050505020304"/>
+        <a:latin typeface="Century Schoolbook"/>
         <a:ea typeface=""/>
         <a:cs typeface=""/>
         <a:font script="Jpan" typeface="ＭＳ ゴシック"/>
@@ -35007,7 +34809,7 @@
         <a:font script="Geor" typeface="Sylfaen"/>
       </a:majorFont>
       <a:minorFont>
-        <a:latin typeface="Century Schoolbook" panose="02040604050505020304"/>
+        <a:latin typeface="Century Schoolbook"/>
         <a:ea typeface=""/>
         <a:cs typeface=""/>
         <a:font script="Jpan" typeface="ＭＳ ゴシック"/>
@@ -35176,7 +34978,7 @@
   <a:extraClrSchemeLst/>
   <a:extLst>
     <a:ext uri="{05A4C25C-085E-4340-85A3-A5531E510DB2}">
-      <thm15:themeFamily xmlns:thm15="http://schemas.microsoft.com/office/thememl/2012/main" name="View" id="{BA0EB5A6-F2D4-4F82-977B-64ADEE4A2A69}" vid="{7B713C7F-58B7-4AE9-B361-B13EB9EC4C0C}"/>
+      <thm15:themeFamily xmlns:thm15="http://schemas.microsoft.com/office/thememl/2012/main" xmlns="" name="View" id="{BA0EB5A6-F2D4-4F82-977B-64ADEE4A2A69}" vid="{7B713C7F-58B7-4AE9-B361-B13EB9EC4C0C}"/>
     </a:ext>
   </a:extLst>
 </a:theme>
@@ -35225,7 +35027,7 @@
     </a:clrScheme>
     <a:fontScheme name="Office">
       <a:majorFont>
-        <a:latin typeface="Calibri Light" panose="020F0302020204030204"/>
+        <a:latin typeface="Calibri Light"/>
         <a:ea typeface=""/>
         <a:cs typeface=""/>
         <a:font script="Jpan" typeface="ＭＳ Ｐゴシック"/>
@@ -35260,7 +35062,7 @@
         <a:font script="Geor" typeface="Sylfaen"/>
       </a:majorFont>
       <a:minorFont>
-        <a:latin typeface="Calibri" panose="020F0502020204030204"/>
+        <a:latin typeface="Calibri"/>
         <a:ea typeface=""/>
         <a:cs typeface=""/>
         <a:font script="Jpan" typeface="ＭＳ Ｐゴシック"/>
@@ -35437,7 +35239,7 @@
   <a:extraClrSchemeLst/>
   <a:extLst>
     <a:ext uri="{05A4C25C-085E-4340-85A3-A5531E510DB2}">
-      <thm15:themeFamily xmlns:thm15="http://schemas.microsoft.com/office/thememl/2012/main" name="Office Theme" id="{62F939B6-93AF-4DB8-9C6B-D6C7DFDC589F}" vid="{4A3C46E8-61CC-4603-A589-7422A47A8E4A}"/>
+      <thm15:themeFamily xmlns:thm15="http://schemas.microsoft.com/office/thememl/2012/main" xmlns="" name="Office Theme" id="{62F939B6-93AF-4DB8-9C6B-D6C7DFDC589F}" vid="{4A3C46E8-61CC-4603-A589-7422A47A8E4A}"/>
     </a:ext>
   </a:extLst>
 </a:theme>

</xml_diff>